<commit_message>
bergupdate: oncoscanR can be made into slides, the R code is straightforward and already analyzed.
</commit_message>
<xml_diff>
--- a/docs/docs_I_made/slides/OncoscanR.pptx
+++ b/docs/docs_I_made/slides/OncoscanR.pptx
@@ -8,9 +8,6 @@
     <p:sldId id="256" r:id="rId2"/>
     <p:sldId id="261" r:id="rId3"/>
     <p:sldId id="266" r:id="rId4"/>
-    <p:sldId id="260" r:id="rId5"/>
-    <p:sldId id="267" r:id="rId6"/>
-    <p:sldId id="269" r:id="rId7"/>
   </p:sldIdLst>
   <p:sldSz cx="12192000" cy="6858000"/>
   <p:notesSz cx="6858000" cy="9144000"/>
@@ -5979,30 +5976,6 @@
           </a:p>
         </p:txBody>
       </p:sp>
-      <p:pic>
-        <p:nvPicPr>
-          <p:cNvPr id="3" name="Image 2"/>
-          <p:cNvPicPr>
-            <a:picLocks noChangeAspect="1"/>
-          </p:cNvPicPr>
-          <p:nvPr/>
-        </p:nvPicPr>
-        <p:blipFill>
-          <a:blip r:embed="rId2"/>
-          <a:stretch>
-            <a:fillRect/>
-          </a:stretch>
-        </p:blipFill>
-        <p:spPr>
-          <a:xfrm>
-            <a:off x="1457916" y="1561054"/>
-            <a:ext cx="7468642" cy="4201111"/>
-          </a:xfrm>
-          <a:prstGeom prst="rect">
-            <a:avLst/>
-          </a:prstGeom>
-        </p:spPr>
-      </p:pic>
     </p:spTree>
     <p:extLst>
       <p:ext uri="{BB962C8B-B14F-4D97-AF65-F5344CB8AC3E}">
@@ -6162,614 +6135,10 @@
           </a:p>
         </p:txBody>
       </p:sp>
-      <p:pic>
-        <p:nvPicPr>
-          <p:cNvPr id="6" name="Image 5"/>
-          <p:cNvPicPr>
-            <a:picLocks noChangeAspect="1"/>
-          </p:cNvPicPr>
-          <p:nvPr/>
-        </p:nvPicPr>
-        <p:blipFill>
-          <a:blip r:embed="rId2"/>
-          <a:stretch>
-            <a:fillRect/>
-          </a:stretch>
-        </p:blipFill>
-        <p:spPr>
-          <a:xfrm>
-            <a:off x="2640902" y="1868872"/>
-            <a:ext cx="5142857" cy="4095238"/>
-          </a:xfrm>
-          <a:prstGeom prst="rect">
-            <a:avLst/>
-          </a:prstGeom>
-        </p:spPr>
-      </p:pic>
     </p:spTree>
     <p:extLst>
       <p:ext uri="{BB962C8B-B14F-4D97-AF65-F5344CB8AC3E}">
         <p14:creationId xmlns:p14="http://schemas.microsoft.com/office/powerpoint/2010/main" val="4048697289"/>
-      </p:ext>
-    </p:extLst>
-  </p:cSld>
-  <p:clrMapOvr>
-    <a:masterClrMapping/>
-  </p:clrMapOvr>
-  <p:timing>
-    <p:tnLst>
-      <p:par>
-        <p:cTn id="1" dur="indefinite" restart="never" nodeType="tmRoot"/>
-      </p:par>
-    </p:tnLst>
-  </p:timing>
-</p:sld>
-</file>
-
-<file path=ppt/slides/slide4.xml><?xml version="1.0" encoding="utf-8"?>
-<p:sld xmlns:a="http://schemas.openxmlformats.org/drawingml/2006/main" xmlns:r="http://schemas.openxmlformats.org/officeDocument/2006/relationships" xmlns:p="http://schemas.openxmlformats.org/presentationml/2006/main">
-  <p:cSld>
-    <p:spTree>
-      <p:nvGrpSpPr>
-        <p:cNvPr id="1" name=""/>
-        <p:cNvGrpSpPr/>
-        <p:nvPr/>
-      </p:nvGrpSpPr>
-      <p:grpSpPr>
-        <a:xfrm>
-          <a:off x="0" y="0"/>
-          <a:ext cx="0" cy="0"/>
-          <a:chOff x="0" y="0"/>
-          <a:chExt cx="0" cy="0"/>
-        </a:xfrm>
-      </p:grpSpPr>
-      <p:sp>
-        <p:nvSpPr>
-          <p:cNvPr id="2" name="Titre 1"/>
-          <p:cNvSpPr>
-            <a:spLocks noGrp="1"/>
-          </p:cNvSpPr>
-          <p:nvPr>
-            <p:ph type="title"/>
-          </p:nvPr>
-        </p:nvSpPr>
-        <p:spPr>
-          <a:xfrm>
-            <a:off x="685355" y="481263"/>
-            <a:ext cx="8596668" cy="1320800"/>
-          </a:xfrm>
-        </p:spPr>
-        <p:txBody>
-          <a:bodyPr/>
-          <a:lstStyle/>
-          <a:p>
-            <a:r>
-              <a:rPr lang="fr-FR" dirty="0"/>
-              <a:t>Première normalisation</a:t>
-            </a:r>
-          </a:p>
-        </p:txBody>
-      </p:sp>
-      <p:pic>
-        <p:nvPicPr>
-          <p:cNvPr id="8" name="Espace réservé du contenu 7"/>
-          <p:cNvPicPr>
-            <a:picLocks noGrp="1" noChangeAspect="1"/>
-          </p:cNvPicPr>
-          <p:nvPr>
-            <p:ph idx="1"/>
-          </p:nvPr>
-        </p:nvPicPr>
-        <p:blipFill>
-          <a:blip r:embed="rId2">
-            <a:extLst>
-              <a:ext uri="{28A0092B-C50C-407E-A947-70E740481C1C}">
-                <a14:useLocalDpi xmlns:a14="http://schemas.microsoft.com/office/drawing/2010/main" val="0"/>
-              </a:ext>
-            </a:extLst>
-          </a:blip>
-          <a:stretch>
-            <a:fillRect/>
-          </a:stretch>
-        </p:blipFill>
-        <p:spPr>
-          <a:xfrm>
-            <a:off x="2331424" y="1605898"/>
-            <a:ext cx="5761818" cy="4590249"/>
-          </a:xfrm>
-        </p:spPr>
-      </p:pic>
-      <p:sp>
-        <p:nvSpPr>
-          <p:cNvPr id="3" name="ZoneTexte 2"/>
-          <p:cNvSpPr txBox="1"/>
-          <p:nvPr/>
-        </p:nvSpPr>
-        <p:spPr>
-          <a:xfrm>
-            <a:off x="2673626" y="1434418"/>
-            <a:ext cx="4620126" cy="369332"/>
-          </a:xfrm>
-          <a:prstGeom prst="rect">
-            <a:avLst/>
-          </a:prstGeom>
-          <a:noFill/>
-        </p:spPr>
-        <p:txBody>
-          <a:bodyPr wrap="square" rtlCol="0">
-            <a:spAutoFit/>
-          </a:bodyPr>
-          <a:lstStyle/>
-          <a:p>
-            <a:r>
-              <a:rPr lang="fr-FR" dirty="0" err="1" smtClean="0">
-                <a:latin typeface="Agency FB" panose="020B0503020202020204" pitchFamily="34" charset="0"/>
-              </a:rPr>
-              <a:t>normalize</a:t>
-            </a:r>
-            <a:r>
-              <a:rPr lang="fr-FR" dirty="0" smtClean="0">
-                <a:latin typeface="Agency FB" panose="020B0503020202020204" pitchFamily="34" charset="0"/>
-              </a:rPr>
-              <a:t>(data</a:t>
-            </a:r>
-            <a:r>
-              <a:rPr lang="fr-FR" dirty="0">
-                <a:latin typeface="Agency FB" panose="020B0503020202020204" pitchFamily="34" charset="0"/>
-              </a:rPr>
-              <a:t>, </a:t>
-            </a:r>
-            <a:r>
-              <a:rPr lang="fr-FR" dirty="0" err="1">
-                <a:latin typeface="Agency FB" panose="020B0503020202020204" pitchFamily="34" charset="0"/>
-              </a:rPr>
-              <a:t>method</a:t>
-            </a:r>
-            <a:r>
-              <a:rPr lang="fr-FR" dirty="0">
-                <a:latin typeface="Agency FB" panose="020B0503020202020204" pitchFamily="34" charset="0"/>
-              </a:rPr>
-              <a:t>="</a:t>
-            </a:r>
-            <a:r>
-              <a:rPr lang="fr-FR" dirty="0" err="1">
-                <a:solidFill>
-                  <a:srgbClr val="FF0000"/>
-                </a:solidFill>
-                <a:latin typeface="Agency FB" panose="020B0503020202020204" pitchFamily="34" charset="0"/>
-              </a:rPr>
-              <a:t>median</a:t>
-            </a:r>
-            <a:r>
-              <a:rPr lang="fr-FR" dirty="0">
-                <a:latin typeface="Agency FB" panose="020B0503020202020204" pitchFamily="34" charset="0"/>
-              </a:rPr>
-              <a:t>", </a:t>
-            </a:r>
-            <a:r>
-              <a:rPr lang="fr-FR" dirty="0" err="1">
-                <a:latin typeface="Agency FB" panose="020B0503020202020204" pitchFamily="34" charset="0"/>
-              </a:rPr>
-              <a:t>smoothOutliers</a:t>
-            </a:r>
-            <a:r>
-              <a:rPr lang="fr-FR" dirty="0">
-                <a:latin typeface="Agency FB" panose="020B0503020202020204" pitchFamily="34" charset="0"/>
-              </a:rPr>
-              <a:t>=</a:t>
-            </a:r>
-            <a:r>
-              <a:rPr lang="fr-FR" dirty="0">
-                <a:solidFill>
-                  <a:srgbClr val="FF0000"/>
-                </a:solidFill>
-                <a:latin typeface="Agency FB" panose="020B0503020202020204" pitchFamily="34" charset="0"/>
-              </a:rPr>
-              <a:t>TRUE</a:t>
-            </a:r>
-            <a:r>
-              <a:rPr lang="fr-FR" dirty="0">
-                <a:latin typeface="Agency FB" panose="020B0503020202020204" pitchFamily="34" charset="0"/>
-              </a:rPr>
-              <a:t>)</a:t>
-            </a:r>
-            <a:endParaRPr lang="fr-FR" dirty="0"/>
-          </a:p>
-        </p:txBody>
-      </p:sp>
-    </p:spTree>
-    <p:extLst>
-      <p:ext uri="{BB962C8B-B14F-4D97-AF65-F5344CB8AC3E}">
-        <p14:creationId xmlns:p14="http://schemas.microsoft.com/office/powerpoint/2010/main" val="845266628"/>
-      </p:ext>
-    </p:extLst>
-  </p:cSld>
-  <p:clrMapOvr>
-    <a:masterClrMapping/>
-  </p:clrMapOvr>
-  <p:timing>
-    <p:tnLst>
-      <p:par>
-        <p:cTn id="1" dur="indefinite" restart="never" nodeType="tmRoot"/>
-      </p:par>
-    </p:tnLst>
-  </p:timing>
-</p:sld>
-</file>
-
-<file path=ppt/slides/slide5.xml><?xml version="1.0" encoding="utf-8"?>
-<p:sld xmlns:a="http://schemas.openxmlformats.org/drawingml/2006/main" xmlns:r="http://schemas.openxmlformats.org/officeDocument/2006/relationships" xmlns:p="http://schemas.openxmlformats.org/presentationml/2006/main">
-  <p:cSld>
-    <p:spTree>
-      <p:nvGrpSpPr>
-        <p:cNvPr id="1" name=""/>
-        <p:cNvGrpSpPr/>
-        <p:nvPr/>
-      </p:nvGrpSpPr>
-      <p:grpSpPr>
-        <a:xfrm>
-          <a:off x="0" y="0"/>
-          <a:ext cx="0" cy="0"/>
-          <a:chOff x="0" y="0"/>
-          <a:chExt cx="0" cy="0"/>
-        </a:xfrm>
-      </p:grpSpPr>
-      <p:sp>
-        <p:nvSpPr>
-          <p:cNvPr id="2" name="Titre 1"/>
-          <p:cNvSpPr>
-            <a:spLocks noGrp="1"/>
-          </p:cNvSpPr>
-          <p:nvPr>
-            <p:ph type="title"/>
-          </p:nvPr>
-        </p:nvSpPr>
-        <p:spPr>
-          <a:xfrm>
-            <a:off x="685355" y="481263"/>
-            <a:ext cx="8596668" cy="1320800"/>
-          </a:xfrm>
-        </p:spPr>
-        <p:txBody>
-          <a:bodyPr/>
-          <a:lstStyle/>
-          <a:p>
-            <a:r>
-              <a:rPr lang="fr-FR" dirty="0" smtClean="0"/>
-              <a:t>Segmentation</a:t>
-            </a:r>
-            <a:br>
-              <a:rPr lang="fr-FR" dirty="0" smtClean="0"/>
-            </a:br>
-            <a:endParaRPr lang="fr-FR" dirty="0"/>
-          </a:p>
-        </p:txBody>
-      </p:sp>
-      <p:sp>
-        <p:nvSpPr>
-          <p:cNvPr id="6" name="Espace réservé du contenu 5"/>
-          <p:cNvSpPr>
-            <a:spLocks noGrp="1"/>
-          </p:cNvSpPr>
-          <p:nvPr>
-            <p:ph idx="1"/>
-          </p:nvPr>
-        </p:nvSpPr>
-        <p:spPr/>
-        <p:txBody>
-          <a:bodyPr/>
-          <a:lstStyle/>
-          <a:p>
-            <a:endParaRPr lang="fr-FR"/>
-          </a:p>
-        </p:txBody>
-      </p:sp>
-      <p:sp>
-        <p:nvSpPr>
-          <p:cNvPr id="3" name="ZoneTexte 2"/>
-          <p:cNvSpPr txBox="1"/>
-          <p:nvPr/>
-        </p:nvSpPr>
-        <p:spPr>
-          <a:xfrm>
-            <a:off x="1123513" y="1427328"/>
-            <a:ext cx="7720351" cy="369332"/>
-          </a:xfrm>
-          <a:prstGeom prst="rect">
-            <a:avLst/>
-          </a:prstGeom>
-          <a:noFill/>
-        </p:spPr>
-        <p:txBody>
-          <a:bodyPr wrap="square" rtlCol="0">
-            <a:spAutoFit/>
-          </a:bodyPr>
-          <a:lstStyle/>
-          <a:p>
-            <a:r>
-              <a:rPr lang="fr-FR" dirty="0" err="1" smtClean="0">
-                <a:latin typeface="Agency FB" panose="020B0503020202020204" pitchFamily="34" charset="0"/>
-              </a:rPr>
-              <a:t>segmentData</a:t>
-            </a:r>
-            <a:r>
-              <a:rPr lang="fr-FR" dirty="0" smtClean="0">
-                <a:latin typeface="Agency FB" panose="020B0503020202020204" pitchFamily="34" charset="0"/>
-              </a:rPr>
-              <a:t>(data, </a:t>
-            </a:r>
-            <a:r>
-              <a:rPr lang="fr-FR" dirty="0" err="1">
-                <a:latin typeface="Agency FB" panose="020B0503020202020204" pitchFamily="34" charset="0"/>
-              </a:rPr>
-              <a:t>method</a:t>
-            </a:r>
-            <a:r>
-              <a:rPr lang="fr-FR" dirty="0">
-                <a:latin typeface="Agency FB" panose="020B0503020202020204" pitchFamily="34" charset="0"/>
-              </a:rPr>
-              <a:t>="</a:t>
-            </a:r>
-            <a:r>
-              <a:rPr lang="fr-FR" dirty="0" err="1">
-                <a:solidFill>
-                  <a:srgbClr val="FF0000"/>
-                </a:solidFill>
-                <a:latin typeface="Agency FB" panose="020B0503020202020204" pitchFamily="34" charset="0"/>
-              </a:rPr>
-              <a:t>DNAcopy</a:t>
-            </a:r>
-            <a:r>
-              <a:rPr lang="fr-FR" dirty="0">
-                <a:latin typeface="Agency FB" panose="020B0503020202020204" pitchFamily="34" charset="0"/>
-              </a:rPr>
-              <a:t>",</a:t>
-            </a:r>
-            <a:r>
-              <a:rPr lang="fr-FR" dirty="0" err="1">
-                <a:latin typeface="Agency FB" panose="020B0503020202020204" pitchFamily="34" charset="0"/>
-              </a:rPr>
-              <a:t>undo.splits</a:t>
-            </a:r>
-            <a:r>
-              <a:rPr lang="fr-FR" dirty="0">
-                <a:latin typeface="Agency FB" panose="020B0503020202020204" pitchFamily="34" charset="0"/>
-              </a:rPr>
-              <a:t>="</a:t>
-            </a:r>
-            <a:r>
-              <a:rPr lang="fr-FR" dirty="0" err="1">
-                <a:solidFill>
-                  <a:srgbClr val="FF0000"/>
-                </a:solidFill>
-                <a:latin typeface="Agency FB" panose="020B0503020202020204" pitchFamily="34" charset="0"/>
-              </a:rPr>
-              <a:t>sdundo</a:t>
-            </a:r>
-            <a:r>
-              <a:rPr lang="fr-FR" dirty="0">
-                <a:latin typeface="Agency FB" panose="020B0503020202020204" pitchFamily="34" charset="0"/>
-              </a:rPr>
-              <a:t>",undo.SD=</a:t>
-            </a:r>
-            <a:r>
-              <a:rPr lang="fr-FR" dirty="0">
-                <a:solidFill>
-                  <a:srgbClr val="FF0000"/>
-                </a:solidFill>
-                <a:latin typeface="Agency FB" panose="020B0503020202020204" pitchFamily="34" charset="0"/>
-              </a:rPr>
-              <a:t>3</a:t>
-            </a:r>
-            <a:r>
-              <a:rPr lang="fr-FR" dirty="0">
-                <a:latin typeface="Agency FB" panose="020B0503020202020204" pitchFamily="34" charset="0"/>
-              </a:rPr>
-              <a:t>, </a:t>
-            </a:r>
-            <a:r>
-              <a:rPr lang="fr-FR" dirty="0" err="1">
-                <a:latin typeface="Agency FB" panose="020B0503020202020204" pitchFamily="34" charset="0"/>
-              </a:rPr>
-              <a:t>clen</a:t>
-            </a:r>
-            <a:r>
-              <a:rPr lang="fr-FR" dirty="0">
-                <a:latin typeface="Agency FB" panose="020B0503020202020204" pitchFamily="34" charset="0"/>
-              </a:rPr>
-              <a:t>=</a:t>
-            </a:r>
-            <a:r>
-              <a:rPr lang="fr-FR" dirty="0">
-                <a:solidFill>
-                  <a:srgbClr val="FF0000"/>
-                </a:solidFill>
-                <a:latin typeface="Agency FB" panose="020B0503020202020204" pitchFamily="34" charset="0"/>
-              </a:rPr>
-              <a:t>10</a:t>
-            </a:r>
-            <a:r>
-              <a:rPr lang="fr-FR" dirty="0">
-                <a:latin typeface="Agency FB" panose="020B0503020202020204" pitchFamily="34" charset="0"/>
-              </a:rPr>
-              <a:t>, </a:t>
-            </a:r>
-            <a:r>
-              <a:rPr lang="fr-FR" dirty="0" err="1">
-                <a:latin typeface="Agency FB" panose="020B0503020202020204" pitchFamily="34" charset="0"/>
-              </a:rPr>
-              <a:t>relSDlong</a:t>
-            </a:r>
-            <a:r>
-              <a:rPr lang="fr-FR" dirty="0">
-                <a:latin typeface="Agency FB" panose="020B0503020202020204" pitchFamily="34" charset="0"/>
-              </a:rPr>
-              <a:t>=</a:t>
-            </a:r>
-            <a:r>
-              <a:rPr lang="fr-FR" dirty="0">
-                <a:solidFill>
-                  <a:srgbClr val="FF0000"/>
-                </a:solidFill>
-                <a:latin typeface="Agency FB" panose="020B0503020202020204" pitchFamily="34" charset="0"/>
-              </a:rPr>
-              <a:t>5</a:t>
-            </a:r>
-            <a:r>
-              <a:rPr lang="fr-FR" dirty="0">
-                <a:latin typeface="Agency FB" panose="020B0503020202020204" pitchFamily="34" charset="0"/>
-              </a:rPr>
-              <a:t>)</a:t>
-            </a:r>
-          </a:p>
-        </p:txBody>
-      </p:sp>
-    </p:spTree>
-    <p:extLst>
-      <p:ext uri="{BB962C8B-B14F-4D97-AF65-F5344CB8AC3E}">
-        <p14:creationId xmlns:p14="http://schemas.microsoft.com/office/powerpoint/2010/main" val="2768489143"/>
-      </p:ext>
-    </p:extLst>
-  </p:cSld>
-  <p:clrMapOvr>
-    <a:masterClrMapping/>
-  </p:clrMapOvr>
-  <p:timing>
-    <p:tnLst>
-      <p:par>
-        <p:cTn id="1" dur="indefinite" restart="never" nodeType="tmRoot"/>
-      </p:par>
-    </p:tnLst>
-  </p:timing>
-</p:sld>
-</file>
-
-<file path=ppt/slides/slide6.xml><?xml version="1.0" encoding="utf-8"?>
-<p:sld xmlns:a="http://schemas.openxmlformats.org/drawingml/2006/main" xmlns:r="http://schemas.openxmlformats.org/officeDocument/2006/relationships" xmlns:p="http://schemas.openxmlformats.org/presentationml/2006/main">
-  <p:cSld>
-    <p:spTree>
-      <p:nvGrpSpPr>
-        <p:cNvPr id="1" name=""/>
-        <p:cNvGrpSpPr/>
-        <p:nvPr/>
-      </p:nvGrpSpPr>
-      <p:grpSpPr>
-        <a:xfrm>
-          <a:off x="0" y="0"/>
-          <a:ext cx="0" cy="0"/>
-          <a:chOff x="0" y="0"/>
-          <a:chExt cx="0" cy="0"/>
-        </a:xfrm>
-      </p:grpSpPr>
-      <p:sp>
-        <p:nvSpPr>
-          <p:cNvPr id="2" name="Titre 1"/>
-          <p:cNvSpPr>
-            <a:spLocks noGrp="1"/>
-          </p:cNvSpPr>
-          <p:nvPr>
-            <p:ph type="title"/>
-          </p:nvPr>
-        </p:nvSpPr>
-        <p:spPr>
-          <a:xfrm>
-            <a:off x="685355" y="481263"/>
-            <a:ext cx="8596668" cy="1320800"/>
-          </a:xfrm>
-        </p:spPr>
-        <p:txBody>
-          <a:bodyPr>
-            <a:normAutofit fontScale="90000"/>
-          </a:bodyPr>
-          <a:lstStyle/>
-          <a:p>
-            <a:r>
-              <a:rPr lang="fr-FR" dirty="0" smtClean="0"/>
-              <a:t>Deuxième normalisation</a:t>
-            </a:r>
-            <a:br>
-              <a:rPr lang="fr-FR" dirty="0" smtClean="0"/>
-            </a:br>
-            <a:r>
-              <a:rPr lang="fr-FR" dirty="0" smtClean="0"/>
-              <a:t/>
-            </a:r>
-            <a:br>
-              <a:rPr lang="fr-FR" dirty="0" smtClean="0"/>
-            </a:br>
-            <a:endParaRPr lang="fr-FR" dirty="0"/>
-          </a:p>
-        </p:txBody>
-      </p:sp>
-      <p:sp>
-        <p:nvSpPr>
-          <p:cNvPr id="4" name="Espace réservé du contenu 3"/>
-          <p:cNvSpPr>
-            <a:spLocks noGrp="1"/>
-          </p:cNvSpPr>
-          <p:nvPr>
-            <p:ph idx="1"/>
-          </p:nvPr>
-        </p:nvSpPr>
-        <p:spPr/>
-        <p:txBody>
-          <a:bodyPr/>
-          <a:lstStyle/>
-          <a:p>
-            <a:endParaRPr lang="fr-FR" dirty="0"/>
-          </a:p>
-        </p:txBody>
-      </p:sp>
-      <p:sp>
-        <p:nvSpPr>
-          <p:cNvPr id="3" name="ZoneTexte 2"/>
-          <p:cNvSpPr txBox="1"/>
-          <p:nvPr/>
-        </p:nvSpPr>
-        <p:spPr>
-          <a:xfrm>
-            <a:off x="1123513" y="1427328"/>
-            <a:ext cx="7720351" cy="369332"/>
-          </a:xfrm>
-          <a:prstGeom prst="rect">
-            <a:avLst/>
-          </a:prstGeom>
-          <a:noFill/>
-        </p:spPr>
-        <p:txBody>
-          <a:bodyPr wrap="square" rtlCol="0">
-            <a:spAutoFit/>
-          </a:bodyPr>
-          <a:lstStyle/>
-          <a:p>
-            <a:r>
-              <a:rPr lang="fr-FR" dirty="0">
-                <a:latin typeface="Agency FB" panose="020B0503020202020204" pitchFamily="34" charset="0"/>
-              </a:rPr>
-              <a:t> </a:t>
-            </a:r>
-            <a:r>
-              <a:rPr lang="fr-FR" dirty="0" err="1" smtClean="0">
-                <a:latin typeface="Agency FB" panose="020B0503020202020204" pitchFamily="34" charset="0"/>
-              </a:rPr>
-              <a:t>postsegnormalize</a:t>
-            </a:r>
-            <a:r>
-              <a:rPr lang="fr-FR" dirty="0" smtClean="0">
-                <a:latin typeface="Agency FB" panose="020B0503020202020204" pitchFamily="34" charset="0"/>
-              </a:rPr>
-              <a:t>(data)</a:t>
-            </a:r>
-            <a:endParaRPr lang="fr-FR" dirty="0">
-              <a:latin typeface="Agency FB" panose="020B0503020202020204" pitchFamily="34" charset="0"/>
-            </a:endParaRPr>
-          </a:p>
-        </p:txBody>
-      </p:sp>
-    </p:spTree>
-    <p:extLst>
-      <p:ext uri="{BB962C8B-B14F-4D97-AF65-F5344CB8AC3E}">
-        <p14:creationId xmlns:p14="http://schemas.microsoft.com/office/powerpoint/2010/main" val="701775868"/>
       </p:ext>
     </p:extLst>
   </p:cSld>

</xml_diff>

<commit_message>
bergupdate: worked on oncoscanR
</commit_message>
<xml_diff>
--- a/docs/docs_I_made/slides/OncoscanR.pptx
+++ b/docs/docs_I_made/slides/OncoscanR.pptx
@@ -9,10 +9,16 @@
     <p:sldId id="267" r:id="rId3"/>
     <p:sldId id="261" r:id="rId4"/>
     <p:sldId id="266" r:id="rId5"/>
-    <p:sldId id="270" r:id="rId6"/>
-    <p:sldId id="268" r:id="rId7"/>
-    <p:sldId id="271" r:id="rId8"/>
-    <p:sldId id="269" r:id="rId9"/>
+    <p:sldId id="272" r:id="rId6"/>
+    <p:sldId id="273" r:id="rId7"/>
+    <p:sldId id="274" r:id="rId8"/>
+    <p:sldId id="268" r:id="rId9"/>
+    <p:sldId id="275" r:id="rId10"/>
+    <p:sldId id="276" r:id="rId11"/>
+    <p:sldId id="278" r:id="rId12"/>
+    <p:sldId id="277" r:id="rId13"/>
+    <p:sldId id="271" r:id="rId14"/>
+    <p:sldId id="269" r:id="rId15"/>
   </p:sldIdLst>
   <p:sldSz cx="12192000" cy="6858000"/>
   <p:notesSz cx="6858000" cy="9144000"/>
@@ -865,7 +871,7 @@
             <a:fld id="{B61BEF0D-F0BB-DE4B-95CE-6DB70DBA9567}" type="datetimeFigureOut">
               <a:rPr lang="en-US" smtClean="0"/>
               <a:pPr/>
-              <a:t>4/27/2022</a:t>
+              <a:t>4/28/2022</a:t>
             </a:fld>
             <a:endParaRPr lang="en-US" dirty="0"/>
           </a:p>
@@ -1118,7 +1124,7 @@
             <a:fld id="{B61BEF0D-F0BB-DE4B-95CE-6DB70DBA9567}" type="datetimeFigureOut">
               <a:rPr lang="en-US" smtClean="0"/>
               <a:pPr/>
-              <a:t>4/27/2022</a:t>
+              <a:t>4/28/2022</a:t>
             </a:fld>
             <a:endParaRPr lang="en-US" dirty="0"/>
           </a:p>
@@ -1434,7 +1440,7 @@
             <a:fld id="{B61BEF0D-F0BB-DE4B-95CE-6DB70DBA9567}" type="datetimeFigureOut">
               <a:rPr lang="en-US" smtClean="0"/>
               <a:pPr/>
-              <a:t>4/27/2022</a:t>
+              <a:t>4/28/2022</a:t>
             </a:fld>
             <a:endParaRPr lang="en-US" dirty="0"/>
           </a:p>
@@ -1769,7 +1775,7 @@
             <a:fld id="{B61BEF0D-F0BB-DE4B-95CE-6DB70DBA9567}" type="datetimeFigureOut">
               <a:rPr lang="en-US" smtClean="0"/>
               <a:pPr/>
-              <a:t>4/27/2022</a:t>
+              <a:t>4/28/2022</a:t>
             </a:fld>
             <a:endParaRPr lang="en-US" dirty="0"/>
           </a:p>
@@ -2085,7 +2091,7 @@
             <a:fld id="{B61BEF0D-F0BB-DE4B-95CE-6DB70DBA9567}" type="datetimeFigureOut">
               <a:rPr lang="en-US" smtClean="0"/>
               <a:pPr/>
-              <a:t>4/27/2022</a:t>
+              <a:t>4/28/2022</a:t>
             </a:fld>
             <a:endParaRPr lang="en-US" dirty="0"/>
           </a:p>
@@ -2480,7 +2486,7 @@
             <a:fld id="{B61BEF0D-F0BB-DE4B-95CE-6DB70DBA9567}" type="datetimeFigureOut">
               <a:rPr lang="en-US" smtClean="0"/>
               <a:pPr/>
-              <a:t>4/27/2022</a:t>
+              <a:t>4/28/2022</a:t>
             </a:fld>
             <a:endParaRPr lang="en-US" dirty="0"/>
           </a:p>
@@ -2651,7 +2657,7 @@
           <a:p>
             <a:fld id="{55C6B4A9-1611-4792-9094-5F34BCA07E0B}" type="datetimeFigureOut">
               <a:rPr lang="en-US" smtClean="0"/>
-              <a:t>4/27/2022</a:t>
+              <a:t>4/28/2022</a:t>
             </a:fld>
             <a:endParaRPr lang="en-US" dirty="0"/>
           </a:p>
@@ -2832,7 +2838,7 @@
             <a:fld id="{B61BEF0D-F0BB-DE4B-95CE-6DB70DBA9567}" type="datetimeFigureOut">
               <a:rPr lang="en-US" smtClean="0"/>
               <a:pPr/>
-              <a:t>4/27/2022</a:t>
+              <a:t>4/28/2022</a:t>
             </a:fld>
             <a:endParaRPr lang="en-US" dirty="0"/>
           </a:p>
@@ -3004,7 +3010,7 @@
             <a:fld id="{B61BEF0D-F0BB-DE4B-95CE-6DB70DBA9567}" type="datetimeFigureOut">
               <a:rPr lang="en-US" smtClean="0"/>
               <a:pPr/>
-              <a:t>4/27/2022</a:t>
+              <a:t>4/28/2022</a:t>
             </a:fld>
             <a:endParaRPr lang="en-US" dirty="0"/>
           </a:p>
@@ -3253,7 +3259,7 @@
             <a:fld id="{B61BEF0D-F0BB-DE4B-95CE-6DB70DBA9567}" type="datetimeFigureOut">
               <a:rPr lang="en-US" smtClean="0"/>
               <a:pPr/>
-              <a:t>4/27/2022</a:t>
+              <a:t>4/28/2022</a:t>
             </a:fld>
             <a:endParaRPr lang="en-US" dirty="0"/>
           </a:p>
@@ -3486,7 +3492,7 @@
           <a:p>
             <a:fld id="{EB712588-04B1-427B-82EE-E8DB90309F08}" type="datetimeFigureOut">
               <a:rPr lang="en-US" smtClean="0"/>
-              <a:t>4/27/2022</a:t>
+              <a:t>4/28/2022</a:t>
             </a:fld>
             <a:endParaRPr lang="en-US" dirty="0"/>
           </a:p>
@@ -3861,7 +3867,7 @@
             <a:fld id="{B61BEF0D-F0BB-DE4B-95CE-6DB70DBA9567}" type="datetimeFigureOut">
               <a:rPr lang="en-US" smtClean="0"/>
               <a:pPr/>
-              <a:t>4/27/2022</a:t>
+              <a:t>4/28/2022</a:t>
             </a:fld>
             <a:endParaRPr lang="en-US" dirty="0"/>
           </a:p>
@@ -3986,7 +3992,7 @@
             <a:fld id="{B61BEF0D-F0BB-DE4B-95CE-6DB70DBA9567}" type="datetimeFigureOut">
               <a:rPr lang="en-US" smtClean="0"/>
               <a:pPr/>
-              <a:t>4/27/2022</a:t>
+              <a:t>4/28/2022</a:t>
             </a:fld>
             <a:endParaRPr lang="en-US" dirty="0"/>
           </a:p>
@@ -4083,7 +4089,7 @@
             <a:fld id="{B61BEF0D-F0BB-DE4B-95CE-6DB70DBA9567}" type="datetimeFigureOut">
               <a:rPr lang="en-US" smtClean="0"/>
               <a:pPr/>
-              <a:t>4/27/2022</a:t>
+              <a:t>4/28/2022</a:t>
             </a:fld>
             <a:endParaRPr lang="en-US" dirty="0"/>
           </a:p>
@@ -4339,7 +4345,7 @@
           <a:p>
             <a:fld id="{42A54C80-263E-416B-A8E0-580EDEADCBDC}" type="datetimeFigureOut">
               <a:rPr lang="en-US" smtClean="0"/>
-              <a:t>4/27/2022</a:t>
+              <a:t>4/28/2022</a:t>
             </a:fld>
             <a:endParaRPr lang="en-US" dirty="0"/>
           </a:p>
@@ -4646,7 +4652,7 @@
             <a:fld id="{B61BEF0D-F0BB-DE4B-95CE-6DB70DBA9567}" type="datetimeFigureOut">
               <a:rPr lang="en-US" smtClean="0"/>
               <a:pPr/>
-              <a:t>4/27/2022</a:t>
+              <a:t>4/28/2022</a:t>
             </a:fld>
             <a:endParaRPr lang="en-US" dirty="0"/>
           </a:p>
@@ -5349,7 +5355,7 @@
             <a:fld id="{B61BEF0D-F0BB-DE4B-95CE-6DB70DBA9567}" type="datetimeFigureOut">
               <a:rPr lang="en-US" smtClean="0"/>
               <a:pPr/>
-              <a:t>4/27/2022</a:t>
+              <a:t>4/28/2022</a:t>
             </a:fld>
             <a:endParaRPr lang="en-US" dirty="0"/>
           </a:p>
@@ -5936,6 +5942,1194 @@
 </p:sld>
 </file>
 
+<file path=ppt/slides/slide10.xml><?xml version="1.0" encoding="utf-8"?>
+<p:sld xmlns:a="http://schemas.openxmlformats.org/drawingml/2006/main" xmlns:r="http://schemas.openxmlformats.org/officeDocument/2006/relationships" xmlns:p="http://schemas.openxmlformats.org/presentationml/2006/main">
+  <p:cSld>
+    <p:spTree>
+      <p:nvGrpSpPr>
+        <p:cNvPr id="1" name=""/>
+        <p:cNvGrpSpPr/>
+        <p:nvPr/>
+      </p:nvGrpSpPr>
+      <p:grpSpPr>
+        <a:xfrm>
+          <a:off x="0" y="0"/>
+          <a:ext cx="0" cy="0"/>
+          <a:chOff x="0" y="0"/>
+          <a:chExt cx="0" cy="0"/>
+        </a:xfrm>
+      </p:grpSpPr>
+      <p:sp>
+        <p:nvSpPr>
+          <p:cNvPr id="2" name="Titre 1"/>
+          <p:cNvSpPr>
+            <a:spLocks noGrp="1"/>
+          </p:cNvSpPr>
+          <p:nvPr>
+            <p:ph type="title"/>
+          </p:nvPr>
+        </p:nvSpPr>
+        <p:spPr>
+          <a:xfrm>
+            <a:off x="685355" y="481263"/>
+            <a:ext cx="8596668" cy="1320800"/>
+          </a:xfrm>
+        </p:spPr>
+        <p:txBody>
+          <a:bodyPr/>
+          <a:lstStyle/>
+          <a:p>
+            <a:r>
+              <a:rPr lang="fr-FR" dirty="0" smtClean="0"/>
+              <a:t>Calcul des altérations par bras</a:t>
+            </a:r>
+            <a:endParaRPr lang="fr-FR" dirty="0"/>
+          </a:p>
+        </p:txBody>
+      </p:sp>
+      <p:sp>
+        <p:nvSpPr>
+          <p:cNvPr id="11" name="Espace réservé du contenu 4"/>
+          <p:cNvSpPr>
+            <a:spLocks noGrp="1"/>
+          </p:cNvSpPr>
+          <p:nvPr>
+            <p:ph idx="1"/>
+          </p:nvPr>
+        </p:nvSpPr>
+        <p:spPr>
+          <a:xfrm>
+            <a:off x="685355" y="1219201"/>
+            <a:ext cx="10512034" cy="4501320"/>
+          </a:xfrm>
+        </p:spPr>
+        <p:txBody>
+          <a:bodyPr/>
+          <a:lstStyle/>
+          <a:p>
+            <a:endParaRPr lang="fr-FR" dirty="0" smtClean="0"/>
+          </a:p>
+        </p:txBody>
+      </p:sp>
+      <p:pic>
+        <p:nvPicPr>
+          <p:cNvPr id="7" name="Image 6"/>
+          <p:cNvPicPr>
+            <a:picLocks noChangeAspect="1"/>
+          </p:cNvPicPr>
+          <p:nvPr/>
+        </p:nvPicPr>
+        <p:blipFill rotWithShape="1">
+          <a:blip r:embed="rId2">
+            <a:extLst>
+              <a:ext uri="{28A0092B-C50C-407E-A947-70E740481C1C}">
+                <a14:useLocalDpi xmlns:a14="http://schemas.microsoft.com/office/drawing/2010/main" val="0"/>
+              </a:ext>
+            </a:extLst>
+          </a:blip>
+          <a:srcRect t="6198" b="62808"/>
+          <a:stretch/>
+        </p:blipFill>
+        <p:spPr>
+          <a:xfrm>
+            <a:off x="496688" y="1509561"/>
+            <a:ext cx="9393270" cy="2125579"/>
+          </a:xfrm>
+          <a:prstGeom prst="rect">
+            <a:avLst/>
+          </a:prstGeom>
+        </p:spPr>
+      </p:pic>
+      <p:pic>
+        <p:nvPicPr>
+          <p:cNvPr id="9" name="Image 8"/>
+          <p:cNvPicPr>
+            <a:picLocks noChangeAspect="1"/>
+          </p:cNvPicPr>
+          <p:nvPr/>
+        </p:nvPicPr>
+        <p:blipFill>
+          <a:blip r:embed="rId3">
+            <a:extLst>
+              <a:ext uri="{28A0092B-C50C-407E-A947-70E740481C1C}">
+                <a14:useLocalDpi xmlns:a14="http://schemas.microsoft.com/office/drawing/2010/main" val="0"/>
+              </a:ext>
+            </a:extLst>
+          </a:blip>
+          <a:stretch>
+            <a:fillRect/>
+          </a:stretch>
+        </p:blipFill>
+        <p:spPr>
+          <a:xfrm>
+            <a:off x="352927" y="3635140"/>
+            <a:ext cx="11397915" cy="3419375"/>
+          </a:xfrm>
+          <a:prstGeom prst="rect">
+            <a:avLst/>
+          </a:prstGeom>
+        </p:spPr>
+      </p:pic>
+      <p:sp>
+        <p:nvSpPr>
+          <p:cNvPr id="8" name="Accolade ouvrante 7"/>
+          <p:cNvSpPr/>
+          <p:nvPr/>
+        </p:nvSpPr>
+        <p:spPr>
+          <a:xfrm rot="16200000">
+            <a:off x="793820" y="3305562"/>
+            <a:ext cx="97723" cy="314652"/>
+          </a:xfrm>
+          <a:prstGeom prst="leftBrace">
+            <a:avLst/>
+          </a:prstGeom>
+          <a:ln>
+            <a:solidFill>
+              <a:schemeClr val="tx1"/>
+            </a:solidFill>
+          </a:ln>
+        </p:spPr>
+        <p:style>
+          <a:lnRef idx="1">
+            <a:schemeClr val="accent1"/>
+          </a:lnRef>
+          <a:fillRef idx="0">
+            <a:schemeClr val="accent1"/>
+          </a:fillRef>
+          <a:effectRef idx="0">
+            <a:schemeClr val="accent1"/>
+          </a:effectRef>
+          <a:fontRef idx="minor">
+            <a:schemeClr val="tx1"/>
+          </a:fontRef>
+        </p:style>
+        <p:txBody>
+          <a:bodyPr rtlCol="0" anchor="ctr"/>
+          <a:lstStyle/>
+          <a:p>
+            <a:pPr algn="ctr"/>
+            <a:endParaRPr lang="fr-FR"/>
+          </a:p>
+        </p:txBody>
+      </p:sp>
+      <p:sp>
+        <p:nvSpPr>
+          <p:cNvPr id="12" name="Accolade ouvrante 11"/>
+          <p:cNvSpPr/>
+          <p:nvPr/>
+        </p:nvSpPr>
+        <p:spPr>
+          <a:xfrm rot="16200000">
+            <a:off x="6077262" y="3234738"/>
+            <a:ext cx="206494" cy="361517"/>
+          </a:xfrm>
+          <a:prstGeom prst="leftBrace">
+            <a:avLst/>
+          </a:prstGeom>
+          <a:ln>
+            <a:solidFill>
+              <a:schemeClr val="tx1"/>
+            </a:solidFill>
+          </a:ln>
+        </p:spPr>
+        <p:style>
+          <a:lnRef idx="1">
+            <a:schemeClr val="accent1"/>
+          </a:lnRef>
+          <a:fillRef idx="0">
+            <a:schemeClr val="accent1"/>
+          </a:fillRef>
+          <a:effectRef idx="0">
+            <a:schemeClr val="accent1"/>
+          </a:effectRef>
+          <a:fontRef idx="minor">
+            <a:schemeClr val="tx1"/>
+          </a:fontRef>
+        </p:style>
+        <p:txBody>
+          <a:bodyPr rtlCol="0" anchor="ctr"/>
+          <a:lstStyle/>
+          <a:p>
+            <a:pPr algn="ctr"/>
+            <a:endParaRPr lang="fr-FR"/>
+          </a:p>
+        </p:txBody>
+      </p:sp>
+      <p:sp>
+        <p:nvSpPr>
+          <p:cNvPr id="13" name="Accolade ouvrante 12"/>
+          <p:cNvSpPr/>
+          <p:nvPr/>
+        </p:nvSpPr>
+        <p:spPr>
+          <a:xfrm rot="5400000">
+            <a:off x="6005304" y="3799519"/>
+            <a:ext cx="80214" cy="405975"/>
+          </a:xfrm>
+          <a:prstGeom prst="leftBrace">
+            <a:avLst/>
+          </a:prstGeom>
+          <a:ln>
+            <a:solidFill>
+              <a:schemeClr val="tx1"/>
+            </a:solidFill>
+          </a:ln>
+        </p:spPr>
+        <p:style>
+          <a:lnRef idx="1">
+            <a:schemeClr val="accent1"/>
+          </a:lnRef>
+          <a:fillRef idx="0">
+            <a:schemeClr val="accent1"/>
+          </a:fillRef>
+          <a:effectRef idx="0">
+            <a:schemeClr val="accent1"/>
+          </a:effectRef>
+          <a:fontRef idx="minor">
+            <a:schemeClr val="tx1"/>
+          </a:fontRef>
+        </p:style>
+        <p:txBody>
+          <a:bodyPr rtlCol="0" anchor="ctr"/>
+          <a:lstStyle/>
+          <a:p>
+            <a:pPr algn="ctr"/>
+            <a:endParaRPr lang="fr-FR"/>
+          </a:p>
+        </p:txBody>
+      </p:sp>
+      <p:sp>
+        <p:nvSpPr>
+          <p:cNvPr id="14" name="Rectangle 13"/>
+          <p:cNvSpPr/>
+          <p:nvPr/>
+        </p:nvSpPr>
+        <p:spPr>
+          <a:xfrm>
+            <a:off x="5834402" y="3727893"/>
+            <a:ext cx="1116330" cy="212916"/>
+          </a:xfrm>
+          <a:prstGeom prst="rect">
+            <a:avLst/>
+          </a:prstGeom>
+          <a:solidFill>
+            <a:schemeClr val="bg1"/>
+          </a:solidFill>
+          <a:ln>
+            <a:noFill/>
+          </a:ln>
+        </p:spPr>
+        <p:style>
+          <a:lnRef idx="2">
+            <a:schemeClr val="accent1">
+              <a:shade val="50000"/>
+            </a:schemeClr>
+          </a:lnRef>
+          <a:fillRef idx="1">
+            <a:schemeClr val="accent1"/>
+          </a:fillRef>
+          <a:effectRef idx="0">
+            <a:schemeClr val="accent1"/>
+          </a:effectRef>
+          <a:fontRef idx="minor">
+            <a:schemeClr val="lt1"/>
+          </a:fontRef>
+        </p:style>
+        <p:txBody>
+          <a:bodyPr rtlCol="0" anchor="ctr"/>
+          <a:lstStyle/>
+          <a:p>
+            <a:pPr algn="ctr"/>
+            <a:endParaRPr lang="fr-FR"/>
+          </a:p>
+        </p:txBody>
+      </p:sp>
+      <p:cxnSp>
+        <p:nvCxnSpPr>
+          <p:cNvPr id="16" name="Connecteur droit 15"/>
+          <p:cNvCxnSpPr/>
+          <p:nvPr/>
+        </p:nvCxnSpPr>
+        <p:spPr>
+          <a:xfrm>
+            <a:off x="842681" y="3573780"/>
+            <a:ext cx="452719" cy="1059180"/>
+          </a:xfrm>
+          <a:prstGeom prst="line">
+            <a:avLst/>
+          </a:prstGeom>
+          <a:ln>
+            <a:solidFill>
+              <a:schemeClr val="tx1"/>
+            </a:solidFill>
+          </a:ln>
+        </p:spPr>
+        <p:style>
+          <a:lnRef idx="1">
+            <a:schemeClr val="accent1"/>
+          </a:lnRef>
+          <a:fillRef idx="0">
+            <a:schemeClr val="accent1"/>
+          </a:fillRef>
+          <a:effectRef idx="0">
+            <a:schemeClr val="accent1"/>
+          </a:effectRef>
+          <a:fontRef idx="minor">
+            <a:schemeClr val="tx1"/>
+          </a:fontRef>
+        </p:style>
+      </p:cxnSp>
+      <p:cxnSp>
+        <p:nvCxnSpPr>
+          <p:cNvPr id="17" name="Connecteur droit 16"/>
+          <p:cNvCxnSpPr/>
+          <p:nvPr/>
+        </p:nvCxnSpPr>
+        <p:spPr>
+          <a:xfrm flipH="1">
+            <a:off x="6045411" y="3573780"/>
+            <a:ext cx="135098" cy="348114"/>
+          </a:xfrm>
+          <a:prstGeom prst="line">
+            <a:avLst/>
+          </a:prstGeom>
+          <a:ln>
+            <a:solidFill>
+              <a:schemeClr val="tx1"/>
+            </a:solidFill>
+          </a:ln>
+        </p:spPr>
+        <p:style>
+          <a:lnRef idx="1">
+            <a:schemeClr val="accent1"/>
+          </a:lnRef>
+          <a:fillRef idx="0">
+            <a:schemeClr val="accent1"/>
+          </a:fillRef>
+          <a:effectRef idx="0">
+            <a:schemeClr val="accent1"/>
+          </a:effectRef>
+          <a:fontRef idx="minor">
+            <a:schemeClr val="tx1"/>
+          </a:fontRef>
+        </p:style>
+      </p:cxnSp>
+    </p:spTree>
+    <p:extLst>
+      <p:ext uri="{BB962C8B-B14F-4D97-AF65-F5344CB8AC3E}">
+        <p14:creationId xmlns:p14="http://schemas.microsoft.com/office/powerpoint/2010/main" val="2725805367"/>
+      </p:ext>
+    </p:extLst>
+  </p:cSld>
+  <p:clrMapOvr>
+    <a:masterClrMapping/>
+  </p:clrMapOvr>
+  <p:timing>
+    <p:tnLst>
+      <p:par>
+        <p:cTn id="1" dur="indefinite" restart="never" nodeType="tmRoot"/>
+      </p:par>
+    </p:tnLst>
+  </p:timing>
+</p:sld>
+</file>
+
+<file path=ppt/slides/slide11.xml><?xml version="1.0" encoding="utf-8"?>
+<p:sld xmlns:a="http://schemas.openxmlformats.org/drawingml/2006/main" xmlns:r="http://schemas.openxmlformats.org/officeDocument/2006/relationships" xmlns:p="http://schemas.openxmlformats.org/presentationml/2006/main">
+  <p:cSld>
+    <p:spTree>
+      <p:nvGrpSpPr>
+        <p:cNvPr id="1" name=""/>
+        <p:cNvGrpSpPr/>
+        <p:nvPr/>
+      </p:nvGrpSpPr>
+      <p:grpSpPr>
+        <a:xfrm>
+          <a:off x="0" y="0"/>
+          <a:ext cx="0" cy="0"/>
+          <a:chOff x="0" y="0"/>
+          <a:chExt cx="0" cy="0"/>
+        </a:xfrm>
+      </p:grpSpPr>
+      <p:sp>
+        <p:nvSpPr>
+          <p:cNvPr id="2" name="Titre 1"/>
+          <p:cNvSpPr>
+            <a:spLocks noGrp="1"/>
+          </p:cNvSpPr>
+          <p:nvPr>
+            <p:ph type="title"/>
+          </p:nvPr>
+        </p:nvSpPr>
+        <p:spPr>
+          <a:xfrm>
+            <a:off x="685355" y="481263"/>
+            <a:ext cx="8596668" cy="1320800"/>
+          </a:xfrm>
+        </p:spPr>
+        <p:txBody>
+          <a:bodyPr/>
+          <a:lstStyle/>
+          <a:p>
+            <a:r>
+              <a:rPr lang="fr-FR" dirty="0" smtClean="0"/>
+              <a:t>Calcul des altérations par bras</a:t>
+            </a:r>
+            <a:endParaRPr lang="fr-FR" dirty="0"/>
+          </a:p>
+        </p:txBody>
+      </p:sp>
+      <p:sp>
+        <p:nvSpPr>
+          <p:cNvPr id="11" name="Espace réservé du contenu 4"/>
+          <p:cNvSpPr>
+            <a:spLocks noGrp="1"/>
+          </p:cNvSpPr>
+          <p:nvPr>
+            <p:ph idx="1"/>
+          </p:nvPr>
+        </p:nvSpPr>
+        <p:spPr>
+          <a:xfrm>
+            <a:off x="685355" y="1219201"/>
+            <a:ext cx="10512034" cy="4501320"/>
+          </a:xfrm>
+        </p:spPr>
+        <p:txBody>
+          <a:bodyPr/>
+          <a:lstStyle/>
+          <a:p>
+            <a:r>
+              <a:rPr lang="fr-FR" dirty="0" smtClean="0"/>
+              <a:t>Pour les échantillons 5,6 et 8, seules des pertes sont caractéris</a:t>
+            </a:r>
+            <a:r>
+              <a:rPr lang="fr-FR" dirty="0" smtClean="0"/>
+              <a:t>ées.</a:t>
+            </a:r>
+          </a:p>
+          <a:p>
+            <a:endParaRPr lang="fr-FR" dirty="0"/>
+          </a:p>
+          <a:p>
+            <a:endParaRPr lang="fr-FR" dirty="0" smtClean="0"/>
+          </a:p>
+        </p:txBody>
+      </p:sp>
+      <p:pic>
+        <p:nvPicPr>
+          <p:cNvPr id="3" name="Image 2"/>
+          <p:cNvPicPr>
+            <a:picLocks noChangeAspect="1"/>
+          </p:cNvPicPr>
+          <p:nvPr/>
+        </p:nvPicPr>
+        <p:blipFill>
+          <a:blip r:embed="rId2">
+            <a:extLst>
+              <a:ext uri="{28A0092B-C50C-407E-A947-70E740481C1C}">
+                <a14:useLocalDpi xmlns:a14="http://schemas.microsoft.com/office/drawing/2010/main" val="0"/>
+              </a:ext>
+            </a:extLst>
+          </a:blip>
+          <a:stretch>
+            <a:fillRect/>
+          </a:stretch>
+        </p:blipFill>
+        <p:spPr>
+          <a:xfrm>
+            <a:off x="8107084" y="2860843"/>
+            <a:ext cx="4018676" cy="3492000"/>
+          </a:xfrm>
+          <a:prstGeom prst="rect">
+            <a:avLst/>
+          </a:prstGeom>
+        </p:spPr>
+      </p:pic>
+      <p:pic>
+        <p:nvPicPr>
+          <p:cNvPr id="4" name="Image 3"/>
+          <p:cNvPicPr>
+            <a:picLocks noChangeAspect="1"/>
+          </p:cNvPicPr>
+          <p:nvPr/>
+        </p:nvPicPr>
+        <p:blipFill>
+          <a:blip r:embed="rId3">
+            <a:extLst>
+              <a:ext uri="{28A0092B-C50C-407E-A947-70E740481C1C}">
+                <a14:useLocalDpi xmlns:a14="http://schemas.microsoft.com/office/drawing/2010/main" val="0"/>
+              </a:ext>
+            </a:extLst>
+          </a:blip>
+          <a:stretch>
+            <a:fillRect/>
+          </a:stretch>
+        </p:blipFill>
+        <p:spPr>
+          <a:xfrm>
+            <a:off x="69732" y="2860843"/>
+            <a:ext cx="4018676" cy="3492000"/>
+          </a:xfrm>
+          <a:prstGeom prst="rect">
+            <a:avLst/>
+          </a:prstGeom>
+        </p:spPr>
+      </p:pic>
+      <p:pic>
+        <p:nvPicPr>
+          <p:cNvPr id="5" name="Image 4"/>
+          <p:cNvPicPr>
+            <a:picLocks noChangeAspect="1"/>
+          </p:cNvPicPr>
+          <p:nvPr/>
+        </p:nvPicPr>
+        <p:blipFill>
+          <a:blip r:embed="rId4">
+            <a:extLst>
+              <a:ext uri="{28A0092B-C50C-407E-A947-70E740481C1C}">
+                <a14:useLocalDpi xmlns:a14="http://schemas.microsoft.com/office/drawing/2010/main" val="0"/>
+              </a:ext>
+            </a:extLst>
+          </a:blip>
+          <a:stretch>
+            <a:fillRect/>
+          </a:stretch>
+        </p:blipFill>
+        <p:spPr>
+          <a:xfrm>
+            <a:off x="4088408" y="2860843"/>
+            <a:ext cx="4018676" cy="3492000"/>
+          </a:xfrm>
+          <a:prstGeom prst="rect">
+            <a:avLst/>
+          </a:prstGeom>
+        </p:spPr>
+      </p:pic>
+    </p:spTree>
+    <p:extLst>
+      <p:ext uri="{BB962C8B-B14F-4D97-AF65-F5344CB8AC3E}">
+        <p14:creationId xmlns:p14="http://schemas.microsoft.com/office/powerpoint/2010/main" val="2941855942"/>
+      </p:ext>
+    </p:extLst>
+  </p:cSld>
+  <p:clrMapOvr>
+    <a:masterClrMapping/>
+  </p:clrMapOvr>
+  <p:timing>
+    <p:tnLst>
+      <p:par>
+        <p:cTn id="1" dur="indefinite" restart="never" nodeType="tmRoot"/>
+      </p:par>
+    </p:tnLst>
+  </p:timing>
+</p:sld>
+</file>
+
+<file path=ppt/slides/slide12.xml><?xml version="1.0" encoding="utf-8"?>
+<p:sld xmlns:a="http://schemas.openxmlformats.org/drawingml/2006/main" xmlns:r="http://schemas.openxmlformats.org/officeDocument/2006/relationships" xmlns:p="http://schemas.openxmlformats.org/presentationml/2006/main">
+  <p:cSld>
+    <p:spTree>
+      <p:nvGrpSpPr>
+        <p:cNvPr id="1" name=""/>
+        <p:cNvGrpSpPr/>
+        <p:nvPr/>
+      </p:nvGrpSpPr>
+      <p:grpSpPr>
+        <a:xfrm>
+          <a:off x="0" y="0"/>
+          <a:ext cx="0" cy="0"/>
+          <a:chOff x="0" y="0"/>
+          <a:chExt cx="0" cy="0"/>
+        </a:xfrm>
+      </p:grpSpPr>
+      <p:sp>
+        <p:nvSpPr>
+          <p:cNvPr id="2" name="Titre 1"/>
+          <p:cNvSpPr>
+            <a:spLocks noGrp="1"/>
+          </p:cNvSpPr>
+          <p:nvPr>
+            <p:ph type="title"/>
+          </p:nvPr>
+        </p:nvSpPr>
+        <p:spPr>
+          <a:xfrm>
+            <a:off x="685355" y="481263"/>
+            <a:ext cx="8596668" cy="1320800"/>
+          </a:xfrm>
+        </p:spPr>
+        <p:txBody>
+          <a:bodyPr/>
+          <a:lstStyle/>
+          <a:p>
+            <a:r>
+              <a:rPr lang="fr-FR" dirty="0" smtClean="0"/>
+              <a:t>Limitations</a:t>
+            </a:r>
+            <a:endParaRPr lang="fr-FR" dirty="0"/>
+          </a:p>
+        </p:txBody>
+      </p:sp>
+      <p:sp>
+        <p:nvSpPr>
+          <p:cNvPr id="11" name="Espace réservé du contenu 4"/>
+          <p:cNvSpPr>
+            <a:spLocks noGrp="1"/>
+          </p:cNvSpPr>
+          <p:nvPr>
+            <p:ph idx="1"/>
+          </p:nvPr>
+        </p:nvSpPr>
+        <p:spPr>
+          <a:xfrm>
+            <a:off x="677334" y="1540043"/>
+            <a:ext cx="6611753" cy="4501320"/>
+          </a:xfrm>
+        </p:spPr>
+        <p:txBody>
+          <a:bodyPr/>
+          <a:lstStyle/>
+          <a:p>
+            <a:r>
+              <a:rPr lang="fr-FR" dirty="0" smtClean="0"/>
+              <a:t>Dans </a:t>
+            </a:r>
+            <a:r>
+              <a:rPr lang="fr-FR" dirty="0" err="1" smtClean="0"/>
+              <a:t>ChAS</a:t>
+            </a:r>
+            <a:r>
+              <a:rPr lang="fr-FR" dirty="0" smtClean="0"/>
+              <a:t>, certains échantillons n’ont qu’un segment. Utiliser les </a:t>
+            </a:r>
+            <a:r>
+              <a:rPr lang="fr-FR" dirty="0" err="1" smtClean="0"/>
+              <a:t>donneés</a:t>
+            </a:r>
+            <a:r>
+              <a:rPr lang="fr-FR" dirty="0" smtClean="0"/>
+              <a:t> segmentées d’un autre package à la place pourrait être intéressant.</a:t>
+            </a:r>
+          </a:p>
+          <a:p>
+            <a:endParaRPr lang="fr-FR" dirty="0" smtClean="0"/>
+          </a:p>
+          <a:p>
+            <a:endParaRPr lang="fr-FR" dirty="0"/>
+          </a:p>
+          <a:p>
+            <a:endParaRPr lang="fr-FR" dirty="0" smtClean="0"/>
+          </a:p>
+        </p:txBody>
+      </p:sp>
+      <p:pic>
+        <p:nvPicPr>
+          <p:cNvPr id="3" name="Image 2"/>
+          <p:cNvPicPr>
+            <a:picLocks noChangeAspect="1"/>
+          </p:cNvPicPr>
+          <p:nvPr/>
+        </p:nvPicPr>
+        <p:blipFill>
+          <a:blip r:embed="rId2">
+            <a:extLst>
+              <a:ext uri="{28A0092B-C50C-407E-A947-70E740481C1C}">
+                <a14:useLocalDpi xmlns:a14="http://schemas.microsoft.com/office/drawing/2010/main" val="0"/>
+              </a:ext>
+            </a:extLst>
+          </a:blip>
+          <a:stretch>
+            <a:fillRect/>
+          </a:stretch>
+        </p:blipFill>
+        <p:spPr>
+          <a:xfrm>
+            <a:off x="7289087" y="373380"/>
+            <a:ext cx="4426370" cy="3846263"/>
+          </a:xfrm>
+          <a:prstGeom prst="rect">
+            <a:avLst/>
+          </a:prstGeom>
+        </p:spPr>
+      </p:pic>
+      <p:pic>
+        <p:nvPicPr>
+          <p:cNvPr id="6" name="Image 5"/>
+          <p:cNvPicPr>
+            <a:picLocks noChangeAspect="1"/>
+          </p:cNvPicPr>
+          <p:nvPr/>
+        </p:nvPicPr>
+        <p:blipFill rotWithShape="1">
+          <a:blip r:embed="rId3">
+            <a:extLst>
+              <a:ext uri="{28A0092B-C50C-407E-A947-70E740481C1C}">
+                <a14:useLocalDpi xmlns:a14="http://schemas.microsoft.com/office/drawing/2010/main" val="0"/>
+              </a:ext>
+            </a:extLst>
+          </a:blip>
+          <a:srcRect t="5889" b="62666"/>
+          <a:stretch/>
+        </p:blipFill>
+        <p:spPr>
+          <a:xfrm>
+            <a:off x="461303" y="4455268"/>
+            <a:ext cx="11254154" cy="2156460"/>
+          </a:xfrm>
+          <a:prstGeom prst="rect">
+            <a:avLst/>
+          </a:prstGeom>
+        </p:spPr>
+      </p:pic>
+      <p:sp>
+        <p:nvSpPr>
+          <p:cNvPr id="8" name="Ellipse 7"/>
+          <p:cNvSpPr/>
+          <p:nvPr/>
+        </p:nvSpPr>
+        <p:spPr>
+          <a:xfrm>
+            <a:off x="8100060" y="5448300"/>
+            <a:ext cx="952500" cy="952500"/>
+          </a:xfrm>
+          <a:prstGeom prst="ellipse">
+            <a:avLst/>
+          </a:prstGeom>
+          <a:noFill/>
+          <a:ln>
+            <a:solidFill>
+              <a:srgbClr val="C00000"/>
+            </a:solidFill>
+          </a:ln>
+        </p:spPr>
+        <p:style>
+          <a:lnRef idx="2">
+            <a:schemeClr val="accent1">
+              <a:shade val="50000"/>
+            </a:schemeClr>
+          </a:lnRef>
+          <a:fillRef idx="1">
+            <a:schemeClr val="accent1"/>
+          </a:fillRef>
+          <a:effectRef idx="0">
+            <a:schemeClr val="accent1"/>
+          </a:effectRef>
+          <a:fontRef idx="minor">
+            <a:schemeClr val="lt1"/>
+          </a:fontRef>
+        </p:style>
+        <p:txBody>
+          <a:bodyPr rtlCol="0" anchor="ctr"/>
+          <a:lstStyle/>
+          <a:p>
+            <a:pPr algn="ctr"/>
+            <a:endParaRPr lang="fr-FR"/>
+          </a:p>
+        </p:txBody>
+      </p:sp>
+    </p:spTree>
+    <p:extLst>
+      <p:ext uri="{BB962C8B-B14F-4D97-AF65-F5344CB8AC3E}">
+        <p14:creationId xmlns:p14="http://schemas.microsoft.com/office/powerpoint/2010/main" val="2426788348"/>
+      </p:ext>
+    </p:extLst>
+  </p:cSld>
+  <p:clrMapOvr>
+    <a:masterClrMapping/>
+  </p:clrMapOvr>
+  <p:timing>
+    <p:tnLst>
+      <p:par>
+        <p:cTn id="1" dur="indefinite" restart="never" nodeType="tmRoot"/>
+      </p:par>
+    </p:tnLst>
+  </p:timing>
+</p:sld>
+</file>
+
+<file path=ppt/slides/slide13.xml><?xml version="1.0" encoding="utf-8"?>
+<p:sld xmlns:a="http://schemas.openxmlformats.org/drawingml/2006/main" xmlns:r="http://schemas.openxmlformats.org/officeDocument/2006/relationships" xmlns:p="http://schemas.openxmlformats.org/presentationml/2006/main">
+  <p:cSld>
+    <p:spTree>
+      <p:nvGrpSpPr>
+        <p:cNvPr id="1" name=""/>
+        <p:cNvGrpSpPr/>
+        <p:nvPr/>
+      </p:nvGrpSpPr>
+      <p:grpSpPr>
+        <a:xfrm>
+          <a:off x="0" y="0"/>
+          <a:ext cx="0" cy="0"/>
+          <a:chOff x="0" y="0"/>
+          <a:chExt cx="0" cy="0"/>
+        </a:xfrm>
+      </p:grpSpPr>
+      <p:sp>
+        <p:nvSpPr>
+          <p:cNvPr id="2" name="Titre 1"/>
+          <p:cNvSpPr>
+            <a:spLocks noGrp="1"/>
+          </p:cNvSpPr>
+          <p:nvPr>
+            <p:ph type="title"/>
+          </p:nvPr>
+        </p:nvSpPr>
+        <p:spPr>
+          <a:xfrm>
+            <a:off x="685355" y="481263"/>
+            <a:ext cx="8596668" cy="1320800"/>
+          </a:xfrm>
+        </p:spPr>
+        <p:txBody>
+          <a:bodyPr/>
+          <a:lstStyle/>
+          <a:p>
+            <a:r>
+              <a:rPr lang="fr-FR" dirty="0" smtClean="0"/>
+              <a:t>Calcul de scores</a:t>
+            </a:r>
+            <a:endParaRPr lang="fr-FR" dirty="0"/>
+          </a:p>
+        </p:txBody>
+      </p:sp>
+      <p:sp>
+        <p:nvSpPr>
+          <p:cNvPr id="17" name="Espace réservé du contenu 4"/>
+          <p:cNvSpPr>
+            <a:spLocks noGrp="1"/>
+          </p:cNvSpPr>
+          <p:nvPr>
+            <p:ph idx="1"/>
+          </p:nvPr>
+        </p:nvSpPr>
+        <p:spPr>
+          <a:xfrm>
+            <a:off x="677334" y="2160589"/>
+            <a:ext cx="10600266" cy="3880773"/>
+          </a:xfrm>
+        </p:spPr>
+        <p:txBody>
+          <a:bodyPr/>
+          <a:lstStyle/>
+          <a:p>
+            <a:r>
+              <a:rPr lang="fr-FR" dirty="0" smtClean="0"/>
+              <a:t>Copy </a:t>
+            </a:r>
+            <a:r>
+              <a:rPr lang="fr-FR" dirty="0" err="1" smtClean="0"/>
+              <a:t>number</a:t>
+            </a:r>
+            <a:r>
+              <a:rPr lang="fr-FR" dirty="0" smtClean="0"/>
+              <a:t> moyen</a:t>
+            </a:r>
+          </a:p>
+          <a:p>
+            <a:r>
+              <a:rPr lang="fr-FR" dirty="0" smtClean="0"/>
+              <a:t>WGD: Combien de fois le génome a été dupliqué</a:t>
+            </a:r>
+          </a:p>
+          <a:p>
+            <a:r>
+              <a:rPr lang="fr-FR" dirty="0" smtClean="0"/>
+              <a:t>Score LOH: Nombre de segments </a:t>
+            </a:r>
+            <a:r>
+              <a:rPr lang="fr-FR" dirty="0"/>
+              <a:t>LOH </a:t>
+            </a:r>
+            <a:r>
+              <a:rPr lang="fr-FR" dirty="0" smtClean="0"/>
+              <a:t>&gt;15Mbp, en excluant les chromosomes totalement LOH. </a:t>
+            </a:r>
+            <a:r>
+              <a:rPr lang="fr-FR" dirty="0" smtClean="0"/>
+              <a:t>Ce score est </a:t>
+            </a:r>
+            <a:r>
+              <a:rPr lang="fr-FR" dirty="0" smtClean="0"/>
+              <a:t>lié à la mutation des gènes BRCA.</a:t>
+            </a:r>
+          </a:p>
+          <a:p>
+            <a:r>
+              <a:rPr lang="fr-FR" dirty="0" smtClean="0"/>
+              <a:t>Score LST: nombre de LST (Large-</a:t>
+            </a:r>
+            <a:r>
+              <a:rPr lang="fr-FR" dirty="0" err="1" smtClean="0"/>
+              <a:t>scale</a:t>
+            </a:r>
+            <a:r>
+              <a:rPr lang="fr-FR" dirty="0" smtClean="0"/>
+              <a:t> State Transition). Un LST est un </a:t>
+            </a:r>
+            <a:r>
+              <a:rPr lang="fr-FR" dirty="0" err="1" smtClean="0"/>
+              <a:t>breakpoint</a:t>
+            </a:r>
+            <a:r>
+              <a:rPr lang="fr-FR" dirty="0" smtClean="0"/>
+              <a:t> entre deux régions de plus de 10 </a:t>
+            </a:r>
+            <a:r>
+              <a:rPr lang="fr-FR" dirty="0" err="1" smtClean="0"/>
+              <a:t>Mbp</a:t>
+            </a:r>
+            <a:r>
+              <a:rPr lang="fr-FR" dirty="0" smtClean="0"/>
+              <a:t> chacune</a:t>
+            </a:r>
+            <a:r>
+              <a:rPr lang="fr-FR" dirty="0" smtClean="0"/>
+              <a:t>. Ce score est </a:t>
+            </a:r>
+            <a:r>
+              <a:rPr lang="fr-FR" dirty="0"/>
+              <a:t>lié à la mutation des gènes BRCA</a:t>
+            </a:r>
+            <a:r>
+              <a:rPr lang="fr-FR" dirty="0" smtClean="0"/>
+              <a:t>.</a:t>
+            </a:r>
+          </a:p>
+          <a:p>
+            <a:r>
+              <a:rPr lang="fr-FR" dirty="0" smtClean="0"/>
+              <a:t>Score td: </a:t>
+            </a:r>
+            <a:r>
+              <a:rPr lang="fr-FR" dirty="0" smtClean="0"/>
+              <a:t>nombre de duplications en tandem. </a:t>
+            </a:r>
+            <a:endParaRPr lang="fr-FR" dirty="0"/>
+          </a:p>
+        </p:txBody>
+      </p:sp>
+    </p:spTree>
+    <p:extLst>
+      <p:ext uri="{BB962C8B-B14F-4D97-AF65-F5344CB8AC3E}">
+        <p14:creationId xmlns:p14="http://schemas.microsoft.com/office/powerpoint/2010/main" val="2135545804"/>
+      </p:ext>
+    </p:extLst>
+  </p:cSld>
+  <p:clrMapOvr>
+    <a:masterClrMapping/>
+  </p:clrMapOvr>
+  <p:timing>
+    <p:tnLst>
+      <p:par>
+        <p:cTn id="1" dur="indefinite" restart="never" nodeType="tmRoot"/>
+      </p:par>
+    </p:tnLst>
+  </p:timing>
+</p:sld>
+</file>
+
+<file path=ppt/slides/slide14.xml><?xml version="1.0" encoding="utf-8"?>
+<p:sld xmlns:a="http://schemas.openxmlformats.org/drawingml/2006/main" xmlns:r="http://schemas.openxmlformats.org/officeDocument/2006/relationships" xmlns:p="http://schemas.openxmlformats.org/presentationml/2006/main">
+  <p:cSld>
+    <p:spTree>
+      <p:nvGrpSpPr>
+        <p:cNvPr id="1" name=""/>
+        <p:cNvGrpSpPr/>
+        <p:nvPr/>
+      </p:nvGrpSpPr>
+      <p:grpSpPr>
+        <a:xfrm>
+          <a:off x="0" y="0"/>
+          <a:ext cx="0" cy="0"/>
+          <a:chOff x="0" y="0"/>
+          <a:chExt cx="0" cy="0"/>
+        </a:xfrm>
+      </p:grpSpPr>
+      <p:sp>
+        <p:nvSpPr>
+          <p:cNvPr id="2" name="Titre 1"/>
+          <p:cNvSpPr>
+            <a:spLocks noGrp="1"/>
+          </p:cNvSpPr>
+          <p:nvPr>
+            <p:ph type="title"/>
+          </p:nvPr>
+        </p:nvSpPr>
+        <p:spPr>
+          <a:xfrm>
+            <a:off x="685355" y="481263"/>
+            <a:ext cx="8596668" cy="1320800"/>
+          </a:xfrm>
+        </p:spPr>
+        <p:txBody>
+          <a:bodyPr/>
+          <a:lstStyle/>
+          <a:p>
+            <a:r>
+              <a:rPr lang="fr-FR" dirty="0" smtClean="0"/>
+              <a:t>Bibliographie</a:t>
+            </a:r>
+            <a:endParaRPr lang="fr-FR" dirty="0"/>
+          </a:p>
+        </p:txBody>
+      </p:sp>
+      <p:sp>
+        <p:nvSpPr>
+          <p:cNvPr id="5" name="Espace réservé du contenu 4"/>
+          <p:cNvSpPr>
+            <a:spLocks noGrp="1"/>
+          </p:cNvSpPr>
+          <p:nvPr>
+            <p:ph idx="1"/>
+          </p:nvPr>
+        </p:nvSpPr>
+        <p:spPr>
+          <a:xfrm>
+            <a:off x="677334" y="2160589"/>
+            <a:ext cx="10600266" cy="3880773"/>
+          </a:xfrm>
+        </p:spPr>
+        <p:txBody>
+          <a:bodyPr/>
+          <a:lstStyle/>
+          <a:p>
+            <a:r>
+              <a:rPr lang="fr-FR" dirty="0" smtClean="0"/>
+              <a:t>[1</a:t>
+            </a:r>
+            <a:r>
+              <a:rPr lang="fr-FR" dirty="0"/>
+              <a:t>] </a:t>
+            </a:r>
+            <a:r>
+              <a:rPr lang="fr-FR" dirty="0" err="1"/>
+              <a:t>Christinat</a:t>
+            </a:r>
+            <a:r>
+              <a:rPr lang="fr-FR" dirty="0"/>
+              <a:t> Y, </a:t>
+            </a:r>
+            <a:r>
+              <a:rPr lang="fr-FR" dirty="0" err="1"/>
+              <a:t>Chaskar</a:t>
+            </a:r>
+            <a:r>
+              <a:rPr lang="fr-FR" dirty="0"/>
+              <a:t> P, Clément S, Ho L, Charrier M, McKee T, </a:t>
+            </a:r>
+            <a:r>
+              <a:rPr lang="fr-FR" dirty="0" err="1"/>
+              <a:t>Tsantoulis</a:t>
+            </a:r>
+            <a:r>
+              <a:rPr lang="fr-FR" dirty="0"/>
+              <a:t> P. </a:t>
+            </a:r>
+            <a:r>
+              <a:rPr lang="fr-FR" dirty="0" err="1"/>
+              <a:t>Automated</a:t>
+            </a:r>
+            <a:r>
+              <a:rPr lang="fr-FR" dirty="0"/>
+              <a:t> </a:t>
+            </a:r>
+            <a:r>
+              <a:rPr lang="fr-FR" dirty="0" err="1"/>
+              <a:t>Detection</a:t>
+            </a:r>
+            <a:r>
+              <a:rPr lang="fr-FR" dirty="0"/>
+              <a:t> of Arm-</a:t>
+            </a:r>
+            <a:r>
+              <a:rPr lang="fr-FR" dirty="0" err="1"/>
+              <a:t>Level</a:t>
+            </a:r>
+            <a:r>
+              <a:rPr lang="fr-FR" dirty="0"/>
+              <a:t> </a:t>
+            </a:r>
+            <a:r>
+              <a:rPr lang="fr-FR" dirty="0" err="1"/>
+              <a:t>Alterations</a:t>
+            </a:r>
+            <a:r>
+              <a:rPr lang="fr-FR" dirty="0"/>
+              <a:t> for </a:t>
+            </a:r>
+            <a:r>
+              <a:rPr lang="fr-FR" dirty="0" err="1"/>
+              <a:t>Individual</a:t>
+            </a:r>
+            <a:r>
+              <a:rPr lang="fr-FR" dirty="0"/>
+              <a:t> Cancer Patients in the </a:t>
+            </a:r>
+            <a:r>
+              <a:rPr lang="fr-FR" dirty="0" err="1"/>
+              <a:t>Clinical</a:t>
+            </a:r>
+            <a:r>
+              <a:rPr lang="fr-FR" dirty="0"/>
+              <a:t> Setting. J Mol </a:t>
+            </a:r>
+            <a:r>
+              <a:rPr lang="fr-FR" dirty="0" err="1"/>
+              <a:t>Diagn</a:t>
+            </a:r>
+            <a:r>
+              <a:rPr lang="fr-FR" dirty="0"/>
+              <a:t>. 2021 Dec;23(12):1722-1731. </a:t>
+            </a:r>
+            <a:r>
+              <a:rPr lang="fr-FR" dirty="0" err="1"/>
+              <a:t>doi</a:t>
+            </a:r>
+            <a:r>
+              <a:rPr lang="fr-FR" dirty="0"/>
+              <a:t>: 10.1016/j.jmoldx.2021.08.003. </a:t>
+            </a:r>
+            <a:r>
+              <a:rPr lang="fr-FR" dirty="0" err="1"/>
+              <a:t>Epub</a:t>
+            </a:r>
+            <a:r>
+              <a:rPr lang="fr-FR" dirty="0"/>
+              <a:t> 2021 </a:t>
+            </a:r>
+            <a:r>
+              <a:rPr lang="fr-FR" dirty="0" err="1"/>
+              <a:t>Aug</a:t>
+            </a:r>
+            <a:r>
+              <a:rPr lang="fr-FR" dirty="0"/>
+              <a:t> 25. PMID: 34454110.</a:t>
+            </a:r>
+          </a:p>
+        </p:txBody>
+      </p:sp>
+    </p:spTree>
+    <p:extLst>
+      <p:ext uri="{BB962C8B-B14F-4D97-AF65-F5344CB8AC3E}">
+        <p14:creationId xmlns:p14="http://schemas.microsoft.com/office/powerpoint/2010/main" val="2754249394"/>
+      </p:ext>
+    </p:extLst>
+  </p:cSld>
+  <p:clrMapOvr>
+    <a:masterClrMapping/>
+  </p:clrMapOvr>
+  <p:timing>
+    <p:tnLst>
+      <p:par>
+        <p:cTn id="1" dur="indefinite" restart="never" nodeType="tmRoot"/>
+      </p:par>
+    </p:tnLst>
+  </p:timing>
+</p:sld>
+</file>
+
 <file path=ppt/slides/slide2.xml><?xml version="1.0" encoding="utf-8"?>
 <p:sld xmlns:a="http://schemas.openxmlformats.org/drawingml/2006/main" xmlns:r="http://schemas.openxmlformats.org/officeDocument/2006/relationships" xmlns:p="http://schemas.openxmlformats.org/presentationml/2006/main">
   <p:cSld>
@@ -6293,7 +7487,7 @@
         </p:blipFill>
         <p:spPr>
           <a:xfrm>
-            <a:off x="3525953" y="822022"/>
+            <a:off x="6758438" y="862128"/>
             <a:ext cx="4305901" cy="5534797"/>
           </a:xfrm>
           <a:prstGeom prst="rect">
@@ -6301,6 +7495,288 @@
           </a:prstGeom>
         </p:spPr>
       </p:pic>
+      <p:sp>
+        <p:nvSpPr>
+          <p:cNvPr id="5" name="Espace réservé du contenu 4"/>
+          <p:cNvSpPr txBox="1">
+            <a:spLocks/>
+          </p:cNvSpPr>
+          <p:nvPr/>
+        </p:nvSpPr>
+        <p:spPr>
+          <a:xfrm>
+            <a:off x="677334" y="2160589"/>
+            <a:ext cx="3958834" cy="3880773"/>
+          </a:xfrm>
+          <a:prstGeom prst="rect">
+            <a:avLst/>
+          </a:prstGeom>
+        </p:spPr>
+        <p:txBody>
+          <a:bodyPr/>
+          <a:lstStyle>
+            <a:lvl1pPr marL="342900" indent="-342900" algn="l" defTabSz="457200" rtl="0" eaLnBrk="1" latinLnBrk="0" hangingPunct="1">
+              <a:spcBef>
+                <a:spcPts val="1000"/>
+              </a:spcBef>
+              <a:spcAft>
+                <a:spcPts val="0"/>
+              </a:spcAft>
+              <a:buClr>
+                <a:schemeClr val="accent1"/>
+              </a:buClr>
+              <a:buSzPct val="80000"/>
+              <a:buFont typeface="Wingdings 3" charset="2"/>
+              <a:buChar char=""/>
+              <a:defRPr sz="1800" kern="1200">
+                <a:solidFill>
+                  <a:schemeClr val="tx1">
+                    <a:lumMod val="75000"/>
+                    <a:lumOff val="25000"/>
+                  </a:schemeClr>
+                </a:solidFill>
+                <a:latin typeface="+mn-lt"/>
+                <a:ea typeface="+mn-ea"/>
+                <a:cs typeface="+mn-cs"/>
+              </a:defRPr>
+            </a:lvl1pPr>
+            <a:lvl2pPr marL="742950" indent="-285750" algn="l" defTabSz="457200" rtl="0" eaLnBrk="1" latinLnBrk="0" hangingPunct="1">
+              <a:spcBef>
+                <a:spcPts val="1000"/>
+              </a:spcBef>
+              <a:spcAft>
+                <a:spcPts val="0"/>
+              </a:spcAft>
+              <a:buClr>
+                <a:schemeClr val="accent1"/>
+              </a:buClr>
+              <a:buSzPct val="80000"/>
+              <a:buFont typeface="Wingdings 3" charset="2"/>
+              <a:buChar char=""/>
+              <a:defRPr sz="1600" kern="1200">
+                <a:solidFill>
+                  <a:schemeClr val="tx1">
+                    <a:lumMod val="75000"/>
+                    <a:lumOff val="25000"/>
+                  </a:schemeClr>
+                </a:solidFill>
+                <a:latin typeface="+mn-lt"/>
+                <a:ea typeface="+mn-ea"/>
+                <a:cs typeface="+mn-cs"/>
+              </a:defRPr>
+            </a:lvl2pPr>
+            <a:lvl3pPr marL="1143000" indent="-228600" algn="l" defTabSz="457200" rtl="0" eaLnBrk="1" latinLnBrk="0" hangingPunct="1">
+              <a:spcBef>
+                <a:spcPts val="1000"/>
+              </a:spcBef>
+              <a:spcAft>
+                <a:spcPts val="0"/>
+              </a:spcAft>
+              <a:buClr>
+                <a:schemeClr val="accent1"/>
+              </a:buClr>
+              <a:buSzPct val="80000"/>
+              <a:buFont typeface="Wingdings 3" charset="2"/>
+              <a:buChar char=""/>
+              <a:defRPr sz="1400" kern="1200">
+                <a:solidFill>
+                  <a:schemeClr val="tx1">
+                    <a:lumMod val="75000"/>
+                    <a:lumOff val="25000"/>
+                  </a:schemeClr>
+                </a:solidFill>
+                <a:latin typeface="+mn-lt"/>
+                <a:ea typeface="+mn-ea"/>
+                <a:cs typeface="+mn-cs"/>
+              </a:defRPr>
+            </a:lvl3pPr>
+            <a:lvl4pPr marL="1600200" indent="-228600" algn="l" defTabSz="457200" rtl="0" eaLnBrk="1" latinLnBrk="0" hangingPunct="1">
+              <a:spcBef>
+                <a:spcPts val="1000"/>
+              </a:spcBef>
+              <a:spcAft>
+                <a:spcPts val="0"/>
+              </a:spcAft>
+              <a:buClr>
+                <a:schemeClr val="accent1"/>
+              </a:buClr>
+              <a:buSzPct val="80000"/>
+              <a:buFont typeface="Wingdings 3" charset="2"/>
+              <a:buChar char=""/>
+              <a:defRPr sz="1200" kern="1200">
+                <a:solidFill>
+                  <a:schemeClr val="tx1">
+                    <a:lumMod val="75000"/>
+                    <a:lumOff val="25000"/>
+                  </a:schemeClr>
+                </a:solidFill>
+                <a:latin typeface="+mn-lt"/>
+                <a:ea typeface="+mn-ea"/>
+                <a:cs typeface="+mn-cs"/>
+              </a:defRPr>
+            </a:lvl4pPr>
+            <a:lvl5pPr marL="2057400" indent="-228600" algn="l" defTabSz="457200" rtl="0" eaLnBrk="1" latinLnBrk="0" hangingPunct="1">
+              <a:spcBef>
+                <a:spcPts val="1000"/>
+              </a:spcBef>
+              <a:spcAft>
+                <a:spcPts val="0"/>
+              </a:spcAft>
+              <a:buClr>
+                <a:schemeClr val="accent1"/>
+              </a:buClr>
+              <a:buSzPct val="80000"/>
+              <a:buFont typeface="Wingdings 3" charset="2"/>
+              <a:buChar char=""/>
+              <a:defRPr sz="1200" kern="1200">
+                <a:solidFill>
+                  <a:schemeClr val="tx1">
+                    <a:lumMod val="75000"/>
+                    <a:lumOff val="25000"/>
+                  </a:schemeClr>
+                </a:solidFill>
+                <a:latin typeface="+mn-lt"/>
+                <a:ea typeface="+mn-ea"/>
+                <a:cs typeface="+mn-cs"/>
+              </a:defRPr>
+            </a:lvl5pPr>
+            <a:lvl6pPr marL="2514600" indent="-228600" algn="l" defTabSz="457200" rtl="0" eaLnBrk="1" latinLnBrk="0" hangingPunct="1">
+              <a:spcBef>
+                <a:spcPts val="1000"/>
+              </a:spcBef>
+              <a:spcAft>
+                <a:spcPts val="0"/>
+              </a:spcAft>
+              <a:buClr>
+                <a:schemeClr val="accent1"/>
+              </a:buClr>
+              <a:buSzPct val="80000"/>
+              <a:buFont typeface="Wingdings 3" charset="2"/>
+              <a:buChar char=""/>
+              <a:defRPr sz="1200" kern="1200">
+                <a:solidFill>
+                  <a:schemeClr val="tx1">
+                    <a:lumMod val="75000"/>
+                    <a:lumOff val="25000"/>
+                  </a:schemeClr>
+                </a:solidFill>
+                <a:latin typeface="+mn-lt"/>
+                <a:ea typeface="+mn-ea"/>
+                <a:cs typeface="+mn-cs"/>
+              </a:defRPr>
+            </a:lvl6pPr>
+            <a:lvl7pPr marL="2971800" indent="-228600" algn="l" defTabSz="457200" rtl="0" eaLnBrk="1" latinLnBrk="0" hangingPunct="1">
+              <a:spcBef>
+                <a:spcPts val="1000"/>
+              </a:spcBef>
+              <a:spcAft>
+                <a:spcPts val="0"/>
+              </a:spcAft>
+              <a:buClr>
+                <a:schemeClr val="accent1"/>
+              </a:buClr>
+              <a:buSzPct val="80000"/>
+              <a:buFont typeface="Wingdings 3" charset="2"/>
+              <a:buChar char=""/>
+              <a:defRPr sz="1200" kern="1200">
+                <a:solidFill>
+                  <a:schemeClr val="tx1">
+                    <a:lumMod val="75000"/>
+                    <a:lumOff val="25000"/>
+                  </a:schemeClr>
+                </a:solidFill>
+                <a:latin typeface="+mn-lt"/>
+                <a:ea typeface="+mn-ea"/>
+                <a:cs typeface="+mn-cs"/>
+              </a:defRPr>
+            </a:lvl7pPr>
+            <a:lvl8pPr marL="3429000" indent="-228600" algn="l" defTabSz="457200" rtl="0" eaLnBrk="1" latinLnBrk="0" hangingPunct="1">
+              <a:spcBef>
+                <a:spcPts val="1000"/>
+              </a:spcBef>
+              <a:spcAft>
+                <a:spcPts val="0"/>
+              </a:spcAft>
+              <a:buClr>
+                <a:schemeClr val="accent1"/>
+              </a:buClr>
+              <a:buSzPct val="80000"/>
+              <a:buFont typeface="Wingdings 3" charset="2"/>
+              <a:buChar char=""/>
+              <a:defRPr sz="1200" kern="1200">
+                <a:solidFill>
+                  <a:schemeClr val="tx1">
+                    <a:lumMod val="75000"/>
+                    <a:lumOff val="25000"/>
+                  </a:schemeClr>
+                </a:solidFill>
+                <a:latin typeface="+mn-lt"/>
+                <a:ea typeface="+mn-ea"/>
+                <a:cs typeface="+mn-cs"/>
+              </a:defRPr>
+            </a:lvl8pPr>
+            <a:lvl9pPr marL="3886200" indent="-228600" algn="l" defTabSz="457200" rtl="0" eaLnBrk="1" latinLnBrk="0" hangingPunct="1">
+              <a:spcBef>
+                <a:spcPts val="1000"/>
+              </a:spcBef>
+              <a:spcAft>
+                <a:spcPts val="0"/>
+              </a:spcAft>
+              <a:buClr>
+                <a:schemeClr val="accent1"/>
+              </a:buClr>
+              <a:buSzPct val="80000"/>
+              <a:buFont typeface="Wingdings 3" charset="2"/>
+              <a:buChar char=""/>
+              <a:defRPr sz="1200" kern="1200">
+                <a:solidFill>
+                  <a:schemeClr val="tx1">
+                    <a:lumMod val="75000"/>
+                    <a:lumOff val="25000"/>
+                  </a:schemeClr>
+                </a:solidFill>
+                <a:latin typeface="+mn-lt"/>
+                <a:ea typeface="+mn-ea"/>
+                <a:cs typeface="+mn-cs"/>
+              </a:defRPr>
+            </a:lvl9pPr>
+          </a:lstStyle>
+          <a:p>
+            <a:pPr marL="0" indent="0">
+              <a:buNone/>
+            </a:pPr>
+            <a:r>
+              <a:rPr lang="fr-FR" dirty="0" smtClean="0"/>
+              <a:t>Les segments observés dans </a:t>
+            </a:r>
+            <a:r>
+              <a:rPr lang="fr-FR" dirty="0" err="1" smtClean="0"/>
+              <a:t>ChAS</a:t>
+            </a:r>
+            <a:r>
+              <a:rPr lang="fr-FR" dirty="0" smtClean="0"/>
+              <a:t> sont exportés dans un fichier texte de cette structure.</a:t>
+            </a:r>
+          </a:p>
+          <a:p>
+            <a:pPr marL="0" indent="0">
+              <a:buNone/>
+            </a:pPr>
+            <a:r>
+              <a:rPr lang="fr-FR" dirty="0" smtClean="0"/>
+              <a:t>Seules 3 colonnes sont utilisées par </a:t>
+            </a:r>
+            <a:r>
+              <a:rPr lang="fr-FR" dirty="0" err="1" smtClean="0"/>
+              <a:t>OncoscanR</a:t>
+            </a:r>
+            <a:r>
+              <a:rPr lang="fr-FR" dirty="0" smtClean="0"/>
+              <a:t>.</a:t>
+            </a:r>
+          </a:p>
+        </p:txBody>
+      </p:sp>
     </p:spTree>
     <p:extLst>
       <p:ext uri="{BB962C8B-B14F-4D97-AF65-F5344CB8AC3E}">
@@ -6474,6 +7950,36 @@
           <a:chExt cx="0" cy="0"/>
         </a:xfrm>
       </p:grpSpPr>
+      <p:pic>
+        <p:nvPicPr>
+          <p:cNvPr id="10" name="Image 9"/>
+          <p:cNvPicPr>
+            <a:picLocks noChangeAspect="1"/>
+          </p:cNvPicPr>
+          <p:nvPr/>
+        </p:nvPicPr>
+        <p:blipFill>
+          <a:blip r:embed="rId2">
+            <a:extLst>
+              <a:ext uri="{28A0092B-C50C-407E-A947-70E740481C1C}">
+                <a14:useLocalDpi xmlns:a14="http://schemas.microsoft.com/office/drawing/2010/main" val="0"/>
+              </a:ext>
+            </a:extLst>
+          </a:blip>
+          <a:stretch>
+            <a:fillRect/>
+          </a:stretch>
+        </p:blipFill>
+        <p:spPr>
+          <a:xfrm>
+            <a:off x="352926" y="3298256"/>
+            <a:ext cx="11397916" cy="3419375"/>
+          </a:xfrm>
+          <a:prstGeom prst="rect">
+            <a:avLst/>
+          </a:prstGeom>
+        </p:spPr>
+      </p:pic>
       <p:sp>
         <p:nvSpPr>
           <p:cNvPr id="2" name="Titre 1"/>
@@ -6514,8 +8020,8 @@
         </p:nvSpPr>
         <p:spPr>
           <a:xfrm>
-            <a:off x="677334" y="2160589"/>
-            <a:ext cx="10600266" cy="3880773"/>
+            <a:off x="677334" y="1540043"/>
+            <a:ext cx="10512034" cy="4501320"/>
           </a:xfrm>
         </p:spPr>
         <p:txBody>
@@ -6524,22 +8030,51 @@
           <a:p>
             <a:r>
               <a:rPr lang="fr-FR" dirty="0" smtClean="0"/>
-              <a:t>Plot des chromosomes avec leur % d’aberration pour chaque type d’aberration:</a:t>
-            </a:r>
-          </a:p>
-          <a:p>
-            <a:r>
-              <a:rPr lang="fr-FR" dirty="0" smtClean="0"/>
-              <a:t>«  voici ce qu’on obtient. Mais comment?» -&gt; diapo suivante</a:t>
-            </a:r>
-            <a:endParaRPr lang="fr-FR" dirty="0"/>
+              <a:t>Pour chaque bras chromosomique, le pourcentage d’altération est déterminé:</a:t>
+            </a:r>
+          </a:p>
+          <a:p>
+            <a:pPr marL="0" indent="0">
+              <a:buNone/>
+            </a:pPr>
+            <a:endParaRPr lang="fr-FR" dirty="0" smtClean="0"/>
+          </a:p>
+        </p:txBody>
+      </p:sp>
+      <p:sp>
+        <p:nvSpPr>
+          <p:cNvPr id="9" name="ZoneTexte 8"/>
+          <p:cNvSpPr txBox="1"/>
+          <p:nvPr/>
+        </p:nvSpPr>
+        <p:spPr>
+          <a:xfrm rot="16200000">
+            <a:off x="-777124" y="4601617"/>
+            <a:ext cx="2322898" cy="261610"/>
+          </a:xfrm>
+          <a:prstGeom prst="rect">
+            <a:avLst/>
+          </a:prstGeom>
+          <a:noFill/>
+        </p:spPr>
+        <p:txBody>
+          <a:bodyPr wrap="square" rtlCol="0">
+            <a:spAutoFit/>
+          </a:bodyPr>
+          <a:lstStyle/>
+          <a:p>
+            <a:r>
+              <a:rPr lang="fr-FR" sz="1100" dirty="0" smtClean="0"/>
+              <a:t>Proportion de la longueur altérée</a:t>
+            </a:r>
+            <a:endParaRPr lang="fr-FR" sz="1100" dirty="0"/>
           </a:p>
         </p:txBody>
       </p:sp>
     </p:spTree>
     <p:extLst>
       <p:ext uri="{BB962C8B-B14F-4D97-AF65-F5344CB8AC3E}">
-        <p14:creationId xmlns:p14="http://schemas.microsoft.com/office/powerpoint/2010/main" val="3901231225"/>
+        <p14:creationId xmlns:p14="http://schemas.microsoft.com/office/powerpoint/2010/main" val="1391310647"/>
       </p:ext>
     </p:extLst>
   </p:cSld>
@@ -6573,526 +8108,104 @@
           <a:chExt cx="0" cy="0"/>
         </a:xfrm>
       </p:grpSpPr>
-      <p:sp>
-        <p:nvSpPr>
-          <p:cNvPr id="2" name="Titre 1"/>
-          <p:cNvSpPr>
-            <a:spLocks noGrp="1"/>
-          </p:cNvSpPr>
-          <p:nvPr>
-            <p:ph type="title"/>
-          </p:nvPr>
-        </p:nvSpPr>
-        <p:spPr>
-          <a:xfrm>
-            <a:off x="685355" y="481263"/>
-            <a:ext cx="8596668" cy="1320800"/>
-          </a:xfrm>
-        </p:spPr>
-        <p:txBody>
-          <a:bodyPr/>
-          <a:lstStyle/>
-          <a:p>
-            <a:r>
-              <a:rPr lang="fr-FR" dirty="0" smtClean="0"/>
-              <a:t>Calcul des altérations par bras</a:t>
-            </a:r>
-            <a:endParaRPr lang="fr-FR" dirty="0"/>
-          </a:p>
-        </p:txBody>
-      </p:sp>
-      <p:sp>
-        <p:nvSpPr>
-          <p:cNvPr id="5" name="Espace réservé du contenu 4"/>
-          <p:cNvSpPr>
-            <a:spLocks noGrp="1"/>
-          </p:cNvSpPr>
-          <p:nvPr>
-            <p:ph idx="1"/>
-          </p:nvPr>
-        </p:nvSpPr>
-        <p:spPr>
-          <a:xfrm>
-            <a:off x="677334" y="2160589"/>
-            <a:ext cx="10600266" cy="3880773"/>
-          </a:xfrm>
-        </p:spPr>
-        <p:txBody>
-          <a:bodyPr/>
-          <a:lstStyle/>
-          <a:p>
-            <a:r>
-              <a:rPr lang="fr-FR" dirty="0" smtClean="0"/>
-              <a:t>Un bras est dit altéré si ses </a:t>
-            </a:r>
-            <a:r>
-              <a:rPr lang="fr-FR" dirty="0" smtClean="0">
-                <a:solidFill>
-                  <a:srgbClr val="FFC000"/>
-                </a:solidFill>
-              </a:rPr>
-              <a:t>segments altérés </a:t>
-            </a:r>
-            <a:r>
-              <a:rPr lang="fr-FR" dirty="0" smtClean="0"/>
-              <a:t>représentent au moins 90% de sa </a:t>
-            </a:r>
-            <a:r>
-              <a:rPr lang="fr-FR" dirty="0" smtClean="0">
-                <a:solidFill>
-                  <a:srgbClr val="C00000"/>
-                </a:solidFill>
-              </a:rPr>
-              <a:t>longueur</a:t>
-            </a:r>
-          </a:p>
-          <a:p>
-            <a:r>
-              <a:rPr lang="fr-FR" dirty="0" smtClean="0"/>
-              <a:t>Ce calcul est fait pour chaque type d’altération</a:t>
-            </a:r>
-          </a:p>
-          <a:p>
-            <a:endParaRPr lang="fr-FR" dirty="0">
-              <a:solidFill>
-                <a:srgbClr val="C00000"/>
-              </a:solidFill>
-            </a:endParaRPr>
-          </a:p>
-        </p:txBody>
-      </p:sp>
       <p:pic>
         <p:nvPicPr>
-          <p:cNvPr id="3" name="Image 2"/>
+          <p:cNvPr id="6" name="Image 5"/>
           <p:cNvPicPr>
             <a:picLocks noChangeAspect="1"/>
           </p:cNvPicPr>
           <p:nvPr/>
         </p:nvPicPr>
         <p:blipFill>
-          <a:blip r:embed="rId2"/>
+          <a:blip r:embed="rId2">
+            <a:extLst>
+              <a:ext uri="{28A0092B-C50C-407E-A947-70E740481C1C}">
+                <a14:useLocalDpi xmlns:a14="http://schemas.microsoft.com/office/drawing/2010/main" val="0"/>
+              </a:ext>
+            </a:extLst>
+          </a:blip>
           <a:stretch>
             <a:fillRect/>
           </a:stretch>
         </p:blipFill>
         <p:spPr>
           <a:xfrm>
-            <a:off x="1480887" y="3662716"/>
-            <a:ext cx="9111916" cy="1579130"/>
+            <a:off x="352923" y="3298255"/>
+            <a:ext cx="11397920" cy="3419375"/>
           </a:xfrm>
           <a:prstGeom prst="rect">
             <a:avLst/>
           </a:prstGeom>
         </p:spPr>
       </p:pic>
-      <p:pic>
-        <p:nvPicPr>
-          <p:cNvPr id="4" name="Image 3"/>
-          <p:cNvPicPr>
-            <a:picLocks noChangeAspect="1"/>
-          </p:cNvPicPr>
-          <p:nvPr/>
-        </p:nvPicPr>
-        <p:blipFill>
-          <a:blip r:embed="rId3"/>
-          <a:stretch>
-            <a:fillRect/>
-          </a:stretch>
-        </p:blipFill>
+      <p:sp>
+        <p:nvSpPr>
+          <p:cNvPr id="2" name="Titre 1"/>
+          <p:cNvSpPr>
+            <a:spLocks noGrp="1"/>
+          </p:cNvSpPr>
+          <p:nvPr>
+            <p:ph type="title"/>
+          </p:nvPr>
+        </p:nvSpPr>
         <p:spPr>
           <a:xfrm>
-            <a:off x="442753" y="5243794"/>
-            <a:ext cx="3767297" cy="663925"/>
-          </a:xfrm>
-          <a:prstGeom prst="rect">
-            <a:avLst/>
-          </a:prstGeom>
-        </p:spPr>
-      </p:pic>
-      <p:cxnSp>
-        <p:nvCxnSpPr>
-          <p:cNvPr id="7" name="Connecteur droit 6"/>
-          <p:cNvCxnSpPr/>
-          <p:nvPr/>
-        </p:nvCxnSpPr>
-        <p:spPr>
-          <a:xfrm flipV="1">
-            <a:off x="3897229" y="4594860"/>
-            <a:ext cx="1204654" cy="774032"/>
-          </a:xfrm>
-          <a:prstGeom prst="line">
-            <a:avLst/>
-          </a:prstGeom>
-          <a:ln>
-            <a:prstDash val="sysDash"/>
-          </a:ln>
-        </p:spPr>
-        <p:style>
-          <a:lnRef idx="1">
-            <a:schemeClr val="dk1"/>
-          </a:lnRef>
-          <a:fillRef idx="0">
-            <a:schemeClr val="dk1"/>
-          </a:fillRef>
-          <a:effectRef idx="0">
-            <a:schemeClr val="dk1"/>
-          </a:effectRef>
-          <a:fontRef idx="minor">
-            <a:schemeClr val="tx1"/>
-          </a:fontRef>
-        </p:style>
-      </p:cxnSp>
-      <p:cxnSp>
-        <p:nvCxnSpPr>
-          <p:cNvPr id="8" name="Connecteur droit 7"/>
-          <p:cNvCxnSpPr/>
-          <p:nvPr/>
-        </p:nvCxnSpPr>
-        <p:spPr>
-          <a:xfrm flipH="1" flipV="1">
-            <a:off x="1609110" y="4594860"/>
-            <a:ext cx="955746" cy="767618"/>
-          </a:xfrm>
-          <a:prstGeom prst="line">
-            <a:avLst/>
-          </a:prstGeom>
-          <a:ln>
-            <a:prstDash val="sysDash"/>
-          </a:ln>
-        </p:spPr>
-        <p:style>
-          <a:lnRef idx="1">
-            <a:schemeClr val="dk1"/>
-          </a:lnRef>
-          <a:fillRef idx="0">
-            <a:schemeClr val="dk1"/>
-          </a:fillRef>
-          <a:effectRef idx="0">
-            <a:schemeClr val="dk1"/>
-          </a:effectRef>
-          <a:fontRef idx="minor">
-            <a:schemeClr val="tx1"/>
-          </a:fontRef>
-        </p:style>
-      </p:cxnSp>
-      <p:sp>
-        <p:nvSpPr>
-          <p:cNvPr id="14" name="ZoneTexte 13"/>
-          <p:cNvSpPr txBox="1"/>
-          <p:nvPr/>
+            <a:off x="685355" y="481263"/>
+            <a:ext cx="8596668" cy="1320800"/>
+          </a:xfrm>
+        </p:spPr>
+        <p:txBody>
+          <a:bodyPr/>
+          <a:lstStyle/>
+          <a:p>
+            <a:r>
+              <a:rPr lang="fr-FR" dirty="0" smtClean="0"/>
+              <a:t>Calcul des altérations par bras</a:t>
+            </a:r>
+            <a:endParaRPr lang="fr-FR" dirty="0"/>
+          </a:p>
+        </p:txBody>
+      </p:sp>
+      <p:sp>
+        <p:nvSpPr>
+          <p:cNvPr id="12" name="Espace réservé du contenu 4"/>
+          <p:cNvSpPr>
+            <a:spLocks noGrp="1"/>
+          </p:cNvSpPr>
+          <p:nvPr>
+            <p:ph idx="1"/>
+          </p:nvPr>
         </p:nvSpPr>
         <p:spPr>
           <a:xfrm>
-            <a:off x="10782300" y="4271695"/>
-            <a:ext cx="495300" cy="323165"/>
-          </a:xfrm>
-          <a:prstGeom prst="rect">
-            <a:avLst/>
-          </a:prstGeom>
-          <a:noFill/>
-        </p:spPr>
-        <p:txBody>
-          <a:bodyPr wrap="square" rtlCol="0">
-            <a:spAutoFit/>
-          </a:bodyPr>
-          <a:lstStyle/>
-          <a:p>
-            <a:r>
-              <a:rPr lang="fr-FR" sz="1500" dirty="0"/>
-              <a:t>[1]</a:t>
-            </a:r>
-          </a:p>
-        </p:txBody>
-      </p:sp>
-      <p:sp>
-        <p:nvSpPr>
-          <p:cNvPr id="16" name="Rectangle 15"/>
-          <p:cNvSpPr/>
-          <p:nvPr/>
-        </p:nvSpPr>
-        <p:spPr>
-          <a:xfrm>
-            <a:off x="6255017" y="3662716"/>
-            <a:ext cx="2095500" cy="1579130"/>
-          </a:xfrm>
-          <a:prstGeom prst="rect">
-            <a:avLst/>
-          </a:prstGeom>
-          <a:solidFill>
-            <a:schemeClr val="bg1"/>
-          </a:solidFill>
-          <a:ln>
-            <a:noFill/>
-          </a:ln>
-        </p:spPr>
-        <p:style>
-          <a:lnRef idx="2">
-            <a:schemeClr val="accent1">
-              <a:shade val="50000"/>
-            </a:schemeClr>
-          </a:lnRef>
-          <a:fillRef idx="1">
-            <a:schemeClr val="accent1"/>
-          </a:fillRef>
-          <a:effectRef idx="0">
-            <a:schemeClr val="accent1"/>
-          </a:effectRef>
-          <a:fontRef idx="minor">
-            <a:schemeClr val="lt1"/>
-          </a:fontRef>
-        </p:style>
-        <p:txBody>
-          <a:bodyPr rtlCol="0" anchor="ctr"/>
-          <a:lstStyle/>
-          <a:p>
-            <a:pPr algn="ctr"/>
-            <a:endParaRPr lang="fr-FR"/>
-          </a:p>
-        </p:txBody>
-      </p:sp>
-      <p:pic>
-        <p:nvPicPr>
-          <p:cNvPr id="15" name="Image 14"/>
-          <p:cNvPicPr>
-            <a:picLocks noChangeAspect="1"/>
-          </p:cNvPicPr>
-          <p:nvPr/>
-        </p:nvPicPr>
-        <p:blipFill rotWithShape="1">
-          <a:blip r:embed="rId2"/>
-          <a:srcRect l="53648" t="44553" r="25194" b="6227"/>
-          <a:stretch/>
-        </p:blipFill>
-        <p:spPr>
-          <a:xfrm>
-            <a:off x="6338837" y="4044657"/>
-            <a:ext cx="1927860" cy="777240"/>
-          </a:xfrm>
-          <a:prstGeom prst="rect">
-            <a:avLst/>
-          </a:prstGeom>
-        </p:spPr>
-      </p:pic>
-      <p:sp>
-        <p:nvSpPr>
-          <p:cNvPr id="19" name="Rectangle à coins arrondis 18"/>
-          <p:cNvSpPr/>
-          <p:nvPr/>
-        </p:nvSpPr>
-        <p:spPr>
-          <a:xfrm flipV="1">
-            <a:off x="7223031" y="4397692"/>
-            <a:ext cx="327386" cy="273366"/>
-          </a:xfrm>
-          <a:prstGeom prst="roundRect">
-            <a:avLst/>
-          </a:prstGeom>
-          <a:noFill/>
-          <a:ln>
-            <a:solidFill>
-              <a:srgbClr val="C00000"/>
-            </a:solidFill>
-          </a:ln>
-        </p:spPr>
-        <p:style>
-          <a:lnRef idx="2">
-            <a:schemeClr val="accent1">
-              <a:shade val="50000"/>
-            </a:schemeClr>
-          </a:lnRef>
-          <a:fillRef idx="1">
-            <a:schemeClr val="accent1"/>
-          </a:fillRef>
-          <a:effectRef idx="0">
-            <a:schemeClr val="accent1"/>
-          </a:effectRef>
-          <a:fontRef idx="minor">
-            <a:schemeClr val="lt1"/>
-          </a:fontRef>
-        </p:style>
-        <p:txBody>
-          <a:bodyPr rtlCol="0" anchor="ctr"/>
-          <a:lstStyle/>
-          <a:p>
-            <a:pPr algn="ctr"/>
-            <a:endParaRPr lang="fr-FR"/>
-          </a:p>
-        </p:txBody>
-      </p:sp>
-      <p:sp>
-        <p:nvSpPr>
-          <p:cNvPr id="20" name="Rectangle à coins arrondis 19"/>
-          <p:cNvSpPr/>
-          <p:nvPr/>
-        </p:nvSpPr>
-        <p:spPr>
-          <a:xfrm flipV="1">
-            <a:off x="4797357" y="3794611"/>
-            <a:ext cx="606226" cy="298743"/>
-          </a:xfrm>
-          <a:prstGeom prst="roundRect">
-            <a:avLst/>
-          </a:prstGeom>
-          <a:noFill/>
-          <a:ln>
-            <a:solidFill>
-              <a:srgbClr val="C00000"/>
-            </a:solidFill>
-          </a:ln>
-        </p:spPr>
-        <p:style>
-          <a:lnRef idx="2">
-            <a:schemeClr val="accent1">
-              <a:shade val="50000"/>
-            </a:schemeClr>
-          </a:lnRef>
-          <a:fillRef idx="1">
-            <a:schemeClr val="accent1"/>
-          </a:fillRef>
-          <a:effectRef idx="0">
-            <a:schemeClr val="accent1"/>
-          </a:effectRef>
-          <a:fontRef idx="minor">
-            <a:schemeClr val="lt1"/>
-          </a:fontRef>
-        </p:style>
-        <p:txBody>
-          <a:bodyPr rtlCol="0" anchor="ctr"/>
-          <a:lstStyle/>
-          <a:p>
-            <a:pPr algn="ctr"/>
-            <a:endParaRPr lang="fr-FR"/>
-          </a:p>
-        </p:txBody>
-      </p:sp>
-      <p:sp>
-        <p:nvSpPr>
-          <p:cNvPr id="21" name="Rectangle à coins arrondis 20"/>
-          <p:cNvSpPr/>
-          <p:nvPr/>
-        </p:nvSpPr>
-        <p:spPr>
-          <a:xfrm flipV="1">
-            <a:off x="7083611" y="4160519"/>
-            <a:ext cx="606226" cy="209849"/>
-          </a:xfrm>
-          <a:prstGeom prst="roundRect">
-            <a:avLst/>
-          </a:prstGeom>
-          <a:noFill/>
-          <a:ln>
-            <a:solidFill>
-              <a:srgbClr val="FFC000"/>
-            </a:solidFill>
-          </a:ln>
-        </p:spPr>
-        <p:style>
-          <a:lnRef idx="2">
-            <a:schemeClr val="accent1">
-              <a:shade val="50000"/>
-            </a:schemeClr>
-          </a:lnRef>
-          <a:fillRef idx="1">
-            <a:schemeClr val="accent1"/>
-          </a:fillRef>
-          <a:effectRef idx="0">
-            <a:schemeClr val="accent1"/>
-          </a:effectRef>
-          <a:fontRef idx="minor">
-            <a:schemeClr val="lt1"/>
-          </a:fontRef>
-        </p:style>
-        <p:txBody>
-          <a:bodyPr rtlCol="0" anchor="ctr"/>
-          <a:lstStyle/>
-          <a:p>
-            <a:pPr algn="ctr"/>
-            <a:endParaRPr lang="fr-FR"/>
-          </a:p>
-        </p:txBody>
-      </p:sp>
-      <p:sp>
-        <p:nvSpPr>
-          <p:cNvPr id="22" name="ZoneTexte 21"/>
-          <p:cNvSpPr txBox="1"/>
-          <p:nvPr/>
-        </p:nvSpPr>
-        <p:spPr>
-          <a:xfrm>
-            <a:off x="6442353" y="3301542"/>
-            <a:ext cx="1976744" cy="646331"/>
-          </a:xfrm>
-          <a:prstGeom prst="rect">
-            <a:avLst/>
-          </a:prstGeom>
-          <a:noFill/>
-        </p:spPr>
-        <p:txBody>
-          <a:bodyPr wrap="square" rtlCol="0">
-            <a:spAutoFit/>
-          </a:bodyPr>
-          <a:lstStyle/>
-          <a:p>
-            <a:pPr algn="ctr"/>
-            <a:r>
-              <a:rPr lang="fr-FR" dirty="0" smtClean="0">
-                <a:solidFill>
-                  <a:srgbClr val="FFC000"/>
-                </a:solidFill>
-              </a:rPr>
-              <a:t>Longueur des segments en gain</a:t>
-            </a:r>
-            <a:endParaRPr lang="fr-FR" dirty="0">
-              <a:solidFill>
-                <a:srgbClr val="FFC000"/>
-              </a:solidFill>
-            </a:endParaRPr>
-          </a:p>
-        </p:txBody>
-      </p:sp>
-      <p:sp>
-        <p:nvSpPr>
-          <p:cNvPr id="23" name="ZoneTexte 22"/>
-          <p:cNvSpPr txBox="1"/>
-          <p:nvPr/>
-        </p:nvSpPr>
-        <p:spPr>
-          <a:xfrm>
-            <a:off x="6398352" y="4821897"/>
-            <a:ext cx="1976744" cy="646331"/>
-          </a:xfrm>
-          <a:prstGeom prst="rect">
-            <a:avLst/>
-          </a:prstGeom>
-          <a:noFill/>
-        </p:spPr>
-        <p:txBody>
-          <a:bodyPr wrap="square" rtlCol="0">
-            <a:spAutoFit/>
-          </a:bodyPr>
-          <a:lstStyle/>
-          <a:p>
-            <a:pPr algn="ctr"/>
-            <a:r>
-              <a:rPr lang="fr-FR" dirty="0" smtClean="0">
-                <a:solidFill>
-                  <a:srgbClr val="C00000"/>
-                </a:solidFill>
-              </a:rPr>
-              <a:t>Longueur du chromosome</a:t>
-            </a:r>
-            <a:endParaRPr lang="fr-FR" dirty="0">
-              <a:solidFill>
-                <a:srgbClr val="C00000"/>
-              </a:solidFill>
-            </a:endParaRPr>
+            <a:off x="677334" y="1540043"/>
+            <a:ext cx="10512034" cy="4501320"/>
+          </a:xfrm>
+        </p:spPr>
+        <p:txBody>
+          <a:bodyPr/>
+          <a:lstStyle/>
+          <a:p>
+            <a:r>
+              <a:rPr lang="fr-FR" dirty="0" smtClean="0"/>
+              <a:t>Pour chaque bras chromosomique, le pourcentage d’altération est déterminé:</a:t>
+            </a:r>
+          </a:p>
+          <a:p>
+            <a:r>
+              <a:rPr lang="fr-FR" dirty="0"/>
+              <a:t>À 80%, on considère que le bras entier est altéré</a:t>
+            </a:r>
+          </a:p>
+          <a:p>
+            <a:endParaRPr lang="fr-FR" dirty="0" smtClean="0"/>
           </a:p>
         </p:txBody>
       </p:sp>
     </p:spTree>
     <p:extLst>
       <p:ext uri="{BB962C8B-B14F-4D97-AF65-F5344CB8AC3E}">
-        <p14:creationId xmlns:p14="http://schemas.microsoft.com/office/powerpoint/2010/main" val="3488270961"/>
+        <p14:creationId xmlns:p14="http://schemas.microsoft.com/office/powerpoint/2010/main" val="2557510421"/>
       </p:ext>
     </p:extLst>
   </p:cSld>
@@ -7126,6 +8239,36 @@
           <a:chExt cx="0" cy="0"/>
         </a:xfrm>
       </p:grpSpPr>
+      <p:pic>
+        <p:nvPicPr>
+          <p:cNvPr id="6" name="Image 5"/>
+          <p:cNvPicPr>
+            <a:picLocks noChangeAspect="1"/>
+          </p:cNvPicPr>
+          <p:nvPr/>
+        </p:nvPicPr>
+        <p:blipFill>
+          <a:blip r:embed="rId2">
+            <a:extLst>
+              <a:ext uri="{28A0092B-C50C-407E-A947-70E740481C1C}">
+                <a14:useLocalDpi xmlns:a14="http://schemas.microsoft.com/office/drawing/2010/main" val="0"/>
+              </a:ext>
+            </a:extLst>
+          </a:blip>
+          <a:stretch>
+            <a:fillRect/>
+          </a:stretch>
+        </p:blipFill>
+        <p:spPr>
+          <a:xfrm>
+            <a:off x="352927" y="3298256"/>
+            <a:ext cx="11397915" cy="3419375"/>
+          </a:xfrm>
+          <a:prstGeom prst="rect">
+            <a:avLst/>
+          </a:prstGeom>
+        </p:spPr>
+      </p:pic>
       <p:sp>
         <p:nvSpPr>
           <p:cNvPr id="2" name="Titre 1"/>
@@ -7148,7 +8291,7 @@
           <a:p>
             <a:r>
               <a:rPr lang="fr-FR" dirty="0" smtClean="0"/>
-              <a:t>Calcul de scores</a:t>
+              <a:t>Calcul des altérations par bras</a:t>
             </a:r>
             <a:endParaRPr lang="fr-FR" dirty="0"/>
           </a:p>
@@ -7156,7 +8299,7 @@
       </p:sp>
       <p:sp>
         <p:nvSpPr>
-          <p:cNvPr id="17" name="Espace réservé du contenu 4"/>
+          <p:cNvPr id="11" name="Espace réservé du contenu 4"/>
           <p:cNvSpPr>
             <a:spLocks noGrp="1"/>
           </p:cNvSpPr>
@@ -7166,8 +8309,8 @@
         </p:nvSpPr>
         <p:spPr>
           <a:xfrm>
-            <a:off x="677334" y="2160589"/>
-            <a:ext cx="10600266" cy="3880773"/>
+            <a:off x="677334" y="1540043"/>
+            <a:ext cx="10512034" cy="4501320"/>
           </a:xfrm>
         </p:spPr>
         <p:txBody>
@@ -7176,88 +8319,35 @@
           <a:p>
             <a:r>
               <a:rPr lang="fr-FR" dirty="0" smtClean="0"/>
-              <a:t>Copy </a:t>
-            </a:r>
-            <a:r>
-              <a:rPr lang="fr-FR" dirty="0" err="1" smtClean="0"/>
-              <a:t>number</a:t>
+              <a:t>Pour chaque bras chromosomique, le pourcentage d’altération est déterminé:</a:t>
+            </a:r>
+          </a:p>
+          <a:p>
+            <a:r>
+              <a:rPr lang="fr-FR" dirty="0"/>
+              <a:t>À 80%, on considère que le bras entier est </a:t>
             </a:r>
             <a:r>
               <a:rPr lang="fr-FR" dirty="0" smtClean="0"/>
-              <a:t> moyen</a:t>
+              <a:t>altéré.</a:t>
             </a:r>
           </a:p>
           <a:p>
             <a:r>
               <a:rPr lang="fr-FR" dirty="0" smtClean="0"/>
-              <a:t>WGD: Combien de fois le génome a été dupliqué</a:t>
-            </a:r>
-          </a:p>
-          <a:p>
-            <a:r>
-              <a:rPr lang="fr-FR" dirty="0" smtClean="0"/>
-              <a:t>Score LOH: Nombre de segments </a:t>
-            </a:r>
-            <a:r>
-              <a:rPr lang="fr-FR" dirty="0"/>
-              <a:t>LOH </a:t>
-            </a:r>
-            <a:r>
-              <a:rPr lang="fr-FR" dirty="0" smtClean="0"/>
-              <a:t>&gt;15Mbp, en excluant les chromosomes totalement LOH. Est lié à la mutation des gènes BRCA.</a:t>
-            </a:r>
-          </a:p>
-          <a:p>
-            <a:r>
-              <a:rPr lang="fr-FR" dirty="0" smtClean="0"/>
-              <a:t>Score LST: nombre de LST (Large-</a:t>
-            </a:r>
-            <a:r>
-              <a:rPr lang="fr-FR" dirty="0" err="1" smtClean="0"/>
-              <a:t>scale</a:t>
-            </a:r>
-            <a:r>
-              <a:rPr lang="fr-FR" dirty="0" smtClean="0"/>
-              <a:t> State Transition). Un LST est un </a:t>
-            </a:r>
-            <a:r>
-              <a:rPr lang="fr-FR" dirty="0" err="1" smtClean="0"/>
-              <a:t>breakpoint</a:t>
-            </a:r>
-            <a:r>
-              <a:rPr lang="fr-FR" dirty="0" smtClean="0"/>
-              <a:t> entre deux régions de plus de 10 </a:t>
-            </a:r>
-            <a:r>
-              <a:rPr lang="fr-FR" dirty="0" err="1" smtClean="0"/>
-              <a:t>Mbp</a:t>
-            </a:r>
-            <a:r>
-              <a:rPr lang="fr-FR" dirty="0" smtClean="0"/>
-              <a:t> chacune. </a:t>
-            </a:r>
-            <a:r>
-              <a:rPr lang="fr-FR" dirty="0"/>
-              <a:t>Est lié à la mutation des gènes BRCA</a:t>
-            </a:r>
-            <a:r>
-              <a:rPr lang="fr-FR" dirty="0" smtClean="0"/>
-              <a:t>.</a:t>
-            </a:r>
-          </a:p>
-          <a:p>
-            <a:r>
-              <a:rPr lang="fr-FR" dirty="0" smtClean="0"/>
-              <a:t>Score td: </a:t>
+              <a:t>Comment ce calcul est-il fait?</a:t>
             </a:r>
             <a:endParaRPr lang="fr-FR" dirty="0"/>
+          </a:p>
+          <a:p>
+            <a:endParaRPr lang="fr-FR" dirty="0" smtClean="0"/>
           </a:p>
         </p:txBody>
       </p:sp>
     </p:spTree>
     <p:extLst>
       <p:ext uri="{BB962C8B-B14F-4D97-AF65-F5344CB8AC3E}">
-        <p14:creationId xmlns:p14="http://schemas.microsoft.com/office/powerpoint/2010/main" val="2135545804"/>
+        <p14:creationId xmlns:p14="http://schemas.microsoft.com/office/powerpoint/2010/main" val="3897560058"/>
       </p:ext>
     </p:extLst>
   </p:cSld>
@@ -7313,7 +8403,7 @@
           <a:p>
             <a:r>
               <a:rPr lang="fr-FR" dirty="0" smtClean="0"/>
-              <a:t>Bibliographie</a:t>
+              <a:t>Calcul des altérations par bras</a:t>
             </a:r>
             <a:endParaRPr lang="fr-FR" dirty="0"/>
           </a:p>
@@ -7331,7 +8421,7 @@
         </p:nvSpPr>
         <p:spPr>
           <a:xfrm>
-            <a:off x="677334" y="2160589"/>
+            <a:off x="685355" y="1722329"/>
             <a:ext cx="10600266" cy="3880773"/>
           </a:xfrm>
         </p:spPr>
@@ -7341,123 +8431,1047 @@
           <a:p>
             <a:r>
               <a:rPr lang="fr-FR" dirty="0" smtClean="0"/>
-              <a:t>[1</a:t>
-            </a:r>
-            <a:r>
-              <a:rPr lang="fr-FR" dirty="0"/>
-              <a:t>] </a:t>
-            </a:r>
-            <a:r>
-              <a:rPr lang="fr-FR" dirty="0" err="1"/>
-              <a:t>Christinat</a:t>
-            </a:r>
-            <a:r>
-              <a:rPr lang="fr-FR" dirty="0"/>
-              <a:t> Y, </a:t>
-            </a:r>
-            <a:r>
-              <a:rPr lang="fr-FR" dirty="0" err="1"/>
-              <a:t>Chaskar</a:t>
-            </a:r>
-            <a:r>
-              <a:rPr lang="fr-FR" dirty="0"/>
-              <a:t> P, Clément S, Ho L, Charrier M, McKee T, </a:t>
-            </a:r>
-            <a:r>
-              <a:rPr lang="fr-FR" dirty="0" err="1"/>
-              <a:t>Tsantoulis</a:t>
-            </a:r>
-            <a:r>
-              <a:rPr lang="fr-FR" dirty="0"/>
-              <a:t> P. </a:t>
-            </a:r>
-            <a:r>
-              <a:rPr lang="fr-FR" dirty="0" err="1"/>
-              <a:t>Automated</a:t>
-            </a:r>
-            <a:r>
-              <a:rPr lang="fr-FR" dirty="0"/>
-              <a:t> </a:t>
-            </a:r>
-            <a:r>
-              <a:rPr lang="fr-FR" dirty="0" err="1"/>
-              <a:t>Detection</a:t>
-            </a:r>
-            <a:r>
-              <a:rPr lang="fr-FR" dirty="0"/>
-              <a:t> of Arm-</a:t>
-            </a:r>
-            <a:r>
-              <a:rPr lang="fr-FR" dirty="0" err="1"/>
-              <a:t>Level</a:t>
-            </a:r>
-            <a:r>
-              <a:rPr lang="fr-FR" dirty="0"/>
-              <a:t> </a:t>
-            </a:r>
-            <a:r>
-              <a:rPr lang="fr-FR" dirty="0" err="1"/>
-              <a:t>Alterations</a:t>
-            </a:r>
-            <a:r>
-              <a:rPr lang="fr-FR" dirty="0"/>
-              <a:t> for </a:t>
-            </a:r>
-            <a:r>
-              <a:rPr lang="fr-FR" dirty="0" err="1"/>
-              <a:t>Individual</a:t>
-            </a:r>
-            <a:r>
-              <a:rPr lang="fr-FR" dirty="0"/>
-              <a:t> Cancer Patients in the </a:t>
-            </a:r>
-            <a:r>
-              <a:rPr lang="fr-FR" dirty="0" err="1"/>
-              <a:t>Clinical</a:t>
-            </a:r>
-            <a:r>
-              <a:rPr lang="fr-FR" dirty="0"/>
-              <a:t> Setting. J Mol </a:t>
-            </a:r>
-            <a:r>
-              <a:rPr lang="fr-FR" dirty="0" err="1"/>
-              <a:t>Diagn</a:t>
-            </a:r>
-            <a:r>
-              <a:rPr lang="fr-FR" dirty="0"/>
-              <a:t>. 2021 Dec;23(12):1722-1731. </a:t>
-            </a:r>
-            <a:r>
-              <a:rPr lang="fr-FR" dirty="0" err="1"/>
-              <a:t>doi</a:t>
-            </a:r>
-            <a:r>
-              <a:rPr lang="fr-FR" dirty="0"/>
-              <a:t>: 10.1016/j.jmoldx.2021.08.003. </a:t>
-            </a:r>
-            <a:r>
-              <a:rPr lang="fr-FR" dirty="0" err="1"/>
-              <a:t>Epub</a:t>
-            </a:r>
-            <a:r>
-              <a:rPr lang="fr-FR" dirty="0"/>
-              <a:t> 2021 </a:t>
-            </a:r>
-            <a:r>
-              <a:rPr lang="fr-FR" dirty="0" err="1"/>
-              <a:t>Aug</a:t>
-            </a:r>
-            <a:r>
-              <a:rPr lang="fr-FR" dirty="0"/>
-              <a:t> 25. PMID: 34454110.</a:t>
-            </a:r>
+              <a:t>Exemple: 17q</a:t>
+            </a:r>
+          </a:p>
+          <a:p>
+            <a:r>
+              <a:rPr lang="fr-FR" dirty="0" smtClean="0"/>
+              <a:t>Ce bras est long de 57Mbp. Il présente deux segments, de 32 et 7 </a:t>
+            </a:r>
+            <a:r>
+              <a:rPr lang="fr-FR" dirty="0" err="1" smtClean="0"/>
+              <a:t>Mbp</a:t>
+            </a:r>
+            <a:r>
+              <a:rPr lang="fr-FR" dirty="0" smtClean="0"/>
+              <a:t>.</a:t>
+            </a:r>
+          </a:p>
+          <a:p>
+            <a:endParaRPr lang="fr-FR" dirty="0" smtClean="0"/>
+          </a:p>
+        </p:txBody>
+      </p:sp>
+      <p:pic>
+        <p:nvPicPr>
+          <p:cNvPr id="3" name="Image 2"/>
+          <p:cNvPicPr>
+            <a:picLocks noChangeAspect="1"/>
+          </p:cNvPicPr>
+          <p:nvPr/>
+        </p:nvPicPr>
+        <p:blipFill rotWithShape="1">
+          <a:blip r:embed="rId2"/>
+          <a:srcRect r="52960"/>
+          <a:stretch/>
+        </p:blipFill>
+        <p:spPr>
+          <a:xfrm>
+            <a:off x="1480887" y="3662716"/>
+            <a:ext cx="4286250" cy="1579130"/>
+          </a:xfrm>
+          <a:prstGeom prst="rect">
+            <a:avLst/>
+          </a:prstGeom>
+        </p:spPr>
+      </p:pic>
+      <p:pic>
+        <p:nvPicPr>
+          <p:cNvPr id="4" name="Image 3"/>
+          <p:cNvPicPr>
+            <a:picLocks noChangeAspect="1"/>
+          </p:cNvPicPr>
+          <p:nvPr/>
+        </p:nvPicPr>
+        <p:blipFill>
+          <a:blip r:embed="rId3"/>
+          <a:stretch>
+            <a:fillRect/>
+          </a:stretch>
+        </p:blipFill>
+        <p:spPr>
+          <a:xfrm>
+            <a:off x="442753" y="5243794"/>
+            <a:ext cx="3767297" cy="663925"/>
+          </a:xfrm>
+          <a:prstGeom prst="rect">
+            <a:avLst/>
+          </a:prstGeom>
+        </p:spPr>
+      </p:pic>
+      <p:cxnSp>
+        <p:nvCxnSpPr>
+          <p:cNvPr id="7" name="Connecteur droit 6"/>
+          <p:cNvCxnSpPr/>
+          <p:nvPr/>
+        </p:nvCxnSpPr>
+        <p:spPr>
+          <a:xfrm flipV="1">
+            <a:off x="3897229" y="4594860"/>
+            <a:ext cx="1204654" cy="774032"/>
+          </a:xfrm>
+          <a:prstGeom prst="line">
+            <a:avLst/>
+          </a:prstGeom>
+          <a:ln>
+            <a:prstDash val="sysDash"/>
+          </a:ln>
+        </p:spPr>
+        <p:style>
+          <a:lnRef idx="1">
+            <a:schemeClr val="dk1"/>
+          </a:lnRef>
+          <a:fillRef idx="0">
+            <a:schemeClr val="dk1"/>
+          </a:fillRef>
+          <a:effectRef idx="0">
+            <a:schemeClr val="dk1"/>
+          </a:effectRef>
+          <a:fontRef idx="minor">
+            <a:schemeClr val="tx1"/>
+          </a:fontRef>
+        </p:style>
+      </p:cxnSp>
+      <p:cxnSp>
+        <p:nvCxnSpPr>
+          <p:cNvPr id="8" name="Connecteur droit 7"/>
+          <p:cNvCxnSpPr/>
+          <p:nvPr/>
+        </p:nvCxnSpPr>
+        <p:spPr>
+          <a:xfrm flipH="1" flipV="1">
+            <a:off x="1609110" y="4594860"/>
+            <a:ext cx="955746" cy="767618"/>
+          </a:xfrm>
+          <a:prstGeom prst="line">
+            <a:avLst/>
+          </a:prstGeom>
+          <a:ln>
+            <a:prstDash val="sysDash"/>
+          </a:ln>
+        </p:spPr>
+        <p:style>
+          <a:lnRef idx="1">
+            <a:schemeClr val="dk1"/>
+          </a:lnRef>
+          <a:fillRef idx="0">
+            <a:schemeClr val="dk1"/>
+          </a:fillRef>
+          <a:effectRef idx="0">
+            <a:schemeClr val="dk1"/>
+          </a:effectRef>
+          <a:fontRef idx="minor">
+            <a:schemeClr val="tx1"/>
+          </a:fontRef>
+        </p:style>
+      </p:cxnSp>
+      <p:sp>
+        <p:nvSpPr>
+          <p:cNvPr id="20" name="Rectangle à coins arrondis 19"/>
+          <p:cNvSpPr/>
+          <p:nvPr/>
+        </p:nvSpPr>
+        <p:spPr>
+          <a:xfrm flipV="1">
+            <a:off x="4797357" y="3794611"/>
+            <a:ext cx="606226" cy="298743"/>
+          </a:xfrm>
+          <a:prstGeom prst="roundRect">
+            <a:avLst/>
+          </a:prstGeom>
+          <a:noFill/>
+          <a:ln>
+            <a:solidFill>
+              <a:srgbClr val="C00000"/>
+            </a:solidFill>
+          </a:ln>
+        </p:spPr>
+        <p:style>
+          <a:lnRef idx="2">
+            <a:schemeClr val="accent1">
+              <a:shade val="50000"/>
+            </a:schemeClr>
+          </a:lnRef>
+          <a:fillRef idx="1">
+            <a:schemeClr val="accent1"/>
+          </a:fillRef>
+          <a:effectRef idx="0">
+            <a:schemeClr val="accent1"/>
+          </a:effectRef>
+          <a:fontRef idx="minor">
+            <a:schemeClr val="lt1"/>
+          </a:fontRef>
+        </p:style>
+        <p:txBody>
+          <a:bodyPr rtlCol="0" anchor="ctr"/>
+          <a:lstStyle/>
+          <a:p>
+            <a:pPr algn="ctr"/>
+            <a:endParaRPr lang="fr-FR"/>
           </a:p>
         </p:txBody>
       </p:sp>
     </p:spTree>
     <p:extLst>
       <p:ext uri="{BB962C8B-B14F-4D97-AF65-F5344CB8AC3E}">
-        <p14:creationId xmlns:p14="http://schemas.microsoft.com/office/powerpoint/2010/main" val="2754249394"/>
+        <p14:creationId xmlns:p14="http://schemas.microsoft.com/office/powerpoint/2010/main" val="3488270961"/>
+      </p:ext>
+    </p:extLst>
+  </p:cSld>
+  <p:clrMapOvr>
+    <a:masterClrMapping/>
+  </p:clrMapOvr>
+  <p:timing>
+    <p:tnLst>
+      <p:par>
+        <p:cTn id="1" dur="indefinite" restart="never" nodeType="tmRoot"/>
+      </p:par>
+    </p:tnLst>
+  </p:timing>
+</p:sld>
+</file>
+
+<file path=ppt/slides/slide9.xml><?xml version="1.0" encoding="utf-8"?>
+<p:sld xmlns:a="http://schemas.openxmlformats.org/drawingml/2006/main" xmlns:r="http://schemas.openxmlformats.org/officeDocument/2006/relationships" xmlns:p="http://schemas.openxmlformats.org/presentationml/2006/main">
+  <p:cSld>
+    <p:spTree>
+      <p:nvGrpSpPr>
+        <p:cNvPr id="1" name=""/>
+        <p:cNvGrpSpPr/>
+        <p:nvPr/>
+      </p:nvGrpSpPr>
+      <p:grpSpPr>
+        <a:xfrm>
+          <a:off x="0" y="0"/>
+          <a:ext cx="0" cy="0"/>
+          <a:chOff x="0" y="0"/>
+          <a:chExt cx="0" cy="0"/>
+        </a:xfrm>
+      </p:grpSpPr>
+      <p:sp>
+        <p:nvSpPr>
+          <p:cNvPr id="2" name="Titre 1"/>
+          <p:cNvSpPr>
+            <a:spLocks noGrp="1"/>
+          </p:cNvSpPr>
+          <p:nvPr>
+            <p:ph type="title"/>
+          </p:nvPr>
+        </p:nvSpPr>
+        <p:spPr>
+          <a:xfrm>
+            <a:off x="685355" y="481263"/>
+            <a:ext cx="8596668" cy="1320800"/>
+          </a:xfrm>
+        </p:spPr>
+        <p:txBody>
+          <a:bodyPr/>
+          <a:lstStyle/>
+          <a:p>
+            <a:r>
+              <a:rPr lang="fr-FR" dirty="0" smtClean="0"/>
+              <a:t>Calcul des altérations par bras</a:t>
+            </a:r>
+            <a:endParaRPr lang="fr-FR" dirty="0"/>
+          </a:p>
+        </p:txBody>
+      </p:sp>
+      <p:pic>
+        <p:nvPicPr>
+          <p:cNvPr id="3" name="Image 2"/>
+          <p:cNvPicPr>
+            <a:picLocks noChangeAspect="1"/>
+          </p:cNvPicPr>
+          <p:nvPr/>
+        </p:nvPicPr>
+        <p:blipFill>
+          <a:blip r:embed="rId2"/>
+          <a:stretch>
+            <a:fillRect/>
+          </a:stretch>
+        </p:blipFill>
+        <p:spPr>
+          <a:xfrm>
+            <a:off x="1480887" y="3662716"/>
+            <a:ext cx="9111916" cy="1579130"/>
+          </a:xfrm>
+          <a:prstGeom prst="rect">
+            <a:avLst/>
+          </a:prstGeom>
+        </p:spPr>
+      </p:pic>
+      <p:pic>
+        <p:nvPicPr>
+          <p:cNvPr id="4" name="Image 3"/>
+          <p:cNvPicPr>
+            <a:picLocks noChangeAspect="1"/>
+          </p:cNvPicPr>
+          <p:nvPr/>
+        </p:nvPicPr>
+        <p:blipFill>
+          <a:blip r:embed="rId3"/>
+          <a:stretch>
+            <a:fillRect/>
+          </a:stretch>
+        </p:blipFill>
+        <p:spPr>
+          <a:xfrm>
+            <a:off x="442753" y="5243794"/>
+            <a:ext cx="3767297" cy="663925"/>
+          </a:xfrm>
+          <a:prstGeom prst="rect">
+            <a:avLst/>
+          </a:prstGeom>
+        </p:spPr>
+      </p:pic>
+      <p:cxnSp>
+        <p:nvCxnSpPr>
+          <p:cNvPr id="7" name="Connecteur droit 6"/>
+          <p:cNvCxnSpPr/>
+          <p:nvPr/>
+        </p:nvCxnSpPr>
+        <p:spPr>
+          <a:xfrm flipV="1">
+            <a:off x="3897229" y="4594860"/>
+            <a:ext cx="1204654" cy="774032"/>
+          </a:xfrm>
+          <a:prstGeom prst="line">
+            <a:avLst/>
+          </a:prstGeom>
+          <a:ln>
+            <a:prstDash val="sysDash"/>
+          </a:ln>
+        </p:spPr>
+        <p:style>
+          <a:lnRef idx="1">
+            <a:schemeClr val="dk1"/>
+          </a:lnRef>
+          <a:fillRef idx="0">
+            <a:schemeClr val="dk1"/>
+          </a:fillRef>
+          <a:effectRef idx="0">
+            <a:schemeClr val="dk1"/>
+          </a:effectRef>
+          <a:fontRef idx="minor">
+            <a:schemeClr val="tx1"/>
+          </a:fontRef>
+        </p:style>
+      </p:cxnSp>
+      <p:cxnSp>
+        <p:nvCxnSpPr>
+          <p:cNvPr id="8" name="Connecteur droit 7"/>
+          <p:cNvCxnSpPr/>
+          <p:nvPr/>
+        </p:nvCxnSpPr>
+        <p:spPr>
+          <a:xfrm flipH="1" flipV="1">
+            <a:off x="1609110" y="4594860"/>
+            <a:ext cx="955746" cy="767618"/>
+          </a:xfrm>
+          <a:prstGeom prst="line">
+            <a:avLst/>
+          </a:prstGeom>
+          <a:ln>
+            <a:prstDash val="sysDash"/>
+          </a:ln>
+        </p:spPr>
+        <p:style>
+          <a:lnRef idx="1">
+            <a:schemeClr val="dk1"/>
+          </a:lnRef>
+          <a:fillRef idx="0">
+            <a:schemeClr val="dk1"/>
+          </a:fillRef>
+          <a:effectRef idx="0">
+            <a:schemeClr val="dk1"/>
+          </a:effectRef>
+          <a:fontRef idx="minor">
+            <a:schemeClr val="tx1"/>
+          </a:fontRef>
+        </p:style>
+      </p:cxnSp>
+      <p:sp>
+        <p:nvSpPr>
+          <p:cNvPr id="14" name="ZoneTexte 13"/>
+          <p:cNvSpPr txBox="1"/>
+          <p:nvPr/>
+        </p:nvSpPr>
+        <p:spPr>
+          <a:xfrm>
+            <a:off x="10782300" y="4271695"/>
+            <a:ext cx="495300" cy="323165"/>
+          </a:xfrm>
+          <a:prstGeom prst="rect">
+            <a:avLst/>
+          </a:prstGeom>
+          <a:noFill/>
+        </p:spPr>
+        <p:txBody>
+          <a:bodyPr wrap="square" rtlCol="0">
+            <a:spAutoFit/>
+          </a:bodyPr>
+          <a:lstStyle/>
+          <a:p>
+            <a:r>
+              <a:rPr lang="fr-FR" sz="1500" dirty="0"/>
+              <a:t>[1]</a:t>
+            </a:r>
+          </a:p>
+        </p:txBody>
+      </p:sp>
+      <p:sp>
+        <p:nvSpPr>
+          <p:cNvPr id="16" name="Rectangle 15"/>
+          <p:cNvSpPr/>
+          <p:nvPr/>
+        </p:nvSpPr>
+        <p:spPr>
+          <a:xfrm>
+            <a:off x="6255017" y="3662716"/>
+            <a:ext cx="2095500" cy="1579130"/>
+          </a:xfrm>
+          <a:prstGeom prst="rect">
+            <a:avLst/>
+          </a:prstGeom>
+          <a:solidFill>
+            <a:schemeClr val="bg1"/>
+          </a:solidFill>
+          <a:ln>
+            <a:noFill/>
+          </a:ln>
+        </p:spPr>
+        <p:style>
+          <a:lnRef idx="2">
+            <a:schemeClr val="accent1">
+              <a:shade val="50000"/>
+            </a:schemeClr>
+          </a:lnRef>
+          <a:fillRef idx="1">
+            <a:schemeClr val="accent1"/>
+          </a:fillRef>
+          <a:effectRef idx="0">
+            <a:schemeClr val="accent1"/>
+          </a:effectRef>
+          <a:fontRef idx="minor">
+            <a:schemeClr val="lt1"/>
+          </a:fontRef>
+        </p:style>
+        <p:txBody>
+          <a:bodyPr rtlCol="0" anchor="ctr"/>
+          <a:lstStyle/>
+          <a:p>
+            <a:pPr algn="ctr"/>
+            <a:endParaRPr lang="fr-FR"/>
+          </a:p>
+        </p:txBody>
+      </p:sp>
+      <p:pic>
+        <p:nvPicPr>
+          <p:cNvPr id="15" name="Image 14"/>
+          <p:cNvPicPr>
+            <a:picLocks noChangeAspect="1"/>
+          </p:cNvPicPr>
+          <p:nvPr/>
+        </p:nvPicPr>
+        <p:blipFill rotWithShape="1">
+          <a:blip r:embed="rId2"/>
+          <a:srcRect l="53648" t="44553" r="25194" b="6227"/>
+          <a:stretch/>
+        </p:blipFill>
+        <p:spPr>
+          <a:xfrm>
+            <a:off x="6338837" y="4044657"/>
+            <a:ext cx="1927860" cy="777240"/>
+          </a:xfrm>
+          <a:prstGeom prst="rect">
+            <a:avLst/>
+          </a:prstGeom>
+        </p:spPr>
+      </p:pic>
+      <p:sp>
+        <p:nvSpPr>
+          <p:cNvPr id="19" name="Rectangle à coins arrondis 18"/>
+          <p:cNvSpPr/>
+          <p:nvPr/>
+        </p:nvSpPr>
+        <p:spPr>
+          <a:xfrm flipV="1">
+            <a:off x="7223031" y="4397692"/>
+            <a:ext cx="327386" cy="273366"/>
+          </a:xfrm>
+          <a:prstGeom prst="roundRect">
+            <a:avLst/>
+          </a:prstGeom>
+          <a:noFill/>
+          <a:ln>
+            <a:solidFill>
+              <a:srgbClr val="C00000"/>
+            </a:solidFill>
+          </a:ln>
+        </p:spPr>
+        <p:style>
+          <a:lnRef idx="2">
+            <a:schemeClr val="accent1">
+              <a:shade val="50000"/>
+            </a:schemeClr>
+          </a:lnRef>
+          <a:fillRef idx="1">
+            <a:schemeClr val="accent1"/>
+          </a:fillRef>
+          <a:effectRef idx="0">
+            <a:schemeClr val="accent1"/>
+          </a:effectRef>
+          <a:fontRef idx="minor">
+            <a:schemeClr val="lt1"/>
+          </a:fontRef>
+        </p:style>
+        <p:txBody>
+          <a:bodyPr rtlCol="0" anchor="ctr"/>
+          <a:lstStyle/>
+          <a:p>
+            <a:pPr algn="ctr"/>
+            <a:endParaRPr lang="fr-FR"/>
+          </a:p>
+        </p:txBody>
+      </p:sp>
+      <p:sp>
+        <p:nvSpPr>
+          <p:cNvPr id="20" name="Rectangle à coins arrondis 19"/>
+          <p:cNvSpPr/>
+          <p:nvPr/>
+        </p:nvSpPr>
+        <p:spPr>
+          <a:xfrm flipV="1">
+            <a:off x="4797357" y="3794611"/>
+            <a:ext cx="606226" cy="298743"/>
+          </a:xfrm>
+          <a:prstGeom prst="roundRect">
+            <a:avLst/>
+          </a:prstGeom>
+          <a:noFill/>
+          <a:ln>
+            <a:solidFill>
+              <a:srgbClr val="C00000"/>
+            </a:solidFill>
+          </a:ln>
+        </p:spPr>
+        <p:style>
+          <a:lnRef idx="2">
+            <a:schemeClr val="accent1">
+              <a:shade val="50000"/>
+            </a:schemeClr>
+          </a:lnRef>
+          <a:fillRef idx="1">
+            <a:schemeClr val="accent1"/>
+          </a:fillRef>
+          <a:effectRef idx="0">
+            <a:schemeClr val="accent1"/>
+          </a:effectRef>
+          <a:fontRef idx="minor">
+            <a:schemeClr val="lt1"/>
+          </a:fontRef>
+        </p:style>
+        <p:txBody>
+          <a:bodyPr rtlCol="0" anchor="ctr"/>
+          <a:lstStyle/>
+          <a:p>
+            <a:pPr algn="ctr"/>
+            <a:endParaRPr lang="fr-FR"/>
+          </a:p>
+        </p:txBody>
+      </p:sp>
+      <p:sp>
+        <p:nvSpPr>
+          <p:cNvPr id="21" name="Rectangle à coins arrondis 20"/>
+          <p:cNvSpPr/>
+          <p:nvPr/>
+        </p:nvSpPr>
+        <p:spPr>
+          <a:xfrm flipV="1">
+            <a:off x="7083611" y="4160519"/>
+            <a:ext cx="606226" cy="209849"/>
+          </a:xfrm>
+          <a:prstGeom prst="roundRect">
+            <a:avLst/>
+          </a:prstGeom>
+          <a:noFill/>
+          <a:ln>
+            <a:solidFill>
+              <a:srgbClr val="FFC000"/>
+            </a:solidFill>
+          </a:ln>
+        </p:spPr>
+        <p:style>
+          <a:lnRef idx="2">
+            <a:schemeClr val="accent1">
+              <a:shade val="50000"/>
+            </a:schemeClr>
+          </a:lnRef>
+          <a:fillRef idx="1">
+            <a:schemeClr val="accent1"/>
+          </a:fillRef>
+          <a:effectRef idx="0">
+            <a:schemeClr val="accent1"/>
+          </a:effectRef>
+          <a:fontRef idx="minor">
+            <a:schemeClr val="lt1"/>
+          </a:fontRef>
+        </p:style>
+        <p:txBody>
+          <a:bodyPr rtlCol="0" anchor="ctr"/>
+          <a:lstStyle/>
+          <a:p>
+            <a:pPr algn="ctr"/>
+            <a:endParaRPr lang="fr-FR"/>
+          </a:p>
+        </p:txBody>
+      </p:sp>
+      <p:sp>
+        <p:nvSpPr>
+          <p:cNvPr id="22" name="ZoneTexte 21"/>
+          <p:cNvSpPr txBox="1"/>
+          <p:nvPr/>
+        </p:nvSpPr>
+        <p:spPr>
+          <a:xfrm>
+            <a:off x="6442353" y="3301542"/>
+            <a:ext cx="1976744" cy="646331"/>
+          </a:xfrm>
+          <a:prstGeom prst="rect">
+            <a:avLst/>
+          </a:prstGeom>
+          <a:noFill/>
+        </p:spPr>
+        <p:txBody>
+          <a:bodyPr wrap="square" rtlCol="0">
+            <a:spAutoFit/>
+          </a:bodyPr>
+          <a:lstStyle/>
+          <a:p>
+            <a:pPr algn="ctr"/>
+            <a:r>
+              <a:rPr lang="fr-FR" dirty="0" smtClean="0">
+                <a:solidFill>
+                  <a:srgbClr val="FFC000"/>
+                </a:solidFill>
+              </a:rPr>
+              <a:t>Longueur des segments en gain</a:t>
+            </a:r>
+            <a:endParaRPr lang="fr-FR" dirty="0">
+              <a:solidFill>
+                <a:srgbClr val="FFC000"/>
+              </a:solidFill>
+            </a:endParaRPr>
+          </a:p>
+        </p:txBody>
+      </p:sp>
+      <p:sp>
+        <p:nvSpPr>
+          <p:cNvPr id="23" name="ZoneTexte 22"/>
+          <p:cNvSpPr txBox="1"/>
+          <p:nvPr/>
+        </p:nvSpPr>
+        <p:spPr>
+          <a:xfrm>
+            <a:off x="6398352" y="4821897"/>
+            <a:ext cx="1976744" cy="646331"/>
+          </a:xfrm>
+          <a:prstGeom prst="rect">
+            <a:avLst/>
+          </a:prstGeom>
+          <a:noFill/>
+        </p:spPr>
+        <p:txBody>
+          <a:bodyPr wrap="square" rtlCol="0">
+            <a:spAutoFit/>
+          </a:bodyPr>
+          <a:lstStyle/>
+          <a:p>
+            <a:pPr algn="ctr"/>
+            <a:r>
+              <a:rPr lang="fr-FR" dirty="0" smtClean="0">
+                <a:solidFill>
+                  <a:srgbClr val="C00000"/>
+                </a:solidFill>
+              </a:rPr>
+              <a:t>Longueur du chromosome</a:t>
+            </a:r>
+            <a:endParaRPr lang="fr-FR" dirty="0">
+              <a:solidFill>
+                <a:srgbClr val="C00000"/>
+              </a:solidFill>
+            </a:endParaRPr>
+          </a:p>
+        </p:txBody>
+      </p:sp>
+      <p:sp>
+        <p:nvSpPr>
+          <p:cNvPr id="17" name="Espace réservé du contenu 4"/>
+          <p:cNvSpPr txBox="1">
+            <a:spLocks/>
+          </p:cNvSpPr>
+          <p:nvPr/>
+        </p:nvSpPr>
+        <p:spPr>
+          <a:xfrm>
+            <a:off x="685355" y="1722329"/>
+            <a:ext cx="10600266" cy="3880773"/>
+          </a:xfrm>
+          <a:prstGeom prst="rect">
+            <a:avLst/>
+          </a:prstGeom>
+        </p:spPr>
+        <p:txBody>
+          <a:bodyPr vert="horz" lIns="91440" tIns="45720" rIns="91440" bIns="45720" rtlCol="0">
+            <a:normAutofit/>
+          </a:bodyPr>
+          <a:lstStyle>
+            <a:lvl1pPr marL="342900" indent="-342900" algn="l" defTabSz="457200" rtl="0" eaLnBrk="1" latinLnBrk="0" hangingPunct="1">
+              <a:spcBef>
+                <a:spcPts val="1000"/>
+              </a:spcBef>
+              <a:spcAft>
+                <a:spcPts val="0"/>
+              </a:spcAft>
+              <a:buClr>
+                <a:schemeClr val="accent1"/>
+              </a:buClr>
+              <a:buSzPct val="80000"/>
+              <a:buFont typeface="Wingdings 3" charset="2"/>
+              <a:buChar char=""/>
+              <a:defRPr sz="1800" kern="1200">
+                <a:solidFill>
+                  <a:schemeClr val="tx1">
+                    <a:lumMod val="75000"/>
+                    <a:lumOff val="25000"/>
+                  </a:schemeClr>
+                </a:solidFill>
+                <a:latin typeface="+mn-lt"/>
+                <a:ea typeface="+mn-ea"/>
+                <a:cs typeface="+mn-cs"/>
+              </a:defRPr>
+            </a:lvl1pPr>
+            <a:lvl2pPr marL="742950" indent="-285750" algn="l" defTabSz="457200" rtl="0" eaLnBrk="1" latinLnBrk="0" hangingPunct="1">
+              <a:spcBef>
+                <a:spcPts val="1000"/>
+              </a:spcBef>
+              <a:spcAft>
+                <a:spcPts val="0"/>
+              </a:spcAft>
+              <a:buClr>
+                <a:schemeClr val="accent1"/>
+              </a:buClr>
+              <a:buSzPct val="80000"/>
+              <a:buFont typeface="Wingdings 3" charset="2"/>
+              <a:buChar char=""/>
+              <a:defRPr sz="1600" kern="1200">
+                <a:solidFill>
+                  <a:schemeClr val="tx1">
+                    <a:lumMod val="75000"/>
+                    <a:lumOff val="25000"/>
+                  </a:schemeClr>
+                </a:solidFill>
+                <a:latin typeface="+mn-lt"/>
+                <a:ea typeface="+mn-ea"/>
+                <a:cs typeface="+mn-cs"/>
+              </a:defRPr>
+            </a:lvl2pPr>
+            <a:lvl3pPr marL="1143000" indent="-228600" algn="l" defTabSz="457200" rtl="0" eaLnBrk="1" latinLnBrk="0" hangingPunct="1">
+              <a:spcBef>
+                <a:spcPts val="1000"/>
+              </a:spcBef>
+              <a:spcAft>
+                <a:spcPts val="0"/>
+              </a:spcAft>
+              <a:buClr>
+                <a:schemeClr val="accent1"/>
+              </a:buClr>
+              <a:buSzPct val="80000"/>
+              <a:buFont typeface="Wingdings 3" charset="2"/>
+              <a:buChar char=""/>
+              <a:defRPr sz="1400" kern="1200">
+                <a:solidFill>
+                  <a:schemeClr val="tx1">
+                    <a:lumMod val="75000"/>
+                    <a:lumOff val="25000"/>
+                  </a:schemeClr>
+                </a:solidFill>
+                <a:latin typeface="+mn-lt"/>
+                <a:ea typeface="+mn-ea"/>
+                <a:cs typeface="+mn-cs"/>
+              </a:defRPr>
+            </a:lvl3pPr>
+            <a:lvl4pPr marL="1600200" indent="-228600" algn="l" defTabSz="457200" rtl="0" eaLnBrk="1" latinLnBrk="0" hangingPunct="1">
+              <a:spcBef>
+                <a:spcPts val="1000"/>
+              </a:spcBef>
+              <a:spcAft>
+                <a:spcPts val="0"/>
+              </a:spcAft>
+              <a:buClr>
+                <a:schemeClr val="accent1"/>
+              </a:buClr>
+              <a:buSzPct val="80000"/>
+              <a:buFont typeface="Wingdings 3" charset="2"/>
+              <a:buChar char=""/>
+              <a:defRPr sz="1200" kern="1200">
+                <a:solidFill>
+                  <a:schemeClr val="tx1">
+                    <a:lumMod val="75000"/>
+                    <a:lumOff val="25000"/>
+                  </a:schemeClr>
+                </a:solidFill>
+                <a:latin typeface="+mn-lt"/>
+                <a:ea typeface="+mn-ea"/>
+                <a:cs typeface="+mn-cs"/>
+              </a:defRPr>
+            </a:lvl4pPr>
+            <a:lvl5pPr marL="2057400" indent="-228600" algn="l" defTabSz="457200" rtl="0" eaLnBrk="1" latinLnBrk="0" hangingPunct="1">
+              <a:spcBef>
+                <a:spcPts val="1000"/>
+              </a:spcBef>
+              <a:spcAft>
+                <a:spcPts val="0"/>
+              </a:spcAft>
+              <a:buClr>
+                <a:schemeClr val="accent1"/>
+              </a:buClr>
+              <a:buSzPct val="80000"/>
+              <a:buFont typeface="Wingdings 3" charset="2"/>
+              <a:buChar char=""/>
+              <a:defRPr sz="1200" kern="1200">
+                <a:solidFill>
+                  <a:schemeClr val="tx1">
+                    <a:lumMod val="75000"/>
+                    <a:lumOff val="25000"/>
+                  </a:schemeClr>
+                </a:solidFill>
+                <a:latin typeface="+mn-lt"/>
+                <a:ea typeface="+mn-ea"/>
+                <a:cs typeface="+mn-cs"/>
+              </a:defRPr>
+            </a:lvl5pPr>
+            <a:lvl6pPr marL="2514600" indent="-228600" algn="l" defTabSz="457200" rtl="0" eaLnBrk="1" latinLnBrk="0" hangingPunct="1">
+              <a:spcBef>
+                <a:spcPts val="1000"/>
+              </a:spcBef>
+              <a:spcAft>
+                <a:spcPts val="0"/>
+              </a:spcAft>
+              <a:buClr>
+                <a:schemeClr val="accent1"/>
+              </a:buClr>
+              <a:buSzPct val="80000"/>
+              <a:buFont typeface="Wingdings 3" charset="2"/>
+              <a:buChar char=""/>
+              <a:defRPr sz="1200" kern="1200">
+                <a:solidFill>
+                  <a:schemeClr val="tx1">
+                    <a:lumMod val="75000"/>
+                    <a:lumOff val="25000"/>
+                  </a:schemeClr>
+                </a:solidFill>
+                <a:latin typeface="+mn-lt"/>
+                <a:ea typeface="+mn-ea"/>
+                <a:cs typeface="+mn-cs"/>
+              </a:defRPr>
+            </a:lvl6pPr>
+            <a:lvl7pPr marL="2971800" indent="-228600" algn="l" defTabSz="457200" rtl="0" eaLnBrk="1" latinLnBrk="0" hangingPunct="1">
+              <a:spcBef>
+                <a:spcPts val="1000"/>
+              </a:spcBef>
+              <a:spcAft>
+                <a:spcPts val="0"/>
+              </a:spcAft>
+              <a:buClr>
+                <a:schemeClr val="accent1"/>
+              </a:buClr>
+              <a:buSzPct val="80000"/>
+              <a:buFont typeface="Wingdings 3" charset="2"/>
+              <a:buChar char=""/>
+              <a:defRPr sz="1200" kern="1200">
+                <a:solidFill>
+                  <a:schemeClr val="tx1">
+                    <a:lumMod val="75000"/>
+                    <a:lumOff val="25000"/>
+                  </a:schemeClr>
+                </a:solidFill>
+                <a:latin typeface="+mn-lt"/>
+                <a:ea typeface="+mn-ea"/>
+                <a:cs typeface="+mn-cs"/>
+              </a:defRPr>
+            </a:lvl7pPr>
+            <a:lvl8pPr marL="3429000" indent="-228600" algn="l" defTabSz="457200" rtl="0" eaLnBrk="1" latinLnBrk="0" hangingPunct="1">
+              <a:spcBef>
+                <a:spcPts val="1000"/>
+              </a:spcBef>
+              <a:spcAft>
+                <a:spcPts val="0"/>
+              </a:spcAft>
+              <a:buClr>
+                <a:schemeClr val="accent1"/>
+              </a:buClr>
+              <a:buSzPct val="80000"/>
+              <a:buFont typeface="Wingdings 3" charset="2"/>
+              <a:buChar char=""/>
+              <a:defRPr sz="1200" kern="1200">
+                <a:solidFill>
+                  <a:schemeClr val="tx1">
+                    <a:lumMod val="75000"/>
+                    <a:lumOff val="25000"/>
+                  </a:schemeClr>
+                </a:solidFill>
+                <a:latin typeface="+mn-lt"/>
+                <a:ea typeface="+mn-ea"/>
+                <a:cs typeface="+mn-cs"/>
+              </a:defRPr>
+            </a:lvl8pPr>
+            <a:lvl9pPr marL="3886200" indent="-228600" algn="l" defTabSz="457200" rtl="0" eaLnBrk="1" latinLnBrk="0" hangingPunct="1">
+              <a:spcBef>
+                <a:spcPts val="1000"/>
+              </a:spcBef>
+              <a:spcAft>
+                <a:spcPts val="0"/>
+              </a:spcAft>
+              <a:buClr>
+                <a:schemeClr val="accent1"/>
+              </a:buClr>
+              <a:buSzPct val="80000"/>
+              <a:buFont typeface="Wingdings 3" charset="2"/>
+              <a:buChar char=""/>
+              <a:defRPr sz="1200" kern="1200">
+                <a:solidFill>
+                  <a:schemeClr val="tx1">
+                    <a:lumMod val="75000"/>
+                    <a:lumOff val="25000"/>
+                  </a:schemeClr>
+                </a:solidFill>
+                <a:latin typeface="+mn-lt"/>
+                <a:ea typeface="+mn-ea"/>
+                <a:cs typeface="+mn-cs"/>
+              </a:defRPr>
+            </a:lvl9pPr>
+          </a:lstStyle>
+          <a:p>
+            <a:r>
+              <a:rPr lang="fr-FR" dirty="0" smtClean="0"/>
+              <a:t>Exemple: 17q</a:t>
+            </a:r>
+          </a:p>
+          <a:p>
+            <a:r>
+              <a:rPr lang="fr-FR" dirty="0" smtClean="0"/>
+              <a:t>Ce bras est long de 57Mbp. Il présente deux segments en gain, de 32 et 7 </a:t>
+            </a:r>
+            <a:r>
+              <a:rPr lang="fr-FR" dirty="0" err="1" smtClean="0"/>
+              <a:t>Mbp</a:t>
+            </a:r>
+            <a:r>
+              <a:rPr lang="fr-FR" dirty="0" smtClean="0"/>
+              <a:t>.</a:t>
+            </a:r>
+          </a:p>
+          <a:p>
+            <a:r>
+              <a:rPr lang="fr-FR" dirty="0" smtClean="0"/>
+              <a:t>Les segments représentent </a:t>
+            </a:r>
+            <a:r>
+              <a:rPr lang="fr-FR" dirty="0"/>
+              <a:t>68% </a:t>
+            </a:r>
+            <a:r>
+              <a:rPr lang="fr-FR" dirty="0" smtClean="0"/>
+              <a:t>de la longueur du chromosome. Ce pourcentage ne dépasse pas le seuil de 80%, donc le gain du bras 17q n’est pas caractérisé</a:t>
+            </a:r>
+          </a:p>
+          <a:p>
+            <a:endParaRPr lang="fr-FR" dirty="0" smtClean="0"/>
+          </a:p>
+        </p:txBody>
+      </p:sp>
+      <p:sp>
+        <p:nvSpPr>
+          <p:cNvPr id="18" name="Rectangle 17"/>
+          <p:cNvSpPr/>
+          <p:nvPr/>
+        </p:nvSpPr>
+        <p:spPr>
+          <a:xfrm>
+            <a:off x="9777413" y="4449512"/>
+            <a:ext cx="98600" cy="145348"/>
+          </a:xfrm>
+          <a:prstGeom prst="rect">
+            <a:avLst/>
+          </a:prstGeom>
+          <a:solidFill>
+            <a:schemeClr val="bg1"/>
+          </a:solidFill>
+          <a:ln>
+            <a:noFill/>
+          </a:ln>
+        </p:spPr>
+        <p:style>
+          <a:lnRef idx="2">
+            <a:schemeClr val="accent1">
+              <a:shade val="50000"/>
+            </a:schemeClr>
+          </a:lnRef>
+          <a:fillRef idx="1">
+            <a:schemeClr val="accent1"/>
+          </a:fillRef>
+          <a:effectRef idx="0">
+            <a:schemeClr val="accent1"/>
+          </a:effectRef>
+          <a:fontRef idx="minor">
+            <a:schemeClr val="lt1"/>
+          </a:fontRef>
+        </p:style>
+        <p:txBody>
+          <a:bodyPr rtlCol="0" anchor="ctr"/>
+          <a:lstStyle/>
+          <a:p>
+            <a:pPr algn="ctr"/>
+            <a:endParaRPr lang="fr-FR"/>
+          </a:p>
+        </p:txBody>
+      </p:sp>
+      <p:sp>
+        <p:nvSpPr>
+          <p:cNvPr id="9" name="ZoneTexte 8"/>
+          <p:cNvSpPr txBox="1"/>
+          <p:nvPr/>
+        </p:nvSpPr>
+        <p:spPr>
+          <a:xfrm>
+            <a:off x="9707880" y="4374196"/>
+            <a:ext cx="173831" cy="292388"/>
+          </a:xfrm>
+          <a:prstGeom prst="rect">
+            <a:avLst/>
+          </a:prstGeom>
+          <a:noFill/>
+        </p:spPr>
+        <p:txBody>
+          <a:bodyPr wrap="square" rtlCol="0">
+            <a:spAutoFit/>
+          </a:bodyPr>
+          <a:lstStyle/>
+          <a:p>
+            <a:r>
+              <a:rPr lang="fr-FR" sz="1300" dirty="0" smtClean="0"/>
+              <a:t>8</a:t>
+            </a:r>
+            <a:endParaRPr lang="fr-FR" sz="1300" dirty="0"/>
+          </a:p>
+        </p:txBody>
+      </p:sp>
+    </p:spTree>
+    <p:extLst>
+      <p:ext uri="{BB962C8B-B14F-4D97-AF65-F5344CB8AC3E}">
+        <p14:creationId xmlns:p14="http://schemas.microsoft.com/office/powerpoint/2010/main" val="3247010067"/>
       </p:ext>
     </p:extLst>
   </p:cSld>

</xml_diff>

<commit_message>
bergupdate: wrote a plan of the internship report in md. gotta transpose it in overleaf (on chrome, it doesn't preview in firefox.
</commit_message>
<xml_diff>
--- a/docs/docs_I_made/slides/OncoscanR.pptx
+++ b/docs/docs_I_made/slides/OncoscanR.pptx
@@ -875,7 +875,7 @@
             <a:fld id="{B61BEF0D-F0BB-DE4B-95CE-6DB70DBA9567}" type="datetimeFigureOut">
               <a:rPr lang="en-US" smtClean="0"/>
               <a:pPr/>
-              <a:t>5/2/2022</a:t>
+              <a:t>5/3/2022</a:t>
             </a:fld>
             <a:endParaRPr lang="en-US" dirty="0"/>
           </a:p>
@@ -1128,7 +1128,7 @@
             <a:fld id="{B61BEF0D-F0BB-DE4B-95CE-6DB70DBA9567}" type="datetimeFigureOut">
               <a:rPr lang="en-US" smtClean="0"/>
               <a:pPr/>
-              <a:t>5/2/2022</a:t>
+              <a:t>5/3/2022</a:t>
             </a:fld>
             <a:endParaRPr lang="en-US" dirty="0"/>
           </a:p>
@@ -1444,7 +1444,7 @@
             <a:fld id="{B61BEF0D-F0BB-DE4B-95CE-6DB70DBA9567}" type="datetimeFigureOut">
               <a:rPr lang="en-US" smtClean="0"/>
               <a:pPr/>
-              <a:t>5/2/2022</a:t>
+              <a:t>5/3/2022</a:t>
             </a:fld>
             <a:endParaRPr lang="en-US" dirty="0"/>
           </a:p>
@@ -1779,7 +1779,7 @@
             <a:fld id="{B61BEF0D-F0BB-DE4B-95CE-6DB70DBA9567}" type="datetimeFigureOut">
               <a:rPr lang="en-US" smtClean="0"/>
               <a:pPr/>
-              <a:t>5/2/2022</a:t>
+              <a:t>5/3/2022</a:t>
             </a:fld>
             <a:endParaRPr lang="en-US" dirty="0"/>
           </a:p>
@@ -2095,7 +2095,7 @@
             <a:fld id="{B61BEF0D-F0BB-DE4B-95CE-6DB70DBA9567}" type="datetimeFigureOut">
               <a:rPr lang="en-US" smtClean="0"/>
               <a:pPr/>
-              <a:t>5/2/2022</a:t>
+              <a:t>5/3/2022</a:t>
             </a:fld>
             <a:endParaRPr lang="en-US" dirty="0"/>
           </a:p>
@@ -2490,7 +2490,7 @@
             <a:fld id="{B61BEF0D-F0BB-DE4B-95CE-6DB70DBA9567}" type="datetimeFigureOut">
               <a:rPr lang="en-US" smtClean="0"/>
               <a:pPr/>
-              <a:t>5/2/2022</a:t>
+              <a:t>5/3/2022</a:t>
             </a:fld>
             <a:endParaRPr lang="en-US" dirty="0"/>
           </a:p>
@@ -2661,7 +2661,7 @@
           <a:p>
             <a:fld id="{55C6B4A9-1611-4792-9094-5F34BCA07E0B}" type="datetimeFigureOut">
               <a:rPr lang="en-US" smtClean="0"/>
-              <a:t>5/2/2022</a:t>
+              <a:t>5/3/2022</a:t>
             </a:fld>
             <a:endParaRPr lang="en-US" dirty="0"/>
           </a:p>
@@ -2842,7 +2842,7 @@
             <a:fld id="{B61BEF0D-F0BB-DE4B-95CE-6DB70DBA9567}" type="datetimeFigureOut">
               <a:rPr lang="en-US" smtClean="0"/>
               <a:pPr/>
-              <a:t>5/2/2022</a:t>
+              <a:t>5/3/2022</a:t>
             </a:fld>
             <a:endParaRPr lang="en-US" dirty="0"/>
           </a:p>
@@ -3014,7 +3014,7 @@
             <a:fld id="{B61BEF0D-F0BB-DE4B-95CE-6DB70DBA9567}" type="datetimeFigureOut">
               <a:rPr lang="en-US" smtClean="0"/>
               <a:pPr/>
-              <a:t>5/2/2022</a:t>
+              <a:t>5/3/2022</a:t>
             </a:fld>
             <a:endParaRPr lang="en-US" dirty="0"/>
           </a:p>
@@ -3263,7 +3263,7 @@
             <a:fld id="{B61BEF0D-F0BB-DE4B-95CE-6DB70DBA9567}" type="datetimeFigureOut">
               <a:rPr lang="en-US" smtClean="0"/>
               <a:pPr/>
-              <a:t>5/2/2022</a:t>
+              <a:t>5/3/2022</a:t>
             </a:fld>
             <a:endParaRPr lang="en-US" dirty="0"/>
           </a:p>
@@ -3496,7 +3496,7 @@
           <a:p>
             <a:fld id="{EB712588-04B1-427B-82EE-E8DB90309F08}" type="datetimeFigureOut">
               <a:rPr lang="en-US" smtClean="0"/>
-              <a:t>5/2/2022</a:t>
+              <a:t>5/3/2022</a:t>
             </a:fld>
             <a:endParaRPr lang="en-US" dirty="0"/>
           </a:p>
@@ -3871,7 +3871,7 @@
             <a:fld id="{B61BEF0D-F0BB-DE4B-95CE-6DB70DBA9567}" type="datetimeFigureOut">
               <a:rPr lang="en-US" smtClean="0"/>
               <a:pPr/>
-              <a:t>5/2/2022</a:t>
+              <a:t>5/3/2022</a:t>
             </a:fld>
             <a:endParaRPr lang="en-US" dirty="0"/>
           </a:p>
@@ -3996,7 +3996,7 @@
             <a:fld id="{B61BEF0D-F0BB-DE4B-95CE-6DB70DBA9567}" type="datetimeFigureOut">
               <a:rPr lang="en-US" smtClean="0"/>
               <a:pPr/>
-              <a:t>5/2/2022</a:t>
+              <a:t>5/3/2022</a:t>
             </a:fld>
             <a:endParaRPr lang="en-US" dirty="0"/>
           </a:p>
@@ -4093,7 +4093,7 @@
             <a:fld id="{B61BEF0D-F0BB-DE4B-95CE-6DB70DBA9567}" type="datetimeFigureOut">
               <a:rPr lang="en-US" smtClean="0"/>
               <a:pPr/>
-              <a:t>5/2/2022</a:t>
+              <a:t>5/3/2022</a:t>
             </a:fld>
             <a:endParaRPr lang="en-US" dirty="0"/>
           </a:p>
@@ -4349,7 +4349,7 @@
           <a:p>
             <a:fld id="{42A54C80-263E-416B-A8E0-580EDEADCBDC}" type="datetimeFigureOut">
               <a:rPr lang="en-US" smtClean="0"/>
-              <a:t>5/2/2022</a:t>
+              <a:t>5/3/2022</a:t>
             </a:fld>
             <a:endParaRPr lang="en-US" dirty="0"/>
           </a:p>
@@ -4656,7 +4656,7 @@
             <a:fld id="{B61BEF0D-F0BB-DE4B-95CE-6DB70DBA9567}" type="datetimeFigureOut">
               <a:rPr lang="en-US" smtClean="0"/>
               <a:pPr/>
-              <a:t>5/2/2022</a:t>
+              <a:t>5/3/2022</a:t>
             </a:fld>
             <a:endParaRPr lang="en-US" dirty="0"/>
           </a:p>
@@ -5359,7 +5359,7 @@
             <a:fld id="{B61BEF0D-F0BB-DE4B-95CE-6DB70DBA9567}" type="datetimeFigureOut">
               <a:rPr lang="en-US" smtClean="0"/>
               <a:pPr/>
-              <a:t>5/2/2022</a:t>
+              <a:t>5/3/2022</a:t>
             </a:fld>
             <a:endParaRPr lang="en-US" dirty="0"/>
           </a:p>
@@ -8569,11 +8569,7 @@
           <a:p>
             <a:r>
               <a:rPr lang="fr-FR" dirty="0" smtClean="0"/>
-              <a:t>Certains segments ne sont </a:t>
-            </a:r>
-            <a:r>
-              <a:rPr lang="fr-FR" dirty="0" smtClean="0"/>
-              <a:t>pas exportés par </a:t>
+              <a:t>Certains segments ne sont pas exportés par </a:t>
             </a:r>
             <a:r>
               <a:rPr lang="fr-FR" dirty="0" err="1" smtClean="0"/>
@@ -8581,11 +8577,7 @@
             </a:r>
             <a:r>
               <a:rPr lang="fr-FR" dirty="0" smtClean="0"/>
-              <a:t> et </a:t>
-            </a:r>
-            <a:r>
-              <a:rPr lang="fr-FR" dirty="0" smtClean="0"/>
-              <a:t>nécessitent une annotation manuelle</a:t>
+              <a:t> et nécessitent une annotation manuelle</a:t>
             </a:r>
           </a:p>
           <a:p>
@@ -8897,16 +8889,13 @@
             </a:r>
             <a:r>
               <a:rPr lang="fr-FR" dirty="0" smtClean="0"/>
-              <a:t>&gt;15Mbp, en excluant les chromosomes </a:t>
+              <a:t>&gt;15Mbp, en excluant les chromosomes à 100% de LOH. Ce score est lié à la mutation des gènes BRCA</a:t>
             </a:r>
             <a:r>
               <a:rPr lang="fr-FR" dirty="0" smtClean="0"/>
-              <a:t>à 100% de </a:t>
-            </a:r>
-            <a:r>
-              <a:rPr lang="fr-FR" dirty="0" smtClean="0"/>
-              <a:t>LOH. Ce score est lié à la mutation des gènes BRCA.</a:t>
-            </a:r>
+              <a:t>. (2)</a:t>
+            </a:r>
+            <a:endParaRPr lang="fr-FR" dirty="0" smtClean="0"/>
           </a:p>
           <a:p>
             <a:r>
@@ -8943,8 +8932,9 @@
             </a:r>
             <a:r>
               <a:rPr lang="fr-FR" dirty="0" smtClean="0"/>
-              <a:t>.</a:t>
-            </a:r>
+              <a:t>. (3)</a:t>
+            </a:r>
+            <a:endParaRPr lang="fr-FR" dirty="0" smtClean="0"/>
           </a:p>
           <a:p>
             <a:r>
@@ -8957,7 +8947,11 @@
             </a:r>
             <a:r>
               <a:rPr lang="fr-FR" dirty="0" smtClean="0"/>
-              <a:t>du gène CDK12 (HRD)</a:t>
+              <a:t>du gène CDK12 (HRD</a:t>
+            </a:r>
+            <a:r>
+              <a:rPr lang="fr-FR" dirty="0" smtClean="0"/>
+              <a:t>) (4)</a:t>
             </a:r>
             <a:endParaRPr lang="fr-FR" dirty="0"/>
           </a:p>
@@ -9040,29 +9034,31 @@
         </p:nvSpPr>
         <p:spPr>
           <a:xfrm>
-            <a:off x="677334" y="2160589"/>
-            <a:ext cx="10600266" cy="3880773"/>
-          </a:xfrm>
-        </p:spPr>
-        <p:txBody>
-          <a:bodyPr/>
+            <a:off x="677334" y="1171075"/>
+            <a:ext cx="10600266" cy="4870288"/>
+          </a:xfrm>
+        </p:spPr>
+        <p:txBody>
+          <a:bodyPr>
+            <a:normAutofit fontScale="92500" lnSpcReduction="10000"/>
+          </a:bodyPr>
           <a:lstStyle/>
           <a:p>
             <a:r>
               <a:rPr lang="fr-FR" dirty="0" smtClean="0"/>
-              <a:t>[1</a:t>
+              <a:t>1. </a:t>
+            </a:r>
+            <a:r>
+              <a:rPr lang="fr-FR" dirty="0" err="1" smtClean="0"/>
+              <a:t>Christinat</a:t>
+            </a:r>
+            <a:r>
+              <a:rPr lang="fr-FR" dirty="0" smtClean="0"/>
+              <a:t> </a:t>
             </a:r>
             <a:r>
               <a:rPr lang="fr-FR" dirty="0"/>
-              <a:t>] </a:t>
-            </a:r>
-            <a:r>
-              <a:rPr lang="fr-FR" dirty="0" err="1"/>
-              <a:t>Christinat</a:t>
-            </a:r>
-            <a:r>
-              <a:rPr lang="fr-FR" dirty="0"/>
-              <a:t> Y, </a:t>
+              <a:t>Y, </a:t>
             </a:r>
             <a:r>
               <a:rPr lang="fr-FR" dirty="0" err="1"/>
@@ -9158,8 +9154,588 @@
             </a:r>
             <a:r>
               <a:rPr lang="fr-FR" dirty="0"/>
-              <a:t> 25. PMID: 34454110.</a:t>
-            </a:r>
+              <a:t> 25. PMID: 34454110</a:t>
+            </a:r>
+            <a:r>
+              <a:rPr lang="fr-FR" dirty="0" smtClean="0"/>
+              <a:t>.</a:t>
+            </a:r>
+          </a:p>
+          <a:p>
+            <a:r>
+              <a:rPr lang="fr-FR" dirty="0" smtClean="0"/>
+              <a:t>2</a:t>
+            </a:r>
+            <a:r>
+              <a:rPr lang="fr-FR" dirty="0"/>
+              <a:t>. </a:t>
+            </a:r>
+            <a:r>
+              <a:rPr lang="fr-FR" dirty="0" err="1"/>
+              <a:t>Abkevich</a:t>
+            </a:r>
+            <a:r>
+              <a:rPr lang="fr-FR" dirty="0"/>
+              <a:t> V, </a:t>
+            </a:r>
+            <a:r>
+              <a:rPr lang="fr-FR" dirty="0" err="1"/>
+              <a:t>Timms</a:t>
+            </a:r>
+            <a:r>
+              <a:rPr lang="fr-FR" dirty="0"/>
+              <a:t> KM, Hennessy BT, Potter J, Carey MS, Meyer LA, Smith-</a:t>
+            </a:r>
+            <a:r>
+              <a:rPr lang="fr-FR" dirty="0" err="1"/>
+              <a:t>McCune</a:t>
+            </a:r>
+            <a:r>
+              <a:rPr lang="fr-FR" dirty="0"/>
+              <a:t> K, </a:t>
+            </a:r>
+            <a:r>
+              <a:rPr lang="fr-FR" dirty="0" err="1"/>
+              <a:t>Broaddus</a:t>
+            </a:r>
+            <a:r>
+              <a:rPr lang="fr-FR" dirty="0"/>
+              <a:t> R, Lu KH, Chen J, </a:t>
+            </a:r>
+            <a:r>
+              <a:rPr lang="fr-FR" dirty="0" err="1"/>
+              <a:t>Tran</a:t>
+            </a:r>
+            <a:r>
+              <a:rPr lang="fr-FR" dirty="0"/>
+              <a:t> TV, Williams D, </a:t>
+            </a:r>
+            <a:r>
+              <a:rPr lang="fr-FR" dirty="0" err="1"/>
+              <a:t>Iliev</a:t>
+            </a:r>
+            <a:r>
+              <a:rPr lang="fr-FR" dirty="0"/>
+              <a:t> D, </a:t>
+            </a:r>
+            <a:r>
+              <a:rPr lang="fr-FR" dirty="0" err="1"/>
+              <a:t>Jammulapati</a:t>
+            </a:r>
+            <a:r>
+              <a:rPr lang="fr-FR" dirty="0"/>
+              <a:t> S, </a:t>
+            </a:r>
+            <a:r>
+              <a:rPr lang="fr-FR" dirty="0" err="1"/>
+              <a:t>FitzGerald</a:t>
+            </a:r>
+            <a:r>
+              <a:rPr lang="fr-FR" dirty="0"/>
+              <a:t> LM, </a:t>
+            </a:r>
+            <a:r>
+              <a:rPr lang="fr-FR" dirty="0" err="1"/>
+              <a:t>Krivak</a:t>
+            </a:r>
+            <a:r>
+              <a:rPr lang="fr-FR" dirty="0"/>
+              <a:t> T, </a:t>
+            </a:r>
+            <a:r>
+              <a:rPr lang="fr-FR" dirty="0" err="1"/>
+              <a:t>DeLoia</a:t>
+            </a:r>
+            <a:r>
+              <a:rPr lang="fr-FR" dirty="0"/>
+              <a:t> JA, </a:t>
+            </a:r>
+            <a:r>
+              <a:rPr lang="fr-FR" dirty="0" err="1"/>
+              <a:t>Gutin</a:t>
+            </a:r>
+            <a:r>
+              <a:rPr lang="fr-FR" dirty="0"/>
+              <a:t> A, Mills GB, </a:t>
+            </a:r>
+            <a:r>
+              <a:rPr lang="fr-FR" dirty="0" err="1"/>
+              <a:t>Lanchbury</a:t>
+            </a:r>
+            <a:r>
+              <a:rPr lang="fr-FR" dirty="0"/>
+              <a:t> JS. Patterns of </a:t>
+            </a:r>
+            <a:r>
+              <a:rPr lang="fr-FR" dirty="0" err="1"/>
+              <a:t>genomic</a:t>
+            </a:r>
+            <a:r>
+              <a:rPr lang="fr-FR" dirty="0"/>
+              <a:t> </a:t>
+            </a:r>
+            <a:r>
+              <a:rPr lang="fr-FR" dirty="0" err="1"/>
+              <a:t>loss</a:t>
+            </a:r>
+            <a:r>
+              <a:rPr lang="fr-FR" dirty="0"/>
+              <a:t> of </a:t>
+            </a:r>
+            <a:r>
+              <a:rPr lang="fr-FR" dirty="0" err="1"/>
+              <a:t>heterozygosity</a:t>
+            </a:r>
+            <a:r>
+              <a:rPr lang="fr-FR" dirty="0"/>
+              <a:t> </a:t>
+            </a:r>
+            <a:r>
+              <a:rPr lang="fr-FR" dirty="0" err="1"/>
+              <a:t>predict</a:t>
+            </a:r>
+            <a:r>
+              <a:rPr lang="fr-FR" dirty="0"/>
+              <a:t> </a:t>
+            </a:r>
+            <a:r>
+              <a:rPr lang="fr-FR" dirty="0" err="1"/>
+              <a:t>homologous</a:t>
+            </a:r>
+            <a:r>
+              <a:rPr lang="fr-FR" dirty="0"/>
+              <a:t> </a:t>
+            </a:r>
+            <a:r>
+              <a:rPr lang="fr-FR" dirty="0" err="1"/>
+              <a:t>recombination</a:t>
+            </a:r>
+            <a:r>
+              <a:rPr lang="fr-FR" dirty="0"/>
+              <a:t> </a:t>
+            </a:r>
+            <a:r>
+              <a:rPr lang="fr-FR" dirty="0" err="1"/>
+              <a:t>repair</a:t>
+            </a:r>
+            <a:r>
+              <a:rPr lang="fr-FR" dirty="0"/>
+              <a:t> </a:t>
+            </a:r>
+            <a:r>
+              <a:rPr lang="fr-FR" dirty="0" err="1"/>
+              <a:t>defects</a:t>
+            </a:r>
+            <a:r>
+              <a:rPr lang="fr-FR" dirty="0"/>
+              <a:t> in </a:t>
+            </a:r>
+            <a:r>
+              <a:rPr lang="fr-FR" dirty="0" err="1"/>
+              <a:t>epithelial</a:t>
+            </a:r>
+            <a:r>
+              <a:rPr lang="fr-FR" dirty="0"/>
+              <a:t> </a:t>
+            </a:r>
+            <a:r>
+              <a:rPr lang="fr-FR" dirty="0" err="1"/>
+              <a:t>ovarian</a:t>
+            </a:r>
+            <a:r>
+              <a:rPr lang="fr-FR" dirty="0"/>
+              <a:t> cancer. Br J Cancer. 2012 </a:t>
+            </a:r>
+            <a:r>
+              <a:rPr lang="fr-FR" dirty="0" err="1"/>
+              <a:t>Nov</a:t>
+            </a:r>
+            <a:r>
+              <a:rPr lang="fr-FR" dirty="0"/>
+              <a:t> 6;107(10):1776-82. </a:t>
+            </a:r>
+            <a:r>
+              <a:rPr lang="fr-FR" dirty="0" err="1"/>
+              <a:t>doi</a:t>
+            </a:r>
+            <a:r>
+              <a:rPr lang="fr-FR" dirty="0"/>
+              <a:t>: 10.1038/bjc.2012.451. </a:t>
+            </a:r>
+            <a:r>
+              <a:rPr lang="fr-FR" dirty="0" err="1"/>
+              <a:t>Epub</a:t>
+            </a:r>
+            <a:r>
+              <a:rPr lang="fr-FR" dirty="0"/>
+              <a:t> 2012 </a:t>
+            </a:r>
+            <a:r>
+              <a:rPr lang="fr-FR" dirty="0" err="1"/>
+              <a:t>Oct</a:t>
+            </a:r>
+            <a:r>
+              <a:rPr lang="fr-FR" dirty="0"/>
+              <a:t> 9. PMID: 23047548; PMCID: PMC3493866</a:t>
+            </a:r>
+            <a:r>
+              <a:rPr lang="fr-FR" dirty="0" smtClean="0"/>
+              <a:t>.</a:t>
+            </a:r>
+          </a:p>
+          <a:p>
+            <a:r>
+              <a:rPr lang="fr-FR" dirty="0" smtClean="0"/>
+              <a:t>3</a:t>
+            </a:r>
+            <a:r>
+              <a:rPr lang="fr-FR" dirty="0"/>
+              <a:t>. </a:t>
+            </a:r>
+            <a:r>
+              <a:rPr lang="fr-FR" dirty="0" err="1"/>
+              <a:t>Popova</a:t>
+            </a:r>
+            <a:r>
+              <a:rPr lang="fr-FR" dirty="0"/>
+              <a:t> T, Manié E, </a:t>
+            </a:r>
+            <a:r>
+              <a:rPr lang="fr-FR" dirty="0" err="1"/>
+              <a:t>Rieunier</a:t>
+            </a:r>
+            <a:r>
+              <a:rPr lang="fr-FR" dirty="0"/>
+              <a:t> G, Caux-</a:t>
+            </a:r>
+            <a:r>
+              <a:rPr lang="fr-FR" dirty="0" err="1"/>
+              <a:t>Moncoutier</a:t>
+            </a:r>
+            <a:r>
+              <a:rPr lang="fr-FR" dirty="0"/>
+              <a:t> V, </a:t>
+            </a:r>
+            <a:r>
+              <a:rPr lang="fr-FR" dirty="0" err="1"/>
+              <a:t>Tirapo</a:t>
+            </a:r>
+            <a:r>
+              <a:rPr lang="fr-FR" dirty="0"/>
+              <a:t> C, Dubois T, Delattre O, </a:t>
+            </a:r>
+            <a:r>
+              <a:rPr lang="fr-FR" dirty="0" err="1"/>
+              <a:t>Sigal-Zafrani</a:t>
+            </a:r>
+            <a:r>
+              <a:rPr lang="fr-FR" dirty="0"/>
+              <a:t> B, </a:t>
+            </a:r>
+            <a:r>
+              <a:rPr lang="fr-FR" dirty="0" err="1"/>
+              <a:t>Bollet</a:t>
+            </a:r>
+            <a:r>
+              <a:rPr lang="fr-FR" dirty="0"/>
+              <a:t> M, </a:t>
+            </a:r>
+            <a:r>
+              <a:rPr lang="fr-FR" dirty="0" err="1"/>
+              <a:t>Longy</a:t>
+            </a:r>
+            <a:r>
+              <a:rPr lang="fr-FR" dirty="0"/>
+              <a:t> M, </a:t>
+            </a:r>
+            <a:r>
+              <a:rPr lang="fr-FR" dirty="0" err="1"/>
+              <a:t>Houdayer</a:t>
+            </a:r>
+            <a:r>
+              <a:rPr lang="fr-FR" dirty="0"/>
+              <a:t> C, </a:t>
+            </a:r>
+            <a:r>
+              <a:rPr lang="fr-FR" dirty="0" err="1"/>
+              <a:t>Sastre-Garau</a:t>
+            </a:r>
+            <a:r>
+              <a:rPr lang="fr-FR" dirty="0"/>
+              <a:t> X, Vincent-Salomon A, Stoppa-</a:t>
+            </a:r>
+            <a:r>
+              <a:rPr lang="fr-FR" dirty="0" err="1"/>
+              <a:t>Lyonnet</a:t>
+            </a:r>
+            <a:r>
+              <a:rPr lang="fr-FR" dirty="0"/>
+              <a:t> D, Stern MH. </a:t>
+            </a:r>
+            <a:r>
+              <a:rPr lang="fr-FR" dirty="0" err="1"/>
+              <a:t>Ploidy</a:t>
+            </a:r>
+            <a:r>
+              <a:rPr lang="fr-FR" dirty="0"/>
+              <a:t> and large-</a:t>
+            </a:r>
+            <a:r>
+              <a:rPr lang="fr-FR" dirty="0" err="1"/>
+              <a:t>scale</a:t>
+            </a:r>
+            <a:r>
+              <a:rPr lang="fr-FR" dirty="0"/>
+              <a:t> </a:t>
+            </a:r>
+            <a:r>
+              <a:rPr lang="fr-FR" dirty="0" err="1"/>
+              <a:t>genomic</a:t>
+            </a:r>
+            <a:r>
+              <a:rPr lang="fr-FR" dirty="0"/>
+              <a:t> </a:t>
+            </a:r>
+            <a:r>
+              <a:rPr lang="fr-FR" dirty="0" err="1"/>
+              <a:t>instability</a:t>
+            </a:r>
+            <a:r>
+              <a:rPr lang="fr-FR" dirty="0"/>
+              <a:t> </a:t>
+            </a:r>
+            <a:r>
+              <a:rPr lang="fr-FR" dirty="0" err="1"/>
+              <a:t>consistently</a:t>
+            </a:r>
+            <a:r>
+              <a:rPr lang="fr-FR" dirty="0"/>
+              <a:t> </a:t>
+            </a:r>
+            <a:r>
+              <a:rPr lang="fr-FR" dirty="0" err="1"/>
+              <a:t>identify</a:t>
+            </a:r>
+            <a:r>
+              <a:rPr lang="fr-FR" dirty="0"/>
+              <a:t> basal-</a:t>
+            </a:r>
+            <a:r>
+              <a:rPr lang="fr-FR" dirty="0" err="1"/>
+              <a:t>like</a:t>
+            </a:r>
+            <a:r>
+              <a:rPr lang="fr-FR" dirty="0"/>
+              <a:t> </a:t>
+            </a:r>
+            <a:r>
+              <a:rPr lang="fr-FR" dirty="0" err="1"/>
+              <a:t>breast</a:t>
+            </a:r>
+            <a:r>
+              <a:rPr lang="fr-FR" dirty="0"/>
+              <a:t> </a:t>
+            </a:r>
+            <a:r>
+              <a:rPr lang="fr-FR" dirty="0" err="1"/>
+              <a:t>carcinomas</a:t>
+            </a:r>
+            <a:r>
+              <a:rPr lang="fr-FR" dirty="0"/>
+              <a:t> </a:t>
+            </a:r>
+            <a:r>
+              <a:rPr lang="fr-FR" dirty="0" err="1"/>
+              <a:t>with</a:t>
+            </a:r>
+            <a:r>
+              <a:rPr lang="fr-FR" dirty="0"/>
+              <a:t> BRCA1/2 inactivation. Cancer </a:t>
+            </a:r>
+            <a:r>
+              <a:rPr lang="fr-FR" dirty="0" err="1"/>
+              <a:t>Res</a:t>
+            </a:r>
+            <a:r>
+              <a:rPr lang="fr-FR" dirty="0"/>
+              <a:t>. 2012 </a:t>
+            </a:r>
+            <a:r>
+              <a:rPr lang="fr-FR" dirty="0" err="1"/>
+              <a:t>Nov</a:t>
+            </a:r>
+            <a:r>
+              <a:rPr lang="fr-FR" dirty="0"/>
+              <a:t> 1;72(21):5454-62. </a:t>
+            </a:r>
+            <a:r>
+              <a:rPr lang="fr-FR" dirty="0" err="1"/>
+              <a:t>doi</a:t>
+            </a:r>
+            <a:r>
+              <a:rPr lang="fr-FR" dirty="0"/>
+              <a:t>: 10.1158/0008-5472.CAN-12-1470. </a:t>
+            </a:r>
+            <a:r>
+              <a:rPr lang="fr-FR" dirty="0" err="1"/>
+              <a:t>Epub</a:t>
+            </a:r>
+            <a:r>
+              <a:rPr lang="fr-FR" dirty="0"/>
+              <a:t> 2012 </a:t>
+            </a:r>
+            <a:r>
+              <a:rPr lang="fr-FR" dirty="0" err="1"/>
+              <a:t>Aug</a:t>
+            </a:r>
+            <a:r>
+              <a:rPr lang="fr-FR" dirty="0"/>
+              <a:t> 29. PMID: 22933060</a:t>
+            </a:r>
+            <a:r>
+              <a:rPr lang="fr-FR" dirty="0" smtClean="0"/>
+              <a:t>.</a:t>
+            </a:r>
+            <a:endParaRPr lang="fr-FR" dirty="0"/>
+          </a:p>
+          <a:p>
+            <a:r>
+              <a:rPr lang="fr-FR" dirty="0" smtClean="0"/>
+              <a:t>4</a:t>
+            </a:r>
+            <a:r>
+              <a:rPr lang="fr-FR" dirty="0"/>
+              <a:t>. </a:t>
+            </a:r>
+            <a:r>
+              <a:rPr lang="fr-FR" dirty="0" err="1"/>
+              <a:t>Popova</a:t>
+            </a:r>
+            <a:r>
+              <a:rPr lang="fr-FR" dirty="0"/>
+              <a:t> T, Manié E, </a:t>
+            </a:r>
+            <a:r>
+              <a:rPr lang="fr-FR" dirty="0" err="1"/>
+              <a:t>Boeva</a:t>
+            </a:r>
+            <a:r>
+              <a:rPr lang="fr-FR" dirty="0"/>
+              <a:t> V, </a:t>
+            </a:r>
+            <a:r>
+              <a:rPr lang="fr-FR" dirty="0" err="1"/>
+              <a:t>Battistella</a:t>
+            </a:r>
+            <a:r>
+              <a:rPr lang="fr-FR" dirty="0"/>
+              <a:t> A, </a:t>
+            </a:r>
+            <a:r>
+              <a:rPr lang="fr-FR" dirty="0" err="1"/>
+              <a:t>Goundiam</a:t>
+            </a:r>
+            <a:r>
+              <a:rPr lang="fr-FR" dirty="0"/>
+              <a:t> O, Smith NK, Mueller CR, Raynal V, Mariani O, </a:t>
+            </a:r>
+            <a:r>
+              <a:rPr lang="fr-FR" dirty="0" err="1"/>
+              <a:t>Sastre-Garau</a:t>
+            </a:r>
+            <a:r>
+              <a:rPr lang="fr-FR" dirty="0"/>
+              <a:t> X, Stern MH. </a:t>
+            </a:r>
+            <a:r>
+              <a:rPr lang="fr-FR" dirty="0" err="1"/>
+              <a:t>Ovarian</a:t>
+            </a:r>
+            <a:r>
+              <a:rPr lang="fr-FR" dirty="0"/>
+              <a:t> Cancers </a:t>
+            </a:r>
+            <a:r>
+              <a:rPr lang="fr-FR" dirty="0" err="1"/>
+              <a:t>Harboring</a:t>
+            </a:r>
+            <a:r>
+              <a:rPr lang="fr-FR" dirty="0"/>
+              <a:t> </a:t>
+            </a:r>
+            <a:r>
+              <a:rPr lang="fr-FR" dirty="0" err="1"/>
+              <a:t>Inactivating</a:t>
+            </a:r>
+            <a:r>
+              <a:rPr lang="fr-FR" dirty="0"/>
+              <a:t> Mutations in CDK12 Display a Distinct </a:t>
+            </a:r>
+            <a:r>
+              <a:rPr lang="fr-FR" dirty="0" err="1"/>
+              <a:t>Genomic</a:t>
+            </a:r>
+            <a:r>
+              <a:rPr lang="fr-FR" dirty="0"/>
+              <a:t> </a:t>
+            </a:r>
+            <a:r>
+              <a:rPr lang="fr-FR" dirty="0" err="1"/>
+              <a:t>Instability</a:t>
+            </a:r>
+            <a:r>
+              <a:rPr lang="fr-FR" dirty="0"/>
+              <a:t> Pattern </a:t>
+            </a:r>
+            <a:r>
+              <a:rPr lang="fr-FR" dirty="0" err="1"/>
+              <a:t>Characterized</a:t>
+            </a:r>
+            <a:r>
+              <a:rPr lang="fr-FR" dirty="0"/>
+              <a:t> by Large Tandem Duplications. Cancer </a:t>
+            </a:r>
+            <a:r>
+              <a:rPr lang="fr-FR" dirty="0" err="1"/>
+              <a:t>Res</a:t>
+            </a:r>
+            <a:r>
+              <a:rPr lang="fr-FR" dirty="0"/>
+              <a:t>. 2016 </a:t>
+            </a:r>
+            <a:r>
+              <a:rPr lang="fr-FR" dirty="0" err="1"/>
+              <a:t>Apr</a:t>
+            </a:r>
+            <a:r>
+              <a:rPr lang="fr-FR" dirty="0"/>
+              <a:t> 1;76(7):1882-91. </a:t>
+            </a:r>
+            <a:r>
+              <a:rPr lang="fr-FR" dirty="0" err="1"/>
+              <a:t>doi</a:t>
+            </a:r>
+            <a:r>
+              <a:rPr lang="fr-FR" dirty="0"/>
+              <a:t>: 10.1158/0008-5472.CAN-15-2128. </a:t>
+            </a:r>
+            <a:r>
+              <a:rPr lang="fr-FR" dirty="0" err="1"/>
+              <a:t>Epub</a:t>
+            </a:r>
+            <a:r>
+              <a:rPr lang="fr-FR" dirty="0"/>
+              <a:t> 2016 Jan 19. PMID: 26787835.</a:t>
+            </a:r>
+          </a:p>
+          <a:p>
+            <a:endParaRPr lang="fr-FR" dirty="0" smtClean="0"/>
+          </a:p>
+          <a:p>
+            <a:endParaRPr lang="fr-FR" dirty="0" smtClean="0"/>
+          </a:p>
+          <a:p>
+            <a:endParaRPr lang="fr-FR" dirty="0"/>
           </a:p>
         </p:txBody>
       </p:sp>
@@ -9202,7 +9778,7 @@
       </p:grpSpPr>
       <p:pic>
         <p:nvPicPr>
-          <p:cNvPr id="11" name="Image 10"/>
+          <p:cNvPr id="3" name="Image 2"/>
           <p:cNvPicPr>
             <a:picLocks noChangeAspect="1"/>
           </p:cNvPicPr>
@@ -9222,7 +9798,7 @@
         </p:blipFill>
         <p:spPr>
           <a:xfrm>
-            <a:off x="569493" y="1672774"/>
+            <a:off x="569492" y="1672774"/>
             <a:ext cx="10762163" cy="4102052"/>
           </a:xfrm>
           <a:prstGeom prst="rect">
@@ -11268,13 +11844,8 @@
             </a:r>
             <a:r>
               <a:rPr lang="fr-FR" dirty="0" smtClean="0"/>
-              <a:t> sont </a:t>
-            </a:r>
-            <a:r>
-              <a:rPr lang="fr-FR" dirty="0" smtClean="0"/>
-              <a:t>rognés</a:t>
-            </a:r>
-            <a:endParaRPr lang="fr-FR" dirty="0" smtClean="0"/>
+              <a:t> sont rognés</a:t>
+            </a:r>
           </a:p>
           <a:p>
             <a:r>

</xml_diff>